<commit_message>
Planning prévisionnel in progress 2
</commit_message>
<xml_diff>
--- a/Planning prévisionnel.pptx
+++ b/Planning prévisionnel.pptx
@@ -104,6 +104,11 @@
       </a:defRPr>
     </a:lvl9pPr>
   </p:defaultTextStyle>
+  <p:extLst>
+    <p:ext uri="{EFAFB233-063F-42B5-8137-9DF3F51BA10A}">
+      <p15:sldGuideLst xmlns:p15="http://schemas.microsoft.com/office/powerpoint/2012/main"/>
+    </p:ext>
+  </p:extLst>
 </p:presentation>
 </file>
 
@@ -3908,7 +3913,7 @@
           <a:p>
             <a:fld id="{8BA915E5-5DBD-445D-A40C-D4BFAC4EBC40}" type="datetimeFigureOut">
               <a:rPr lang="fr-FR" smtClean="0"/>
-              <a:t>30/07/2017</a:t>
+              <a:t>31/07/2017</a:t>
             </a:fld>
             <a:endParaRPr lang="fr-FR"/>
           </a:p>
@@ -4106,7 +4111,7 @@
           <a:p>
             <a:fld id="{8BA915E5-5DBD-445D-A40C-D4BFAC4EBC40}" type="datetimeFigureOut">
               <a:rPr lang="fr-FR" smtClean="0"/>
-              <a:t>30/07/2017</a:t>
+              <a:t>31/07/2017</a:t>
             </a:fld>
             <a:endParaRPr lang="fr-FR"/>
           </a:p>
@@ -4314,7 +4319,7 @@
           <a:p>
             <a:fld id="{8BA915E5-5DBD-445D-A40C-D4BFAC4EBC40}" type="datetimeFigureOut">
               <a:rPr lang="fr-FR" smtClean="0"/>
-              <a:t>30/07/2017</a:t>
+              <a:t>31/07/2017</a:t>
             </a:fld>
             <a:endParaRPr lang="fr-FR"/>
           </a:p>
@@ -4512,7 +4517,7 @@
           <a:p>
             <a:fld id="{8BA915E5-5DBD-445D-A40C-D4BFAC4EBC40}" type="datetimeFigureOut">
               <a:rPr lang="fr-FR" smtClean="0"/>
-              <a:t>30/07/2017</a:t>
+              <a:t>31/07/2017</a:t>
             </a:fld>
             <a:endParaRPr lang="fr-FR"/>
           </a:p>
@@ -4787,7 +4792,7 @@
           <a:p>
             <a:fld id="{8BA915E5-5DBD-445D-A40C-D4BFAC4EBC40}" type="datetimeFigureOut">
               <a:rPr lang="fr-FR" smtClean="0"/>
-              <a:t>30/07/2017</a:t>
+              <a:t>31/07/2017</a:t>
             </a:fld>
             <a:endParaRPr lang="fr-FR"/>
           </a:p>
@@ -5052,7 +5057,7 @@
           <a:p>
             <a:fld id="{8BA915E5-5DBD-445D-A40C-D4BFAC4EBC40}" type="datetimeFigureOut">
               <a:rPr lang="fr-FR" smtClean="0"/>
-              <a:t>30/07/2017</a:t>
+              <a:t>31/07/2017</a:t>
             </a:fld>
             <a:endParaRPr lang="fr-FR"/>
           </a:p>
@@ -5464,7 +5469,7 @@
           <a:p>
             <a:fld id="{8BA915E5-5DBD-445D-A40C-D4BFAC4EBC40}" type="datetimeFigureOut">
               <a:rPr lang="fr-FR" smtClean="0"/>
-              <a:t>30/07/2017</a:t>
+              <a:t>31/07/2017</a:t>
             </a:fld>
             <a:endParaRPr lang="fr-FR"/>
           </a:p>
@@ -5605,7 +5610,7 @@
           <a:p>
             <a:fld id="{8BA915E5-5DBD-445D-A40C-D4BFAC4EBC40}" type="datetimeFigureOut">
               <a:rPr lang="fr-FR" smtClean="0"/>
-              <a:t>30/07/2017</a:t>
+              <a:t>31/07/2017</a:t>
             </a:fld>
             <a:endParaRPr lang="fr-FR"/>
           </a:p>
@@ -5718,7 +5723,7 @@
           <a:p>
             <a:fld id="{8BA915E5-5DBD-445D-A40C-D4BFAC4EBC40}" type="datetimeFigureOut">
               <a:rPr lang="fr-FR" smtClean="0"/>
-              <a:t>30/07/2017</a:t>
+              <a:t>31/07/2017</a:t>
             </a:fld>
             <a:endParaRPr lang="fr-FR"/>
           </a:p>
@@ -6029,7 +6034,7 @@
           <a:p>
             <a:fld id="{8BA915E5-5DBD-445D-A40C-D4BFAC4EBC40}" type="datetimeFigureOut">
               <a:rPr lang="fr-FR" smtClean="0"/>
-              <a:t>30/07/2017</a:t>
+              <a:t>31/07/2017</a:t>
             </a:fld>
             <a:endParaRPr lang="fr-FR"/>
           </a:p>
@@ -6317,7 +6322,7 @@
           <a:p>
             <a:fld id="{8BA915E5-5DBD-445D-A40C-D4BFAC4EBC40}" type="datetimeFigureOut">
               <a:rPr lang="fr-FR" smtClean="0"/>
-              <a:t>30/07/2017</a:t>
+              <a:t>31/07/2017</a:t>
             </a:fld>
             <a:endParaRPr lang="fr-FR"/>
           </a:p>
@@ -6558,7 +6563,7 @@
           <a:p>
             <a:fld id="{8BA915E5-5DBD-445D-A40C-D4BFAC4EBC40}" type="datetimeFigureOut">
               <a:rPr lang="fr-FR" smtClean="0"/>
-              <a:t>30/07/2017</a:t>
+              <a:t>31/07/2017</a:t>
             </a:fld>
             <a:endParaRPr lang="fr-FR"/>
           </a:p>
@@ -6975,6 +6980,151 @@
           <a:chExt cx="0" cy="0"/>
         </a:xfrm>
       </p:grpSpPr>
+      <p:cxnSp>
+        <p:nvCxnSpPr>
+          <p:cNvPr id="54" name="Connecteur droit avec flèche 53">
+            <a:extLst>
+              <a:ext uri="{FF2B5EF4-FFF2-40B4-BE49-F238E27FC236}">
+                <a16:creationId xmlns:a16="http://schemas.microsoft.com/office/drawing/2014/main" id="{49274425-BE96-40E8-BD37-B2572550DDAE}"/>
+              </a:ext>
+            </a:extLst>
+          </p:cNvPr>
+          <p:cNvCxnSpPr/>
+          <p:nvPr/>
+        </p:nvCxnSpPr>
+        <p:spPr>
+          <a:xfrm>
+            <a:off x="-9618" y="2124631"/>
+            <a:ext cx="12201618" cy="0"/>
+          </a:xfrm>
+          <a:prstGeom prst="straightConnector1">
+            <a:avLst/>
+          </a:prstGeom>
+          <a:ln w="38100">
+            <a:solidFill>
+              <a:schemeClr val="accent1">
+                <a:lumMod val="40000"/>
+                <a:lumOff val="60000"/>
+              </a:schemeClr>
+            </a:solidFill>
+            <a:prstDash val="dashDot"/>
+            <a:headEnd type="none" w="med" len="med"/>
+            <a:tailEnd type="none" w="med" len="med"/>
+          </a:ln>
+        </p:spPr>
+        <p:style>
+          <a:lnRef idx="1">
+            <a:schemeClr val="accent1"/>
+          </a:lnRef>
+          <a:fillRef idx="0">
+            <a:schemeClr val="accent1"/>
+          </a:fillRef>
+          <a:effectRef idx="0">
+            <a:schemeClr val="accent1"/>
+          </a:effectRef>
+          <a:fontRef idx="minor">
+            <a:schemeClr val="tx1"/>
+          </a:fontRef>
+        </p:style>
+      </p:cxnSp>
+      <p:cxnSp>
+        <p:nvCxnSpPr>
+          <p:cNvPr id="55" name="Connecteur droit avec flèche 54">
+            <a:extLst>
+              <a:ext uri="{FF2B5EF4-FFF2-40B4-BE49-F238E27FC236}">
+                <a16:creationId xmlns:a16="http://schemas.microsoft.com/office/drawing/2014/main" id="{15399579-D0FF-4642-A356-CA987E6C1D05}"/>
+              </a:ext>
+            </a:extLst>
+          </p:cNvPr>
+          <p:cNvCxnSpPr>
+            <a:cxnSpLocks/>
+          </p:cNvCxnSpPr>
+          <p:nvPr/>
+        </p:nvCxnSpPr>
+        <p:spPr>
+          <a:xfrm flipV="1">
+            <a:off x="-9618" y="3047298"/>
+            <a:ext cx="12201618" cy="3614"/>
+          </a:xfrm>
+          <a:prstGeom prst="straightConnector1">
+            <a:avLst/>
+          </a:prstGeom>
+          <a:ln w="38100">
+            <a:solidFill>
+              <a:schemeClr val="accent1">
+                <a:lumMod val="40000"/>
+                <a:lumOff val="60000"/>
+              </a:schemeClr>
+            </a:solidFill>
+            <a:prstDash val="dashDot"/>
+            <a:headEnd type="none" w="med" len="med"/>
+            <a:tailEnd type="none" w="med" len="med"/>
+          </a:ln>
+        </p:spPr>
+        <p:style>
+          <a:lnRef idx="1">
+            <a:schemeClr val="accent1"/>
+          </a:lnRef>
+          <a:fillRef idx="0">
+            <a:schemeClr val="accent1"/>
+          </a:fillRef>
+          <a:effectRef idx="0">
+            <a:schemeClr val="accent1"/>
+          </a:effectRef>
+          <a:fontRef idx="minor">
+            <a:schemeClr val="tx1"/>
+          </a:fontRef>
+        </p:style>
+      </p:cxnSp>
+      <p:cxnSp>
+        <p:nvCxnSpPr>
+          <p:cNvPr id="56" name="Connecteur droit avec flèche 55">
+            <a:extLst>
+              <a:ext uri="{FF2B5EF4-FFF2-40B4-BE49-F238E27FC236}">
+                <a16:creationId xmlns:a16="http://schemas.microsoft.com/office/drawing/2014/main" id="{1E4781AE-59C3-4598-BB29-B7528D416121}"/>
+              </a:ext>
+            </a:extLst>
+          </p:cNvPr>
+          <p:cNvCxnSpPr>
+            <a:cxnSpLocks/>
+          </p:cNvCxnSpPr>
+          <p:nvPr/>
+        </p:nvCxnSpPr>
+        <p:spPr>
+          <a:xfrm>
+            <a:off x="-9618" y="3930391"/>
+            <a:ext cx="12201618" cy="0"/>
+          </a:xfrm>
+          <a:prstGeom prst="straightConnector1">
+            <a:avLst/>
+          </a:prstGeom>
+          <a:ln w="38100">
+            <a:solidFill>
+              <a:schemeClr val="accent1">
+                <a:lumMod val="40000"/>
+                <a:lumOff val="60000"/>
+              </a:schemeClr>
+            </a:solidFill>
+            <a:prstDash val="dashDot"/>
+            <a:headEnd type="none" w="med" len="med"/>
+            <a:tailEnd type="none" w="med" len="med"/>
+          </a:ln>
+        </p:spPr>
+        <p:style>
+          <a:lnRef idx="1">
+            <a:schemeClr val="accent1"/>
+          </a:lnRef>
+          <a:fillRef idx="0">
+            <a:schemeClr val="accent1"/>
+          </a:fillRef>
+          <a:effectRef idx="0">
+            <a:schemeClr val="accent1"/>
+          </a:effectRef>
+          <a:fontRef idx="minor">
+            <a:schemeClr val="tx1"/>
+          </a:fontRef>
+        </p:style>
+      </p:cxnSp>
       <p:graphicFrame>
         <p:nvGraphicFramePr>
           <p:cNvPr id="6" name="Diagramme 5">
@@ -7003,6 +7153,2494 @@
           </a:graphicData>
         </a:graphic>
       </p:graphicFrame>
+      <p:grpSp>
+        <p:nvGrpSpPr>
+          <p:cNvPr id="3" name="Groupe 2">
+            <a:extLst>
+              <a:ext uri="{FF2B5EF4-FFF2-40B4-BE49-F238E27FC236}">
+                <a16:creationId xmlns:a16="http://schemas.microsoft.com/office/drawing/2014/main" id="{99EAC591-659F-434C-B4FA-0BB2C6D05CC8}"/>
+              </a:ext>
+            </a:extLst>
+          </p:cNvPr>
+          <p:cNvGrpSpPr/>
+          <p:nvPr/>
+        </p:nvGrpSpPr>
+        <p:grpSpPr>
+          <a:xfrm>
+            <a:off x="360727" y="1400961"/>
+            <a:ext cx="1358800" cy="1443600"/>
+            <a:chOff x="360727" y="1400961"/>
+            <a:chExt cx="1399562" cy="1838951"/>
+          </a:xfrm>
+        </p:grpSpPr>
+        <p:sp>
+          <p:nvSpPr>
+            <p:cNvPr id="2" name="Flèche : bas 1">
+              <a:extLst>
+                <a:ext uri="{FF2B5EF4-FFF2-40B4-BE49-F238E27FC236}">
+                  <a16:creationId xmlns:a16="http://schemas.microsoft.com/office/drawing/2014/main" id="{92EC2ADB-8C7F-41E3-A21A-786C116D908B}"/>
+                </a:ext>
+              </a:extLst>
+            </p:cNvPr>
+            <p:cNvSpPr/>
+            <p:nvPr/>
+          </p:nvSpPr>
+          <p:spPr>
+            <a:xfrm>
+              <a:off x="360727" y="1400961"/>
+              <a:ext cx="243281" cy="1838951"/>
+            </a:xfrm>
+            <a:prstGeom prst="downArrow">
+              <a:avLst/>
+            </a:prstGeom>
+            <a:ln w="3175"/>
+          </p:spPr>
+          <p:style>
+            <a:lnRef idx="2">
+              <a:schemeClr val="accent1">
+                <a:shade val="50000"/>
+              </a:schemeClr>
+            </a:lnRef>
+            <a:fillRef idx="1">
+              <a:schemeClr val="accent1"/>
+            </a:fillRef>
+            <a:effectRef idx="0">
+              <a:schemeClr val="accent1"/>
+            </a:effectRef>
+            <a:fontRef idx="minor">
+              <a:schemeClr val="lt1"/>
+            </a:fontRef>
+          </p:style>
+          <p:txBody>
+            <a:bodyPr rot="0" spcFirstLastPara="0" vertOverflow="overflow" horzOverflow="overflow" vert="horz" wrap="square" lIns="91440" tIns="45720" rIns="91440" bIns="45720" numCol="1" spcCol="0" rtlCol="0" fromWordArt="0" anchor="ctr" anchorCtr="0" forceAA="0" compatLnSpc="1">
+              <a:prstTxWarp prst="textNoShape">
+                <a:avLst/>
+              </a:prstTxWarp>
+              <a:noAutofit/>
+            </a:bodyPr>
+            <a:lstStyle/>
+            <a:p>
+              <a:pPr algn="ctr"/>
+              <a:endParaRPr lang="fr-FR">
+                <a:ln w="0"/>
+                <a:gradFill>
+                  <a:gsLst>
+                    <a:gs pos="0">
+                      <a:schemeClr val="accent5">
+                        <a:lumMod val="50000"/>
+                      </a:schemeClr>
+                    </a:gs>
+                    <a:gs pos="50000">
+                      <a:schemeClr val="accent5"/>
+                    </a:gs>
+                    <a:gs pos="100000">
+                      <a:schemeClr val="accent5">
+                        <a:lumMod val="60000"/>
+                        <a:lumOff val="40000"/>
+                      </a:schemeClr>
+                    </a:gs>
+                  </a:gsLst>
+                  <a:lin ang="5400000"/>
+                </a:gradFill>
+                <a:effectLst>
+                  <a:glow rad="228600">
+                    <a:schemeClr val="accent1">
+                      <a:satMod val="175000"/>
+                      <a:alpha val="40000"/>
+                    </a:schemeClr>
+                  </a:glow>
+                  <a:reflection blurRad="6350" stA="53000" endA="300" endPos="35500" dir="5400000" sy="-90000" algn="bl" rotWithShape="0"/>
+                </a:effectLst>
+              </a:endParaRPr>
+            </a:p>
+          </p:txBody>
+        </p:sp>
+        <p:sp>
+          <p:nvSpPr>
+            <p:cNvPr id="9" name="Flèche : bas 8">
+              <a:extLst>
+                <a:ext uri="{FF2B5EF4-FFF2-40B4-BE49-F238E27FC236}">
+                  <a16:creationId xmlns:a16="http://schemas.microsoft.com/office/drawing/2014/main" id="{DD78D93E-39BF-4CEB-A8B5-9B31E0802D20}"/>
+                </a:ext>
+              </a:extLst>
+            </p:cNvPr>
+            <p:cNvSpPr/>
+            <p:nvPr/>
+          </p:nvSpPr>
+          <p:spPr>
+            <a:xfrm>
+              <a:off x="1517008" y="1400961"/>
+              <a:ext cx="243281" cy="894253"/>
+            </a:xfrm>
+            <a:prstGeom prst="downArrow">
+              <a:avLst/>
+            </a:prstGeom>
+            <a:ln w="3175"/>
+          </p:spPr>
+          <p:style>
+            <a:lnRef idx="2">
+              <a:schemeClr val="accent1">
+                <a:shade val="50000"/>
+              </a:schemeClr>
+            </a:lnRef>
+            <a:fillRef idx="1">
+              <a:schemeClr val="accent1"/>
+            </a:fillRef>
+            <a:effectRef idx="0">
+              <a:schemeClr val="accent1"/>
+            </a:effectRef>
+            <a:fontRef idx="minor">
+              <a:schemeClr val="lt1"/>
+            </a:fontRef>
+          </p:style>
+          <p:txBody>
+            <a:bodyPr rot="0" spcFirstLastPara="0" vertOverflow="overflow" horzOverflow="overflow" vert="horz" wrap="square" lIns="91440" tIns="45720" rIns="91440" bIns="45720" numCol="1" spcCol="0" rtlCol="0" fromWordArt="0" anchor="ctr" anchorCtr="0" forceAA="0" compatLnSpc="1">
+              <a:prstTxWarp prst="textNoShape">
+                <a:avLst/>
+              </a:prstTxWarp>
+              <a:noAutofit/>
+            </a:bodyPr>
+            <a:lstStyle/>
+            <a:p>
+              <a:pPr algn="ctr"/>
+              <a:endParaRPr lang="fr-FR">
+                <a:ln w="0"/>
+                <a:gradFill>
+                  <a:gsLst>
+                    <a:gs pos="0">
+                      <a:schemeClr val="accent5">
+                        <a:lumMod val="50000"/>
+                      </a:schemeClr>
+                    </a:gs>
+                    <a:gs pos="50000">
+                      <a:schemeClr val="accent5"/>
+                    </a:gs>
+                    <a:gs pos="100000">
+                      <a:schemeClr val="accent5">
+                        <a:lumMod val="60000"/>
+                        <a:lumOff val="40000"/>
+                      </a:schemeClr>
+                    </a:gs>
+                  </a:gsLst>
+                  <a:lin ang="5400000"/>
+                </a:gradFill>
+                <a:effectLst>
+                  <a:glow rad="228600">
+                    <a:schemeClr val="accent1">
+                      <a:satMod val="175000"/>
+                      <a:alpha val="40000"/>
+                    </a:schemeClr>
+                  </a:glow>
+                  <a:reflection blurRad="6350" stA="53000" endA="300" endPos="35500" dir="5400000" sy="-90000" algn="bl" rotWithShape="0"/>
+                </a:effectLst>
+              </a:endParaRPr>
+            </a:p>
+          </p:txBody>
+        </p:sp>
+      </p:grpSp>
+      <p:grpSp>
+        <p:nvGrpSpPr>
+          <p:cNvPr id="10" name="Groupe 9">
+            <a:extLst>
+              <a:ext uri="{FF2B5EF4-FFF2-40B4-BE49-F238E27FC236}">
+                <a16:creationId xmlns:a16="http://schemas.microsoft.com/office/drawing/2014/main" id="{325E8D99-F1D9-4D88-95F0-E89784240498}"/>
+              </a:ext>
+            </a:extLst>
+          </p:cNvPr>
+          <p:cNvGrpSpPr/>
+          <p:nvPr/>
+        </p:nvGrpSpPr>
+        <p:grpSpPr>
+          <a:xfrm>
+            <a:off x="2451333" y="1400957"/>
+            <a:ext cx="1256991" cy="2023200"/>
+            <a:chOff x="360727" y="1400959"/>
+            <a:chExt cx="1294699" cy="2375300"/>
+          </a:xfrm>
+        </p:grpSpPr>
+        <p:sp>
+          <p:nvSpPr>
+            <p:cNvPr id="11" name="Flèche : bas 10">
+              <a:extLst>
+                <a:ext uri="{FF2B5EF4-FFF2-40B4-BE49-F238E27FC236}">
+                  <a16:creationId xmlns:a16="http://schemas.microsoft.com/office/drawing/2014/main" id="{2CB73291-BBF1-488F-BCA7-2586925F009C}"/>
+                </a:ext>
+              </a:extLst>
+            </p:cNvPr>
+            <p:cNvSpPr/>
+            <p:nvPr/>
+          </p:nvSpPr>
+          <p:spPr>
+            <a:xfrm>
+              <a:off x="360727" y="1400961"/>
+              <a:ext cx="243279" cy="1792041"/>
+            </a:xfrm>
+            <a:prstGeom prst="downArrow">
+              <a:avLst/>
+            </a:prstGeom>
+            <a:ln w="3175"/>
+          </p:spPr>
+          <p:style>
+            <a:lnRef idx="2">
+              <a:schemeClr val="accent1">
+                <a:shade val="50000"/>
+              </a:schemeClr>
+            </a:lnRef>
+            <a:fillRef idx="1">
+              <a:schemeClr val="accent1"/>
+            </a:fillRef>
+            <a:effectRef idx="0">
+              <a:schemeClr val="accent1"/>
+            </a:effectRef>
+            <a:fontRef idx="minor">
+              <a:schemeClr val="lt1"/>
+            </a:fontRef>
+          </p:style>
+          <p:txBody>
+            <a:bodyPr rot="0" spcFirstLastPara="0" vertOverflow="overflow" horzOverflow="overflow" vert="horz" wrap="square" lIns="91440" tIns="45720" rIns="91440" bIns="45720" numCol="1" spcCol="0" rtlCol="0" fromWordArt="0" anchor="ctr" anchorCtr="0" forceAA="0" compatLnSpc="1">
+              <a:prstTxWarp prst="textNoShape">
+                <a:avLst/>
+              </a:prstTxWarp>
+              <a:noAutofit/>
+            </a:bodyPr>
+            <a:lstStyle/>
+            <a:p>
+              <a:pPr algn="ctr"/>
+              <a:endParaRPr lang="fr-FR">
+                <a:ln w="0"/>
+                <a:gradFill>
+                  <a:gsLst>
+                    <a:gs pos="0">
+                      <a:schemeClr val="accent5">
+                        <a:lumMod val="50000"/>
+                      </a:schemeClr>
+                    </a:gs>
+                    <a:gs pos="50000">
+                      <a:schemeClr val="accent5"/>
+                    </a:gs>
+                    <a:gs pos="100000">
+                      <a:schemeClr val="accent5">
+                        <a:lumMod val="60000"/>
+                        <a:lumOff val="40000"/>
+                      </a:schemeClr>
+                    </a:gs>
+                  </a:gsLst>
+                  <a:lin ang="5400000"/>
+                </a:gradFill>
+                <a:effectLst>
+                  <a:glow rad="228600">
+                    <a:schemeClr val="accent1">
+                      <a:satMod val="175000"/>
+                      <a:alpha val="40000"/>
+                    </a:schemeClr>
+                  </a:glow>
+                  <a:reflection blurRad="6350" stA="53000" endA="300" endPos="35500" dir="5400000" sy="-90000" algn="bl" rotWithShape="0"/>
+                </a:effectLst>
+              </a:endParaRPr>
+            </a:p>
+          </p:txBody>
+        </p:sp>
+        <p:sp>
+          <p:nvSpPr>
+            <p:cNvPr id="12" name="Flèche : bas 11">
+              <a:extLst>
+                <a:ext uri="{FF2B5EF4-FFF2-40B4-BE49-F238E27FC236}">
+                  <a16:creationId xmlns:a16="http://schemas.microsoft.com/office/drawing/2014/main" id="{C92EFC23-740D-4E71-B8E8-79807AC2966F}"/>
+                </a:ext>
+              </a:extLst>
+            </p:cNvPr>
+            <p:cNvSpPr/>
+            <p:nvPr/>
+          </p:nvSpPr>
+          <p:spPr>
+            <a:xfrm>
+              <a:off x="1412147" y="1400959"/>
+              <a:ext cx="243279" cy="2375300"/>
+            </a:xfrm>
+            <a:prstGeom prst="downArrow">
+              <a:avLst/>
+            </a:prstGeom>
+            <a:ln w="3175"/>
+          </p:spPr>
+          <p:style>
+            <a:lnRef idx="2">
+              <a:schemeClr val="accent1">
+                <a:shade val="50000"/>
+              </a:schemeClr>
+            </a:lnRef>
+            <a:fillRef idx="1">
+              <a:schemeClr val="accent1"/>
+            </a:fillRef>
+            <a:effectRef idx="0">
+              <a:schemeClr val="accent1"/>
+            </a:effectRef>
+            <a:fontRef idx="minor">
+              <a:schemeClr val="lt1"/>
+            </a:fontRef>
+          </p:style>
+          <p:txBody>
+            <a:bodyPr rot="0" spcFirstLastPara="0" vertOverflow="overflow" horzOverflow="overflow" vert="horz" wrap="square" lIns="91440" tIns="45720" rIns="91440" bIns="45720" numCol="1" spcCol="0" rtlCol="0" fromWordArt="0" anchor="ctr" anchorCtr="0" forceAA="0" compatLnSpc="1">
+              <a:prstTxWarp prst="textNoShape">
+                <a:avLst/>
+              </a:prstTxWarp>
+              <a:noAutofit/>
+            </a:bodyPr>
+            <a:lstStyle/>
+            <a:p>
+              <a:pPr algn="ctr"/>
+              <a:endParaRPr lang="fr-FR">
+                <a:ln w="0"/>
+                <a:gradFill>
+                  <a:gsLst>
+                    <a:gs pos="0">
+                      <a:schemeClr val="accent5">
+                        <a:lumMod val="50000"/>
+                      </a:schemeClr>
+                    </a:gs>
+                    <a:gs pos="50000">
+                      <a:schemeClr val="accent5"/>
+                    </a:gs>
+                    <a:gs pos="100000">
+                      <a:schemeClr val="accent5">
+                        <a:lumMod val="60000"/>
+                        <a:lumOff val="40000"/>
+                      </a:schemeClr>
+                    </a:gs>
+                  </a:gsLst>
+                  <a:lin ang="5400000"/>
+                </a:gradFill>
+                <a:effectLst>
+                  <a:glow rad="228600">
+                    <a:schemeClr val="accent1">
+                      <a:satMod val="175000"/>
+                      <a:alpha val="40000"/>
+                    </a:schemeClr>
+                  </a:glow>
+                  <a:reflection blurRad="6350" stA="53000" endA="300" endPos="35500" dir="5400000" sy="-90000" algn="bl" rotWithShape="0"/>
+                </a:effectLst>
+              </a:endParaRPr>
+            </a:p>
+          </p:txBody>
+        </p:sp>
+      </p:grpSp>
+      <p:grpSp>
+        <p:nvGrpSpPr>
+          <p:cNvPr id="13" name="Groupe 12">
+            <a:extLst>
+              <a:ext uri="{FF2B5EF4-FFF2-40B4-BE49-F238E27FC236}">
+                <a16:creationId xmlns:a16="http://schemas.microsoft.com/office/drawing/2014/main" id="{8C9A0070-8B91-4E62-811B-A006BB61CE45}"/>
+              </a:ext>
+            </a:extLst>
+          </p:cNvPr>
+          <p:cNvGrpSpPr/>
+          <p:nvPr/>
+        </p:nvGrpSpPr>
+        <p:grpSpPr>
+          <a:xfrm>
+            <a:off x="4465566" y="1396756"/>
+            <a:ext cx="1170966" cy="1943142"/>
+            <a:chOff x="360727" y="1396758"/>
+            <a:chExt cx="1206093" cy="2976318"/>
+          </a:xfrm>
+        </p:grpSpPr>
+        <p:sp>
+          <p:nvSpPr>
+            <p:cNvPr id="14" name="Flèche : bas 13">
+              <a:extLst>
+                <a:ext uri="{FF2B5EF4-FFF2-40B4-BE49-F238E27FC236}">
+                  <a16:creationId xmlns:a16="http://schemas.microsoft.com/office/drawing/2014/main" id="{28E4D0D7-F3B2-4EE5-8676-39A9EB67DC01}"/>
+                </a:ext>
+              </a:extLst>
+            </p:cNvPr>
+            <p:cNvSpPr/>
+            <p:nvPr/>
+          </p:nvSpPr>
+          <p:spPr>
+            <a:xfrm>
+              <a:off x="360727" y="1400958"/>
+              <a:ext cx="243280" cy="2972118"/>
+            </a:xfrm>
+            <a:prstGeom prst="downArrow">
+              <a:avLst/>
+            </a:prstGeom>
+            <a:ln w="3175"/>
+          </p:spPr>
+          <p:style>
+            <a:lnRef idx="2">
+              <a:schemeClr val="accent1">
+                <a:shade val="50000"/>
+              </a:schemeClr>
+            </a:lnRef>
+            <a:fillRef idx="1">
+              <a:schemeClr val="accent1"/>
+            </a:fillRef>
+            <a:effectRef idx="0">
+              <a:schemeClr val="accent1"/>
+            </a:effectRef>
+            <a:fontRef idx="minor">
+              <a:schemeClr val="lt1"/>
+            </a:fontRef>
+          </p:style>
+          <p:txBody>
+            <a:bodyPr rot="0" spcFirstLastPara="0" vertOverflow="overflow" horzOverflow="overflow" vert="horz" wrap="square" lIns="91440" tIns="45720" rIns="91440" bIns="45720" numCol="1" spcCol="0" rtlCol="0" fromWordArt="0" anchor="ctr" anchorCtr="0" forceAA="0" compatLnSpc="1">
+              <a:prstTxWarp prst="textNoShape">
+                <a:avLst/>
+              </a:prstTxWarp>
+              <a:noAutofit/>
+            </a:bodyPr>
+            <a:lstStyle/>
+            <a:p>
+              <a:pPr algn="ctr"/>
+              <a:endParaRPr lang="fr-FR">
+                <a:ln w="0"/>
+                <a:gradFill>
+                  <a:gsLst>
+                    <a:gs pos="0">
+                      <a:schemeClr val="accent5">
+                        <a:lumMod val="50000"/>
+                      </a:schemeClr>
+                    </a:gs>
+                    <a:gs pos="50000">
+                      <a:schemeClr val="accent5"/>
+                    </a:gs>
+                    <a:gs pos="100000">
+                      <a:schemeClr val="accent5">
+                        <a:lumMod val="60000"/>
+                        <a:lumOff val="40000"/>
+                      </a:schemeClr>
+                    </a:gs>
+                  </a:gsLst>
+                  <a:lin ang="5400000"/>
+                </a:gradFill>
+                <a:effectLst>
+                  <a:glow rad="228600">
+                    <a:schemeClr val="accent1">
+                      <a:satMod val="175000"/>
+                      <a:alpha val="40000"/>
+                    </a:schemeClr>
+                  </a:glow>
+                  <a:reflection blurRad="6350" stA="53000" endA="300" endPos="35500" dir="5400000" sy="-90000" algn="bl" rotWithShape="0"/>
+                </a:effectLst>
+              </a:endParaRPr>
+            </a:p>
+          </p:txBody>
+        </p:sp>
+        <p:sp>
+          <p:nvSpPr>
+            <p:cNvPr id="15" name="Flèche : bas 14">
+              <a:extLst>
+                <a:ext uri="{FF2B5EF4-FFF2-40B4-BE49-F238E27FC236}">
+                  <a16:creationId xmlns:a16="http://schemas.microsoft.com/office/drawing/2014/main" id="{84B267D7-F49C-4246-A12A-6E27E0466ADF}"/>
+                </a:ext>
+              </a:extLst>
+            </p:cNvPr>
+            <p:cNvSpPr/>
+            <p:nvPr/>
+          </p:nvSpPr>
+          <p:spPr>
+            <a:xfrm>
+              <a:off x="1323540" y="1396758"/>
+              <a:ext cx="243280" cy="2718467"/>
+            </a:xfrm>
+            <a:prstGeom prst="downArrow">
+              <a:avLst/>
+            </a:prstGeom>
+            <a:ln w="3175"/>
+          </p:spPr>
+          <p:style>
+            <a:lnRef idx="2">
+              <a:schemeClr val="accent1">
+                <a:shade val="50000"/>
+              </a:schemeClr>
+            </a:lnRef>
+            <a:fillRef idx="1">
+              <a:schemeClr val="accent1"/>
+            </a:fillRef>
+            <a:effectRef idx="0">
+              <a:schemeClr val="accent1"/>
+            </a:effectRef>
+            <a:fontRef idx="minor">
+              <a:schemeClr val="lt1"/>
+            </a:fontRef>
+          </p:style>
+          <p:txBody>
+            <a:bodyPr rot="0" spcFirstLastPara="0" vertOverflow="overflow" horzOverflow="overflow" vert="horz" wrap="square" lIns="91440" tIns="45720" rIns="91440" bIns="45720" numCol="1" spcCol="0" rtlCol="0" fromWordArt="0" anchor="ctr" anchorCtr="0" forceAA="0" compatLnSpc="1">
+              <a:prstTxWarp prst="textNoShape">
+                <a:avLst/>
+              </a:prstTxWarp>
+              <a:noAutofit/>
+            </a:bodyPr>
+            <a:lstStyle/>
+            <a:p>
+              <a:pPr algn="ctr"/>
+              <a:endParaRPr lang="fr-FR">
+                <a:ln w="0"/>
+                <a:gradFill>
+                  <a:gsLst>
+                    <a:gs pos="0">
+                      <a:schemeClr val="accent5">
+                        <a:lumMod val="50000"/>
+                      </a:schemeClr>
+                    </a:gs>
+                    <a:gs pos="50000">
+                      <a:schemeClr val="accent5"/>
+                    </a:gs>
+                    <a:gs pos="100000">
+                      <a:schemeClr val="accent5">
+                        <a:lumMod val="60000"/>
+                        <a:lumOff val="40000"/>
+                      </a:schemeClr>
+                    </a:gs>
+                  </a:gsLst>
+                  <a:lin ang="5400000"/>
+                </a:gradFill>
+                <a:effectLst>
+                  <a:glow rad="228600">
+                    <a:schemeClr val="accent1">
+                      <a:satMod val="175000"/>
+                      <a:alpha val="40000"/>
+                    </a:schemeClr>
+                  </a:glow>
+                  <a:reflection blurRad="6350" stA="53000" endA="300" endPos="35500" dir="5400000" sy="-90000" algn="bl" rotWithShape="0"/>
+                </a:effectLst>
+              </a:endParaRPr>
+            </a:p>
+          </p:txBody>
+        </p:sp>
+      </p:grpSp>
+      <p:grpSp>
+        <p:nvGrpSpPr>
+          <p:cNvPr id="16" name="Groupe 15">
+            <a:extLst>
+              <a:ext uri="{FF2B5EF4-FFF2-40B4-BE49-F238E27FC236}">
+                <a16:creationId xmlns:a16="http://schemas.microsoft.com/office/drawing/2014/main" id="{A1A10F33-7A46-4552-B9F8-7CD65AFA7EDB}"/>
+              </a:ext>
+            </a:extLst>
+          </p:cNvPr>
+          <p:cNvGrpSpPr/>
+          <p:nvPr/>
+        </p:nvGrpSpPr>
+        <p:grpSpPr>
+          <a:xfrm>
+            <a:off x="6411981" y="1396757"/>
+            <a:ext cx="1277360" cy="1980000"/>
+            <a:chOff x="360727" y="1400961"/>
+            <a:chExt cx="1315679" cy="2324582"/>
+          </a:xfrm>
+        </p:grpSpPr>
+        <p:sp>
+          <p:nvSpPr>
+            <p:cNvPr id="17" name="Flèche : bas 16">
+              <a:extLst>
+                <a:ext uri="{FF2B5EF4-FFF2-40B4-BE49-F238E27FC236}">
+                  <a16:creationId xmlns:a16="http://schemas.microsoft.com/office/drawing/2014/main" id="{E357CA83-0738-4289-A156-8C97B56FC694}"/>
+                </a:ext>
+              </a:extLst>
+            </p:cNvPr>
+            <p:cNvSpPr/>
+            <p:nvPr/>
+          </p:nvSpPr>
+          <p:spPr>
+            <a:xfrm>
+              <a:off x="360727" y="1400961"/>
+              <a:ext cx="243279" cy="1939969"/>
+            </a:xfrm>
+            <a:prstGeom prst="downArrow">
+              <a:avLst/>
+            </a:prstGeom>
+            <a:ln w="3175"/>
+          </p:spPr>
+          <p:style>
+            <a:lnRef idx="2">
+              <a:schemeClr val="accent1">
+                <a:shade val="50000"/>
+              </a:schemeClr>
+            </a:lnRef>
+            <a:fillRef idx="1">
+              <a:schemeClr val="accent1"/>
+            </a:fillRef>
+            <a:effectRef idx="0">
+              <a:schemeClr val="accent1"/>
+            </a:effectRef>
+            <a:fontRef idx="minor">
+              <a:schemeClr val="lt1"/>
+            </a:fontRef>
+          </p:style>
+          <p:txBody>
+            <a:bodyPr rot="0" spcFirstLastPara="0" vertOverflow="overflow" horzOverflow="overflow" vert="horz" wrap="square" lIns="91440" tIns="45720" rIns="91440" bIns="45720" numCol="1" spcCol="0" rtlCol="0" fromWordArt="0" anchor="ctr" anchorCtr="0" forceAA="0" compatLnSpc="1">
+              <a:prstTxWarp prst="textNoShape">
+                <a:avLst/>
+              </a:prstTxWarp>
+              <a:noAutofit/>
+            </a:bodyPr>
+            <a:lstStyle/>
+            <a:p>
+              <a:pPr algn="ctr"/>
+              <a:endParaRPr lang="fr-FR" dirty="0">
+                <a:ln w="0"/>
+                <a:gradFill>
+                  <a:gsLst>
+                    <a:gs pos="0">
+                      <a:schemeClr val="accent5">
+                        <a:lumMod val="50000"/>
+                      </a:schemeClr>
+                    </a:gs>
+                    <a:gs pos="50000">
+                      <a:schemeClr val="accent5"/>
+                    </a:gs>
+                    <a:gs pos="100000">
+                      <a:schemeClr val="accent5">
+                        <a:lumMod val="60000"/>
+                        <a:lumOff val="40000"/>
+                      </a:schemeClr>
+                    </a:gs>
+                  </a:gsLst>
+                  <a:lin ang="5400000"/>
+                </a:gradFill>
+                <a:effectLst>
+                  <a:glow rad="228600">
+                    <a:schemeClr val="accent1">
+                      <a:satMod val="175000"/>
+                      <a:alpha val="40000"/>
+                    </a:schemeClr>
+                  </a:glow>
+                  <a:reflection blurRad="6350" stA="53000" endA="300" endPos="35500" dir="5400000" sy="-90000" algn="bl" rotWithShape="0"/>
+                </a:effectLst>
+              </a:endParaRPr>
+            </a:p>
+          </p:txBody>
+        </p:sp>
+        <p:sp>
+          <p:nvSpPr>
+            <p:cNvPr id="18" name="Flèche : bas 17">
+              <a:extLst>
+                <a:ext uri="{FF2B5EF4-FFF2-40B4-BE49-F238E27FC236}">
+                  <a16:creationId xmlns:a16="http://schemas.microsoft.com/office/drawing/2014/main" id="{F0FAEF81-EB7A-4BCB-A03E-B4FF661959B7}"/>
+                </a:ext>
+              </a:extLst>
+            </p:cNvPr>
+            <p:cNvSpPr/>
+            <p:nvPr/>
+          </p:nvSpPr>
+          <p:spPr>
+            <a:xfrm>
+              <a:off x="1433127" y="1400961"/>
+              <a:ext cx="243279" cy="2324582"/>
+            </a:xfrm>
+            <a:prstGeom prst="downArrow">
+              <a:avLst/>
+            </a:prstGeom>
+            <a:ln w="3175"/>
+          </p:spPr>
+          <p:style>
+            <a:lnRef idx="2">
+              <a:schemeClr val="accent1">
+                <a:shade val="50000"/>
+              </a:schemeClr>
+            </a:lnRef>
+            <a:fillRef idx="1">
+              <a:schemeClr val="accent1"/>
+            </a:fillRef>
+            <a:effectRef idx="0">
+              <a:schemeClr val="accent1"/>
+            </a:effectRef>
+            <a:fontRef idx="minor">
+              <a:schemeClr val="lt1"/>
+            </a:fontRef>
+          </p:style>
+          <p:txBody>
+            <a:bodyPr rot="0" spcFirstLastPara="0" vertOverflow="overflow" horzOverflow="overflow" vert="horz" wrap="square" lIns="91440" tIns="45720" rIns="91440" bIns="45720" numCol="1" spcCol="0" rtlCol="0" fromWordArt="0" anchor="ctr" anchorCtr="0" forceAA="0" compatLnSpc="1">
+              <a:prstTxWarp prst="textNoShape">
+                <a:avLst/>
+              </a:prstTxWarp>
+              <a:noAutofit/>
+            </a:bodyPr>
+            <a:lstStyle/>
+            <a:p>
+              <a:pPr algn="ctr"/>
+              <a:endParaRPr lang="fr-FR" dirty="0">
+                <a:ln w="0"/>
+                <a:gradFill>
+                  <a:gsLst>
+                    <a:gs pos="0">
+                      <a:schemeClr val="accent5">
+                        <a:lumMod val="50000"/>
+                      </a:schemeClr>
+                    </a:gs>
+                    <a:gs pos="50000">
+                      <a:schemeClr val="accent5"/>
+                    </a:gs>
+                    <a:gs pos="100000">
+                      <a:schemeClr val="accent5">
+                        <a:lumMod val="60000"/>
+                        <a:lumOff val="40000"/>
+                      </a:schemeClr>
+                    </a:gs>
+                  </a:gsLst>
+                  <a:lin ang="5400000"/>
+                </a:gradFill>
+                <a:effectLst>
+                  <a:glow rad="228600">
+                    <a:schemeClr val="accent1">
+                      <a:satMod val="175000"/>
+                      <a:alpha val="40000"/>
+                    </a:schemeClr>
+                  </a:glow>
+                  <a:reflection blurRad="6350" stA="53000" endA="300" endPos="35500" dir="5400000" sy="-90000" algn="bl" rotWithShape="0"/>
+                </a:effectLst>
+              </a:endParaRPr>
+            </a:p>
+          </p:txBody>
+        </p:sp>
+      </p:grpSp>
+      <p:grpSp>
+        <p:nvGrpSpPr>
+          <p:cNvPr id="19" name="Groupe 18">
+            <a:extLst>
+              <a:ext uri="{FF2B5EF4-FFF2-40B4-BE49-F238E27FC236}">
+                <a16:creationId xmlns:a16="http://schemas.microsoft.com/office/drawing/2014/main" id="{643CCD98-92FA-4DB7-84F4-BF62912DB243}"/>
+              </a:ext>
+            </a:extLst>
+          </p:cNvPr>
+          <p:cNvGrpSpPr/>
+          <p:nvPr/>
+        </p:nvGrpSpPr>
+        <p:grpSpPr>
+          <a:xfrm>
+            <a:off x="8460817" y="1396752"/>
+            <a:ext cx="1211519" cy="2445406"/>
+            <a:chOff x="360727" y="1400958"/>
+            <a:chExt cx="1247863" cy="2870983"/>
+          </a:xfrm>
+        </p:grpSpPr>
+        <p:sp>
+          <p:nvSpPr>
+            <p:cNvPr id="20" name="Flèche : bas 19">
+              <a:extLst>
+                <a:ext uri="{FF2B5EF4-FFF2-40B4-BE49-F238E27FC236}">
+                  <a16:creationId xmlns:a16="http://schemas.microsoft.com/office/drawing/2014/main" id="{ABA84FDC-2ECD-4867-88B3-AF78A41E94B8}"/>
+                </a:ext>
+              </a:extLst>
+            </p:cNvPr>
+            <p:cNvSpPr/>
+            <p:nvPr/>
+          </p:nvSpPr>
+          <p:spPr>
+            <a:xfrm>
+              <a:off x="360727" y="1400959"/>
+              <a:ext cx="243280" cy="2831763"/>
+            </a:xfrm>
+            <a:prstGeom prst="downArrow">
+              <a:avLst/>
+            </a:prstGeom>
+            <a:ln w="3175"/>
+          </p:spPr>
+          <p:style>
+            <a:lnRef idx="2">
+              <a:schemeClr val="accent1">
+                <a:shade val="50000"/>
+              </a:schemeClr>
+            </a:lnRef>
+            <a:fillRef idx="1">
+              <a:schemeClr val="accent1"/>
+            </a:fillRef>
+            <a:effectRef idx="0">
+              <a:schemeClr val="accent1"/>
+            </a:effectRef>
+            <a:fontRef idx="minor">
+              <a:schemeClr val="lt1"/>
+            </a:fontRef>
+          </p:style>
+          <p:txBody>
+            <a:bodyPr rot="0" spcFirstLastPara="0" vertOverflow="overflow" horzOverflow="overflow" vert="horz" wrap="square" lIns="91440" tIns="45720" rIns="91440" bIns="45720" numCol="1" spcCol="0" rtlCol="0" fromWordArt="0" anchor="ctr" anchorCtr="0" forceAA="0" compatLnSpc="1">
+              <a:prstTxWarp prst="textNoShape">
+                <a:avLst/>
+              </a:prstTxWarp>
+              <a:noAutofit/>
+            </a:bodyPr>
+            <a:lstStyle/>
+            <a:p>
+              <a:pPr algn="ctr"/>
+              <a:endParaRPr lang="fr-FR">
+                <a:ln w="0"/>
+                <a:gradFill>
+                  <a:gsLst>
+                    <a:gs pos="0">
+                      <a:schemeClr val="accent5">
+                        <a:lumMod val="50000"/>
+                      </a:schemeClr>
+                    </a:gs>
+                    <a:gs pos="50000">
+                      <a:schemeClr val="accent5"/>
+                    </a:gs>
+                    <a:gs pos="100000">
+                      <a:schemeClr val="accent5">
+                        <a:lumMod val="60000"/>
+                        <a:lumOff val="40000"/>
+                      </a:schemeClr>
+                    </a:gs>
+                  </a:gsLst>
+                  <a:lin ang="5400000"/>
+                </a:gradFill>
+                <a:effectLst>
+                  <a:glow rad="228600">
+                    <a:schemeClr val="accent1">
+                      <a:satMod val="175000"/>
+                      <a:alpha val="40000"/>
+                    </a:schemeClr>
+                  </a:glow>
+                  <a:reflection blurRad="6350" stA="53000" endA="300" endPos="35500" dir="5400000" sy="-90000" algn="bl" rotWithShape="0"/>
+                </a:effectLst>
+              </a:endParaRPr>
+            </a:p>
+          </p:txBody>
+        </p:sp>
+        <p:sp>
+          <p:nvSpPr>
+            <p:cNvPr id="21" name="Flèche : bas 20">
+              <a:extLst>
+                <a:ext uri="{FF2B5EF4-FFF2-40B4-BE49-F238E27FC236}">
+                  <a16:creationId xmlns:a16="http://schemas.microsoft.com/office/drawing/2014/main" id="{31A9A317-DAC9-452B-8766-A4370A9C5644}"/>
+                </a:ext>
+              </a:extLst>
+            </p:cNvPr>
+            <p:cNvSpPr/>
+            <p:nvPr/>
+          </p:nvSpPr>
+          <p:spPr>
+            <a:xfrm>
+              <a:off x="1365310" y="1400958"/>
+              <a:ext cx="243280" cy="2870983"/>
+            </a:xfrm>
+            <a:prstGeom prst="downArrow">
+              <a:avLst/>
+            </a:prstGeom>
+            <a:ln w="3175"/>
+          </p:spPr>
+          <p:style>
+            <a:lnRef idx="2">
+              <a:schemeClr val="accent1">
+                <a:shade val="50000"/>
+              </a:schemeClr>
+            </a:lnRef>
+            <a:fillRef idx="1">
+              <a:schemeClr val="accent1"/>
+            </a:fillRef>
+            <a:effectRef idx="0">
+              <a:schemeClr val="accent1"/>
+            </a:effectRef>
+            <a:fontRef idx="minor">
+              <a:schemeClr val="lt1"/>
+            </a:fontRef>
+          </p:style>
+          <p:txBody>
+            <a:bodyPr rot="0" spcFirstLastPara="0" vertOverflow="overflow" horzOverflow="overflow" vert="horz" wrap="square" lIns="91440" tIns="45720" rIns="91440" bIns="45720" numCol="1" spcCol="0" rtlCol="0" fromWordArt="0" anchor="ctr" anchorCtr="0" forceAA="0" compatLnSpc="1">
+              <a:prstTxWarp prst="textNoShape">
+                <a:avLst/>
+              </a:prstTxWarp>
+              <a:noAutofit/>
+            </a:bodyPr>
+            <a:lstStyle/>
+            <a:p>
+              <a:pPr algn="ctr"/>
+              <a:endParaRPr lang="fr-FR">
+                <a:ln w="0"/>
+                <a:gradFill>
+                  <a:gsLst>
+                    <a:gs pos="0">
+                      <a:schemeClr val="accent5">
+                        <a:lumMod val="50000"/>
+                      </a:schemeClr>
+                    </a:gs>
+                    <a:gs pos="50000">
+                      <a:schemeClr val="accent5"/>
+                    </a:gs>
+                    <a:gs pos="100000">
+                      <a:schemeClr val="accent5">
+                        <a:lumMod val="60000"/>
+                        <a:lumOff val="40000"/>
+                      </a:schemeClr>
+                    </a:gs>
+                  </a:gsLst>
+                  <a:lin ang="5400000"/>
+                </a:gradFill>
+                <a:effectLst>
+                  <a:glow rad="228600">
+                    <a:schemeClr val="accent1">
+                      <a:satMod val="175000"/>
+                      <a:alpha val="40000"/>
+                    </a:schemeClr>
+                  </a:glow>
+                  <a:reflection blurRad="6350" stA="53000" endA="300" endPos="35500" dir="5400000" sy="-90000" algn="bl" rotWithShape="0"/>
+                </a:effectLst>
+              </a:endParaRPr>
+            </a:p>
+          </p:txBody>
+        </p:sp>
+      </p:grpSp>
+      <p:grpSp>
+        <p:nvGrpSpPr>
+          <p:cNvPr id="23" name="Groupe 22">
+            <a:extLst>
+              <a:ext uri="{FF2B5EF4-FFF2-40B4-BE49-F238E27FC236}">
+                <a16:creationId xmlns:a16="http://schemas.microsoft.com/office/drawing/2014/main" id="{43248F53-D88D-4B52-8A22-EA0B4408F486}"/>
+              </a:ext>
+            </a:extLst>
+          </p:cNvPr>
+          <p:cNvGrpSpPr/>
+          <p:nvPr/>
+        </p:nvGrpSpPr>
+        <p:grpSpPr>
+          <a:xfrm>
+            <a:off x="10407233" y="1396752"/>
+            <a:ext cx="1211519" cy="2520000"/>
+            <a:chOff x="360727" y="1400958"/>
+            <a:chExt cx="1247863" cy="2958558"/>
+          </a:xfrm>
+        </p:grpSpPr>
+        <p:sp>
+          <p:nvSpPr>
+            <p:cNvPr id="24" name="Flèche : bas 23">
+              <a:extLst>
+                <a:ext uri="{FF2B5EF4-FFF2-40B4-BE49-F238E27FC236}">
+                  <a16:creationId xmlns:a16="http://schemas.microsoft.com/office/drawing/2014/main" id="{24E1F9FB-CC48-46DD-8F93-2CE2C6612457}"/>
+                </a:ext>
+              </a:extLst>
+            </p:cNvPr>
+            <p:cNvSpPr/>
+            <p:nvPr/>
+          </p:nvSpPr>
+          <p:spPr>
+            <a:xfrm>
+              <a:off x="360727" y="1400959"/>
+              <a:ext cx="243280" cy="2802038"/>
+            </a:xfrm>
+            <a:prstGeom prst="downArrow">
+              <a:avLst/>
+            </a:prstGeom>
+            <a:ln w="3175"/>
+          </p:spPr>
+          <p:style>
+            <a:lnRef idx="2">
+              <a:schemeClr val="accent1">
+                <a:shade val="50000"/>
+              </a:schemeClr>
+            </a:lnRef>
+            <a:fillRef idx="1">
+              <a:schemeClr val="accent1"/>
+            </a:fillRef>
+            <a:effectRef idx="0">
+              <a:schemeClr val="accent1"/>
+            </a:effectRef>
+            <a:fontRef idx="minor">
+              <a:schemeClr val="lt1"/>
+            </a:fontRef>
+          </p:style>
+          <p:txBody>
+            <a:bodyPr rot="0" spcFirstLastPara="0" vertOverflow="overflow" horzOverflow="overflow" vert="horz" wrap="square" lIns="91440" tIns="45720" rIns="91440" bIns="45720" numCol="1" spcCol="0" rtlCol="0" fromWordArt="0" anchor="ctr" anchorCtr="0" forceAA="0" compatLnSpc="1">
+              <a:prstTxWarp prst="textNoShape">
+                <a:avLst/>
+              </a:prstTxWarp>
+              <a:noAutofit/>
+            </a:bodyPr>
+            <a:lstStyle/>
+            <a:p>
+              <a:pPr algn="ctr"/>
+              <a:endParaRPr lang="fr-FR">
+                <a:ln w="0"/>
+                <a:gradFill>
+                  <a:gsLst>
+                    <a:gs pos="0">
+                      <a:schemeClr val="accent5">
+                        <a:lumMod val="50000"/>
+                      </a:schemeClr>
+                    </a:gs>
+                    <a:gs pos="50000">
+                      <a:schemeClr val="accent5"/>
+                    </a:gs>
+                    <a:gs pos="100000">
+                      <a:schemeClr val="accent5">
+                        <a:lumMod val="60000"/>
+                        <a:lumOff val="40000"/>
+                      </a:schemeClr>
+                    </a:gs>
+                  </a:gsLst>
+                  <a:lin ang="5400000"/>
+                </a:gradFill>
+                <a:effectLst>
+                  <a:glow rad="228600">
+                    <a:schemeClr val="accent1">
+                      <a:satMod val="175000"/>
+                      <a:alpha val="40000"/>
+                    </a:schemeClr>
+                  </a:glow>
+                  <a:reflection blurRad="6350" stA="53000" endA="300" endPos="35500" dir="5400000" sy="-90000" algn="bl" rotWithShape="0"/>
+                </a:effectLst>
+              </a:endParaRPr>
+            </a:p>
+          </p:txBody>
+        </p:sp>
+        <p:sp>
+          <p:nvSpPr>
+            <p:cNvPr id="25" name="Flèche : bas 24">
+              <a:extLst>
+                <a:ext uri="{FF2B5EF4-FFF2-40B4-BE49-F238E27FC236}">
+                  <a16:creationId xmlns:a16="http://schemas.microsoft.com/office/drawing/2014/main" id="{F7DE9689-888B-4A3A-898E-F40659A2B07B}"/>
+                </a:ext>
+              </a:extLst>
+            </p:cNvPr>
+            <p:cNvSpPr/>
+            <p:nvPr/>
+          </p:nvSpPr>
+          <p:spPr>
+            <a:xfrm>
+              <a:off x="1365310" y="1400958"/>
+              <a:ext cx="243280" cy="2958558"/>
+            </a:xfrm>
+            <a:prstGeom prst="downArrow">
+              <a:avLst/>
+            </a:prstGeom>
+            <a:ln w="3175"/>
+          </p:spPr>
+          <p:style>
+            <a:lnRef idx="2">
+              <a:schemeClr val="accent1">
+                <a:shade val="50000"/>
+              </a:schemeClr>
+            </a:lnRef>
+            <a:fillRef idx="1">
+              <a:schemeClr val="accent1"/>
+            </a:fillRef>
+            <a:effectRef idx="0">
+              <a:schemeClr val="accent1"/>
+            </a:effectRef>
+            <a:fontRef idx="minor">
+              <a:schemeClr val="lt1"/>
+            </a:fontRef>
+          </p:style>
+          <p:txBody>
+            <a:bodyPr rot="0" spcFirstLastPara="0" vertOverflow="overflow" horzOverflow="overflow" vert="horz" wrap="square" lIns="91440" tIns="45720" rIns="91440" bIns="45720" numCol="1" spcCol="0" rtlCol="0" fromWordArt="0" anchor="ctr" anchorCtr="0" forceAA="0" compatLnSpc="1">
+              <a:prstTxWarp prst="textNoShape">
+                <a:avLst/>
+              </a:prstTxWarp>
+              <a:noAutofit/>
+            </a:bodyPr>
+            <a:lstStyle/>
+            <a:p>
+              <a:pPr algn="ctr"/>
+              <a:endParaRPr lang="fr-FR">
+                <a:ln w="0"/>
+                <a:gradFill>
+                  <a:gsLst>
+                    <a:gs pos="0">
+                      <a:schemeClr val="accent5">
+                        <a:lumMod val="50000"/>
+                      </a:schemeClr>
+                    </a:gs>
+                    <a:gs pos="50000">
+                      <a:schemeClr val="accent5"/>
+                    </a:gs>
+                    <a:gs pos="100000">
+                      <a:schemeClr val="accent5">
+                        <a:lumMod val="60000"/>
+                        <a:lumOff val="40000"/>
+                      </a:schemeClr>
+                    </a:gs>
+                  </a:gsLst>
+                  <a:lin ang="5400000"/>
+                </a:gradFill>
+                <a:effectLst>
+                  <a:glow rad="228600">
+                    <a:schemeClr val="accent1">
+                      <a:satMod val="175000"/>
+                      <a:alpha val="40000"/>
+                    </a:schemeClr>
+                  </a:glow>
+                  <a:reflection blurRad="6350" stA="53000" endA="300" endPos="35500" dir="5400000" sy="-90000" algn="bl" rotWithShape="0"/>
+                </a:effectLst>
+              </a:endParaRPr>
+            </a:p>
+          </p:txBody>
+        </p:sp>
+      </p:grpSp>
+      <p:sp>
+        <p:nvSpPr>
+          <p:cNvPr id="26" name="ZoneTexte 25">
+            <a:extLst>
+              <a:ext uri="{FF2B5EF4-FFF2-40B4-BE49-F238E27FC236}">
+                <a16:creationId xmlns:a16="http://schemas.microsoft.com/office/drawing/2014/main" id="{93736E60-2135-4164-874B-14213AE25A7D}"/>
+              </a:ext>
+            </a:extLst>
+          </p:cNvPr>
+          <p:cNvSpPr txBox="1"/>
+          <p:nvPr/>
+        </p:nvSpPr>
+        <p:spPr>
+          <a:xfrm>
+            <a:off x="1111885" y="2116600"/>
+            <a:ext cx="972000" cy="1446550"/>
+          </a:xfrm>
+          <a:prstGeom prst="rect">
+            <a:avLst/>
+          </a:prstGeom>
+          <a:noFill/>
+        </p:spPr>
+        <p:txBody>
+          <a:bodyPr wrap="square" rtlCol="0">
+            <a:spAutoFit/>
+          </a:bodyPr>
+          <a:lstStyle/>
+          <a:p>
+            <a:pPr algn="ctr"/>
+            <a:r>
+              <a:rPr lang="fr-FR" sz="1100" dirty="0"/>
+              <a:t>Début des tests</a:t>
+            </a:r>
+          </a:p>
+          <a:p>
+            <a:pPr algn="ctr"/>
+            <a:endParaRPr lang="fr-FR" sz="1100" dirty="0"/>
+          </a:p>
+          <a:p>
+            <a:pPr algn="ctr"/>
+            <a:r>
+              <a:rPr lang="fr-FR" sz="1100" dirty="0"/>
+              <a:t>Modifications mineures</a:t>
+            </a:r>
+          </a:p>
+        </p:txBody>
+      </p:sp>
+      <p:sp>
+        <p:nvSpPr>
+          <p:cNvPr id="27" name="ZoneTexte 26">
+            <a:extLst>
+              <a:ext uri="{FF2B5EF4-FFF2-40B4-BE49-F238E27FC236}">
+                <a16:creationId xmlns:a16="http://schemas.microsoft.com/office/drawing/2014/main" id="{F3007B15-9B97-47E8-A537-742ABBAD2457}"/>
+              </a:ext>
+            </a:extLst>
+          </p:cNvPr>
+          <p:cNvSpPr txBox="1"/>
+          <p:nvPr/>
+        </p:nvSpPr>
+        <p:spPr>
+          <a:xfrm>
+            <a:off x="-62458" y="677183"/>
+            <a:ext cx="534121" cy="261610"/>
+          </a:xfrm>
+          <a:prstGeom prst="rect">
+            <a:avLst/>
+          </a:prstGeom>
+          <a:noFill/>
+        </p:spPr>
+        <p:txBody>
+          <a:bodyPr wrap="none" rtlCol="0">
+            <a:spAutoFit/>
+          </a:bodyPr>
+          <a:lstStyle/>
+          <a:p>
+            <a:r>
+              <a:rPr lang="fr-FR" sz="1100" b="1" dirty="0">
+                <a:solidFill>
+                  <a:srgbClr val="00B0F0"/>
+                </a:solidFill>
+              </a:rPr>
+              <a:t>17/02</a:t>
+            </a:r>
+          </a:p>
+        </p:txBody>
+      </p:sp>
+      <p:sp>
+        <p:nvSpPr>
+          <p:cNvPr id="28" name="ZoneTexte 27">
+            <a:extLst>
+              <a:ext uri="{FF2B5EF4-FFF2-40B4-BE49-F238E27FC236}">
+                <a16:creationId xmlns:a16="http://schemas.microsoft.com/office/drawing/2014/main" id="{DF291DB8-45EA-4710-915F-A47D012192D1}"/>
+              </a:ext>
+            </a:extLst>
+          </p:cNvPr>
+          <p:cNvSpPr txBox="1"/>
+          <p:nvPr/>
+        </p:nvSpPr>
+        <p:spPr>
+          <a:xfrm>
+            <a:off x="524503" y="677183"/>
+            <a:ext cx="1018227" cy="261610"/>
+          </a:xfrm>
+          <a:prstGeom prst="rect">
+            <a:avLst/>
+          </a:prstGeom>
+          <a:noFill/>
+        </p:spPr>
+        <p:txBody>
+          <a:bodyPr wrap="none" rtlCol="0">
+            <a:spAutoFit/>
+          </a:bodyPr>
+          <a:lstStyle/>
+          <a:p>
+            <a:r>
+              <a:rPr lang="fr-FR" sz="1100" b="1" dirty="0">
+                <a:solidFill>
+                  <a:srgbClr val="00B0F0"/>
+                </a:solidFill>
+              </a:rPr>
+              <a:t>03/03 </a:t>
+            </a:r>
+            <a:r>
+              <a:rPr lang="fr-FR" sz="1100" b="1" dirty="0">
+                <a:solidFill>
+                  <a:srgbClr val="FF0000"/>
+                </a:solidFill>
+              </a:rPr>
+              <a:t>–</a:t>
+            </a:r>
+            <a:r>
+              <a:rPr lang="fr-FR" sz="1100" b="1" dirty="0">
+                <a:solidFill>
+                  <a:srgbClr val="00B0F0"/>
+                </a:solidFill>
+              </a:rPr>
+              <a:t> 06/03</a:t>
+            </a:r>
+          </a:p>
+        </p:txBody>
+      </p:sp>
+      <p:sp>
+        <p:nvSpPr>
+          <p:cNvPr id="29" name="ZoneTexte 28">
+            <a:extLst>
+              <a:ext uri="{FF2B5EF4-FFF2-40B4-BE49-F238E27FC236}">
+                <a16:creationId xmlns:a16="http://schemas.microsoft.com/office/drawing/2014/main" id="{A372C0A1-3898-4DCD-9104-EEC8FF2EEDE3}"/>
+              </a:ext>
+            </a:extLst>
+          </p:cNvPr>
+          <p:cNvSpPr txBox="1"/>
+          <p:nvPr/>
+        </p:nvSpPr>
+        <p:spPr>
+          <a:xfrm>
+            <a:off x="1521366" y="677183"/>
+            <a:ext cx="1018227" cy="261610"/>
+          </a:xfrm>
+          <a:prstGeom prst="rect">
+            <a:avLst/>
+          </a:prstGeom>
+          <a:noFill/>
+        </p:spPr>
+        <p:txBody>
+          <a:bodyPr wrap="none" rtlCol="0">
+            <a:spAutoFit/>
+          </a:bodyPr>
+          <a:lstStyle/>
+          <a:p>
+            <a:r>
+              <a:rPr lang="fr-FR" sz="1100" b="1" dirty="0">
+                <a:solidFill>
+                  <a:srgbClr val="00B0F0"/>
+                </a:solidFill>
+              </a:rPr>
+              <a:t>17/03</a:t>
+            </a:r>
+            <a:r>
+              <a:rPr lang="fr-FR" sz="1100" b="1" dirty="0">
+                <a:solidFill>
+                  <a:srgbClr val="FF0000"/>
+                </a:solidFill>
+              </a:rPr>
+              <a:t> – </a:t>
+            </a:r>
+            <a:r>
+              <a:rPr lang="fr-FR" sz="1100" b="1" dirty="0">
+                <a:solidFill>
+                  <a:srgbClr val="00B0F0"/>
+                </a:solidFill>
+              </a:rPr>
+              <a:t>20/03</a:t>
+            </a:r>
+          </a:p>
+        </p:txBody>
+      </p:sp>
+      <p:sp>
+        <p:nvSpPr>
+          <p:cNvPr id="30" name="ZoneTexte 29">
+            <a:extLst>
+              <a:ext uri="{FF2B5EF4-FFF2-40B4-BE49-F238E27FC236}">
+                <a16:creationId xmlns:a16="http://schemas.microsoft.com/office/drawing/2014/main" id="{6859252E-46AF-4514-BB1A-A76167ABD434}"/>
+              </a:ext>
+            </a:extLst>
+          </p:cNvPr>
+          <p:cNvSpPr txBox="1"/>
+          <p:nvPr/>
+        </p:nvSpPr>
+        <p:spPr>
+          <a:xfrm>
+            <a:off x="2514585" y="677183"/>
+            <a:ext cx="1018227" cy="261610"/>
+          </a:xfrm>
+          <a:prstGeom prst="rect">
+            <a:avLst/>
+          </a:prstGeom>
+          <a:noFill/>
+        </p:spPr>
+        <p:txBody>
+          <a:bodyPr wrap="none" rtlCol="0">
+            <a:spAutoFit/>
+          </a:bodyPr>
+          <a:lstStyle/>
+          <a:p>
+            <a:r>
+              <a:rPr lang="fr-FR" sz="1100" b="1" dirty="0">
+                <a:solidFill>
+                  <a:srgbClr val="00B0F0"/>
+                </a:solidFill>
+              </a:rPr>
+              <a:t>31/03 </a:t>
+            </a:r>
+            <a:r>
+              <a:rPr lang="fr-FR" sz="1100" b="1" dirty="0">
+                <a:solidFill>
+                  <a:srgbClr val="FF0000"/>
+                </a:solidFill>
+              </a:rPr>
+              <a:t>–</a:t>
+            </a:r>
+            <a:r>
+              <a:rPr lang="fr-FR" sz="1100" b="1" dirty="0">
+                <a:solidFill>
+                  <a:srgbClr val="00B0F0"/>
+                </a:solidFill>
+              </a:rPr>
+              <a:t> 03/04</a:t>
+            </a:r>
+          </a:p>
+        </p:txBody>
+      </p:sp>
+      <p:sp>
+        <p:nvSpPr>
+          <p:cNvPr id="31" name="ZoneTexte 30">
+            <a:extLst>
+              <a:ext uri="{FF2B5EF4-FFF2-40B4-BE49-F238E27FC236}">
+                <a16:creationId xmlns:a16="http://schemas.microsoft.com/office/drawing/2014/main" id="{811E54CB-BA2A-4713-82DC-189676ED65CB}"/>
+              </a:ext>
+            </a:extLst>
+          </p:cNvPr>
+          <p:cNvSpPr txBox="1"/>
+          <p:nvPr/>
+        </p:nvSpPr>
+        <p:spPr>
+          <a:xfrm>
+            <a:off x="3509626" y="672974"/>
+            <a:ext cx="1018227" cy="261610"/>
+          </a:xfrm>
+          <a:prstGeom prst="rect">
+            <a:avLst/>
+          </a:prstGeom>
+          <a:noFill/>
+        </p:spPr>
+        <p:txBody>
+          <a:bodyPr wrap="none" rtlCol="0">
+            <a:spAutoFit/>
+          </a:bodyPr>
+          <a:lstStyle/>
+          <a:p>
+            <a:r>
+              <a:rPr lang="fr-FR" sz="1100" b="1" dirty="0">
+                <a:solidFill>
+                  <a:srgbClr val="00B0F0"/>
+                </a:solidFill>
+              </a:rPr>
+              <a:t>14/04 </a:t>
+            </a:r>
+            <a:r>
+              <a:rPr lang="fr-FR" sz="1100" b="1" dirty="0">
+                <a:solidFill>
+                  <a:srgbClr val="FF0000"/>
+                </a:solidFill>
+              </a:rPr>
+              <a:t>–</a:t>
+            </a:r>
+            <a:r>
+              <a:rPr lang="fr-FR" sz="1100" b="1" dirty="0">
+                <a:solidFill>
+                  <a:srgbClr val="00B0F0"/>
+                </a:solidFill>
+              </a:rPr>
+              <a:t> 18/04</a:t>
+            </a:r>
+          </a:p>
+        </p:txBody>
+      </p:sp>
+      <p:sp>
+        <p:nvSpPr>
+          <p:cNvPr id="32" name="ZoneTexte 31">
+            <a:extLst>
+              <a:ext uri="{FF2B5EF4-FFF2-40B4-BE49-F238E27FC236}">
+                <a16:creationId xmlns:a16="http://schemas.microsoft.com/office/drawing/2014/main" id="{ED469168-5F9D-4B81-B491-245DE0A45A26}"/>
+              </a:ext>
+            </a:extLst>
+          </p:cNvPr>
+          <p:cNvSpPr txBox="1"/>
+          <p:nvPr/>
+        </p:nvSpPr>
+        <p:spPr>
+          <a:xfrm>
+            <a:off x="4504667" y="674829"/>
+            <a:ext cx="1018227" cy="261610"/>
+          </a:xfrm>
+          <a:prstGeom prst="rect">
+            <a:avLst/>
+          </a:prstGeom>
+          <a:noFill/>
+        </p:spPr>
+        <p:txBody>
+          <a:bodyPr wrap="none" rtlCol="0">
+            <a:spAutoFit/>
+          </a:bodyPr>
+          <a:lstStyle/>
+          <a:p>
+            <a:r>
+              <a:rPr lang="fr-FR" sz="1100" b="1" dirty="0">
+                <a:solidFill>
+                  <a:srgbClr val="00B0F0"/>
+                </a:solidFill>
+              </a:rPr>
+              <a:t>28/04 </a:t>
+            </a:r>
+            <a:r>
+              <a:rPr lang="fr-FR" sz="1100" b="1" dirty="0">
+                <a:solidFill>
+                  <a:srgbClr val="FF0000"/>
+                </a:solidFill>
+              </a:rPr>
+              <a:t>– </a:t>
+            </a:r>
+            <a:r>
+              <a:rPr lang="fr-FR" sz="1100" b="1" dirty="0">
+                <a:solidFill>
+                  <a:srgbClr val="00B0F0"/>
+                </a:solidFill>
+              </a:rPr>
+              <a:t>02/05</a:t>
+            </a:r>
+          </a:p>
+        </p:txBody>
+      </p:sp>
+      <p:sp>
+        <p:nvSpPr>
+          <p:cNvPr id="33" name="ZoneTexte 32">
+            <a:extLst>
+              <a:ext uri="{FF2B5EF4-FFF2-40B4-BE49-F238E27FC236}">
+                <a16:creationId xmlns:a16="http://schemas.microsoft.com/office/drawing/2014/main" id="{A7680FAD-FCE5-401A-B7CB-49E95A9898D8}"/>
+              </a:ext>
+            </a:extLst>
+          </p:cNvPr>
+          <p:cNvSpPr txBox="1"/>
+          <p:nvPr/>
+        </p:nvSpPr>
+        <p:spPr>
+          <a:xfrm>
+            <a:off x="5486391" y="677183"/>
+            <a:ext cx="1018227" cy="261610"/>
+          </a:xfrm>
+          <a:prstGeom prst="rect">
+            <a:avLst/>
+          </a:prstGeom>
+          <a:noFill/>
+        </p:spPr>
+        <p:txBody>
+          <a:bodyPr wrap="none" rtlCol="0">
+            <a:spAutoFit/>
+          </a:bodyPr>
+          <a:lstStyle/>
+          <a:p>
+            <a:r>
+              <a:rPr lang="fr-FR" sz="1100" b="1" dirty="0">
+                <a:solidFill>
+                  <a:srgbClr val="00B0F0"/>
+                </a:solidFill>
+              </a:rPr>
+              <a:t>12/05 </a:t>
+            </a:r>
+            <a:r>
+              <a:rPr lang="fr-FR" sz="1100" b="1" dirty="0">
+                <a:solidFill>
+                  <a:srgbClr val="FF0000"/>
+                </a:solidFill>
+              </a:rPr>
+              <a:t>– </a:t>
+            </a:r>
+            <a:r>
+              <a:rPr lang="fr-FR" sz="1100" b="1" dirty="0">
+                <a:solidFill>
+                  <a:srgbClr val="00B0F0"/>
+                </a:solidFill>
+              </a:rPr>
+              <a:t>15/05</a:t>
+            </a:r>
+          </a:p>
+        </p:txBody>
+      </p:sp>
+      <p:sp>
+        <p:nvSpPr>
+          <p:cNvPr id="34" name="ZoneTexte 33">
+            <a:extLst>
+              <a:ext uri="{FF2B5EF4-FFF2-40B4-BE49-F238E27FC236}">
+                <a16:creationId xmlns:a16="http://schemas.microsoft.com/office/drawing/2014/main" id="{F6E084F4-9FF3-43DB-B0CE-2EC6C774D710}"/>
+              </a:ext>
+            </a:extLst>
+          </p:cNvPr>
+          <p:cNvSpPr txBox="1"/>
+          <p:nvPr/>
+        </p:nvSpPr>
+        <p:spPr>
+          <a:xfrm>
+            <a:off x="6484656" y="677183"/>
+            <a:ext cx="1018227" cy="261610"/>
+          </a:xfrm>
+          <a:prstGeom prst="rect">
+            <a:avLst/>
+          </a:prstGeom>
+          <a:noFill/>
+        </p:spPr>
+        <p:txBody>
+          <a:bodyPr wrap="none" rtlCol="0">
+            <a:spAutoFit/>
+          </a:bodyPr>
+          <a:lstStyle/>
+          <a:p>
+            <a:r>
+              <a:rPr lang="fr-FR" sz="1100" b="1" dirty="0">
+                <a:solidFill>
+                  <a:srgbClr val="00B0F0"/>
+                </a:solidFill>
+              </a:rPr>
+              <a:t>24/05 </a:t>
+            </a:r>
+            <a:r>
+              <a:rPr lang="fr-FR" sz="1100" b="1" dirty="0">
+                <a:solidFill>
+                  <a:srgbClr val="FF0000"/>
+                </a:solidFill>
+              </a:rPr>
+              <a:t>–</a:t>
+            </a:r>
+            <a:r>
+              <a:rPr lang="fr-FR" sz="1100" b="1" dirty="0">
+                <a:solidFill>
+                  <a:srgbClr val="00B0F0"/>
+                </a:solidFill>
+              </a:rPr>
+              <a:t> 29/05</a:t>
+            </a:r>
+          </a:p>
+        </p:txBody>
+      </p:sp>
+      <p:sp>
+        <p:nvSpPr>
+          <p:cNvPr id="35" name="ZoneTexte 34">
+            <a:extLst>
+              <a:ext uri="{FF2B5EF4-FFF2-40B4-BE49-F238E27FC236}">
+                <a16:creationId xmlns:a16="http://schemas.microsoft.com/office/drawing/2014/main" id="{DA39CE05-9FF4-4091-9AC5-060914B72A25}"/>
+              </a:ext>
+            </a:extLst>
+          </p:cNvPr>
+          <p:cNvSpPr txBox="1"/>
+          <p:nvPr/>
+        </p:nvSpPr>
+        <p:spPr>
+          <a:xfrm>
+            <a:off x="7478698" y="677183"/>
+            <a:ext cx="1018227" cy="261610"/>
+          </a:xfrm>
+          <a:prstGeom prst="rect">
+            <a:avLst/>
+          </a:prstGeom>
+          <a:noFill/>
+        </p:spPr>
+        <p:txBody>
+          <a:bodyPr wrap="none" rtlCol="0">
+            <a:spAutoFit/>
+          </a:bodyPr>
+          <a:lstStyle/>
+          <a:p>
+            <a:r>
+              <a:rPr lang="fr-FR" sz="1100" b="1" dirty="0">
+                <a:solidFill>
+                  <a:srgbClr val="00B0F0"/>
+                </a:solidFill>
+              </a:rPr>
+              <a:t>09/06 </a:t>
+            </a:r>
+            <a:r>
+              <a:rPr lang="fr-FR" sz="1100" b="1" dirty="0">
+                <a:solidFill>
+                  <a:srgbClr val="FF0000"/>
+                </a:solidFill>
+              </a:rPr>
+              <a:t>–</a:t>
+            </a:r>
+            <a:r>
+              <a:rPr lang="fr-FR" sz="1100" b="1" dirty="0">
+                <a:solidFill>
+                  <a:srgbClr val="00B0F0"/>
+                </a:solidFill>
+              </a:rPr>
+              <a:t> 12/06</a:t>
+            </a:r>
+          </a:p>
+        </p:txBody>
+      </p:sp>
+      <p:sp>
+        <p:nvSpPr>
+          <p:cNvPr id="36" name="ZoneTexte 35">
+            <a:extLst>
+              <a:ext uri="{FF2B5EF4-FFF2-40B4-BE49-F238E27FC236}">
+                <a16:creationId xmlns:a16="http://schemas.microsoft.com/office/drawing/2014/main" id="{2CE57B35-C44E-4A91-B8DA-2022D0E4A439}"/>
+              </a:ext>
+            </a:extLst>
+          </p:cNvPr>
+          <p:cNvSpPr txBox="1"/>
+          <p:nvPr/>
+        </p:nvSpPr>
+        <p:spPr>
+          <a:xfrm>
+            <a:off x="8472014" y="676918"/>
+            <a:ext cx="1018227" cy="261610"/>
+          </a:xfrm>
+          <a:prstGeom prst="rect">
+            <a:avLst/>
+          </a:prstGeom>
+          <a:noFill/>
+        </p:spPr>
+        <p:txBody>
+          <a:bodyPr wrap="none" rtlCol="0">
+            <a:spAutoFit/>
+          </a:bodyPr>
+          <a:lstStyle/>
+          <a:p>
+            <a:r>
+              <a:rPr lang="fr-FR" sz="1100" b="1" dirty="0">
+                <a:solidFill>
+                  <a:srgbClr val="00B0F0"/>
+                </a:solidFill>
+              </a:rPr>
+              <a:t>23/06 </a:t>
+            </a:r>
+            <a:r>
+              <a:rPr lang="fr-FR" sz="1100" b="1" dirty="0">
+                <a:solidFill>
+                  <a:srgbClr val="FF0000"/>
+                </a:solidFill>
+              </a:rPr>
+              <a:t>–</a:t>
+            </a:r>
+            <a:r>
+              <a:rPr lang="fr-FR" sz="1100" b="1" dirty="0">
+                <a:solidFill>
+                  <a:srgbClr val="00B0F0"/>
+                </a:solidFill>
+              </a:rPr>
+              <a:t> 26/06</a:t>
+            </a:r>
+          </a:p>
+        </p:txBody>
+      </p:sp>
+      <p:sp>
+        <p:nvSpPr>
+          <p:cNvPr id="37" name="ZoneTexte 36">
+            <a:extLst>
+              <a:ext uri="{FF2B5EF4-FFF2-40B4-BE49-F238E27FC236}">
+                <a16:creationId xmlns:a16="http://schemas.microsoft.com/office/drawing/2014/main" id="{7E2B844E-F592-4731-A5B5-80D92B744CBE}"/>
+              </a:ext>
+            </a:extLst>
+          </p:cNvPr>
+          <p:cNvSpPr txBox="1"/>
+          <p:nvPr/>
+        </p:nvSpPr>
+        <p:spPr>
+          <a:xfrm>
+            <a:off x="9472457" y="669824"/>
+            <a:ext cx="1018227" cy="261610"/>
+          </a:xfrm>
+          <a:prstGeom prst="rect">
+            <a:avLst/>
+          </a:prstGeom>
+          <a:noFill/>
+        </p:spPr>
+        <p:txBody>
+          <a:bodyPr wrap="none" rtlCol="0">
+            <a:spAutoFit/>
+          </a:bodyPr>
+          <a:lstStyle/>
+          <a:p>
+            <a:r>
+              <a:rPr lang="fr-FR" sz="1100" b="1" dirty="0">
+                <a:solidFill>
+                  <a:srgbClr val="00B0F0"/>
+                </a:solidFill>
+              </a:rPr>
+              <a:t>07/07</a:t>
+            </a:r>
+            <a:r>
+              <a:rPr lang="fr-FR" sz="1100" b="1" dirty="0">
+                <a:solidFill>
+                  <a:srgbClr val="FF0000"/>
+                </a:solidFill>
+              </a:rPr>
+              <a:t> – </a:t>
+            </a:r>
+            <a:r>
+              <a:rPr lang="fr-FR" sz="1100" b="1" dirty="0">
+                <a:solidFill>
+                  <a:srgbClr val="00B0F0"/>
+                </a:solidFill>
+              </a:rPr>
+              <a:t>10/07</a:t>
+            </a:r>
+          </a:p>
+        </p:txBody>
+      </p:sp>
+      <p:sp>
+        <p:nvSpPr>
+          <p:cNvPr id="38" name="ZoneTexte 37">
+            <a:extLst>
+              <a:ext uri="{FF2B5EF4-FFF2-40B4-BE49-F238E27FC236}">
+                <a16:creationId xmlns:a16="http://schemas.microsoft.com/office/drawing/2014/main" id="{6E88423F-4414-41FA-B375-56CF78A799B2}"/>
+              </a:ext>
+            </a:extLst>
+          </p:cNvPr>
+          <p:cNvSpPr txBox="1"/>
+          <p:nvPr/>
+        </p:nvSpPr>
+        <p:spPr>
+          <a:xfrm>
+            <a:off x="10462865" y="669824"/>
+            <a:ext cx="1018227" cy="261610"/>
+          </a:xfrm>
+          <a:prstGeom prst="rect">
+            <a:avLst/>
+          </a:prstGeom>
+          <a:noFill/>
+        </p:spPr>
+        <p:txBody>
+          <a:bodyPr wrap="none" rtlCol="0">
+            <a:spAutoFit/>
+          </a:bodyPr>
+          <a:lstStyle/>
+          <a:p>
+            <a:r>
+              <a:rPr lang="fr-FR" sz="1100" b="1" dirty="0">
+                <a:solidFill>
+                  <a:srgbClr val="00B0F0"/>
+                </a:solidFill>
+              </a:rPr>
+              <a:t>21/07</a:t>
+            </a:r>
+            <a:r>
+              <a:rPr lang="fr-FR" sz="1100" b="1" dirty="0">
+                <a:solidFill>
+                  <a:srgbClr val="FF0000"/>
+                </a:solidFill>
+              </a:rPr>
+              <a:t> – </a:t>
+            </a:r>
+            <a:r>
+              <a:rPr lang="fr-FR" sz="1100" b="1" dirty="0">
+                <a:solidFill>
+                  <a:srgbClr val="00B0F0"/>
+                </a:solidFill>
+              </a:rPr>
+              <a:t>24/07</a:t>
+            </a:r>
+          </a:p>
+        </p:txBody>
+      </p:sp>
+      <p:sp>
+        <p:nvSpPr>
+          <p:cNvPr id="39" name="ZoneTexte 38">
+            <a:extLst>
+              <a:ext uri="{FF2B5EF4-FFF2-40B4-BE49-F238E27FC236}">
+                <a16:creationId xmlns:a16="http://schemas.microsoft.com/office/drawing/2014/main" id="{3B55BEAF-B62F-4EDB-919A-6E32BCAF609F}"/>
+              </a:ext>
+            </a:extLst>
+          </p:cNvPr>
+          <p:cNvSpPr txBox="1"/>
+          <p:nvPr/>
+        </p:nvSpPr>
+        <p:spPr>
+          <a:xfrm>
+            <a:off x="11667497" y="668529"/>
+            <a:ext cx="534121" cy="261610"/>
+          </a:xfrm>
+          <a:prstGeom prst="rect">
+            <a:avLst/>
+          </a:prstGeom>
+          <a:noFill/>
+        </p:spPr>
+        <p:txBody>
+          <a:bodyPr wrap="none" rtlCol="0">
+            <a:spAutoFit/>
+          </a:bodyPr>
+          <a:lstStyle/>
+          <a:p>
+            <a:r>
+              <a:rPr lang="fr-FR" sz="1100" b="1" dirty="0">
+                <a:solidFill>
+                  <a:srgbClr val="00B0F0"/>
+                </a:solidFill>
+              </a:rPr>
+              <a:t>04/08</a:t>
+            </a:r>
+          </a:p>
+        </p:txBody>
+      </p:sp>
+      <p:sp>
+        <p:nvSpPr>
+          <p:cNvPr id="40" name="ZoneTexte 39">
+            <a:extLst>
+              <a:ext uri="{FF2B5EF4-FFF2-40B4-BE49-F238E27FC236}">
+                <a16:creationId xmlns:a16="http://schemas.microsoft.com/office/drawing/2014/main" id="{2EC74015-D0B0-4298-9363-F9B59CF6DA2F}"/>
+              </a:ext>
+            </a:extLst>
+          </p:cNvPr>
+          <p:cNvSpPr txBox="1"/>
+          <p:nvPr/>
+        </p:nvSpPr>
+        <p:spPr>
+          <a:xfrm>
+            <a:off x="-109178" y="3382212"/>
+            <a:ext cx="1176001" cy="430887"/>
+          </a:xfrm>
+          <a:prstGeom prst="rect">
+            <a:avLst/>
+          </a:prstGeom>
+          <a:noFill/>
+        </p:spPr>
+        <p:txBody>
+          <a:bodyPr wrap="square" rtlCol="0">
+            <a:spAutoFit/>
+          </a:bodyPr>
+          <a:lstStyle/>
+          <a:p>
+            <a:pPr algn="ctr"/>
+            <a:r>
+              <a:rPr lang="fr-FR" sz="1100" dirty="0"/>
+              <a:t>Installation outils développement</a:t>
+            </a:r>
+          </a:p>
+        </p:txBody>
+      </p:sp>
+      <p:sp>
+        <p:nvSpPr>
+          <p:cNvPr id="41" name="ZoneTexte 40">
+            <a:extLst>
+              <a:ext uri="{FF2B5EF4-FFF2-40B4-BE49-F238E27FC236}">
+                <a16:creationId xmlns:a16="http://schemas.microsoft.com/office/drawing/2014/main" id="{4B98A5EE-98DE-4D7F-99D6-17151B1C5FD0}"/>
+              </a:ext>
+            </a:extLst>
+          </p:cNvPr>
+          <p:cNvSpPr txBox="1"/>
+          <p:nvPr/>
+        </p:nvSpPr>
+        <p:spPr>
+          <a:xfrm>
+            <a:off x="145548" y="2844561"/>
+            <a:ext cx="666551" cy="430887"/>
+          </a:xfrm>
+          <a:prstGeom prst="rect">
+            <a:avLst/>
+          </a:prstGeom>
+          <a:solidFill>
+            <a:schemeClr val="bg1"/>
+          </a:solidFill>
+        </p:spPr>
+        <p:txBody>
+          <a:bodyPr wrap="square" rtlCol="0">
+            <a:spAutoFit/>
+          </a:bodyPr>
+          <a:lstStyle/>
+          <a:p>
+            <a:pPr algn="ctr"/>
+            <a:r>
+              <a:rPr lang="fr-FR" sz="1100" dirty="0"/>
+              <a:t>Arrivée à VISEO</a:t>
+            </a:r>
+          </a:p>
+        </p:txBody>
+      </p:sp>
+      <p:sp>
+        <p:nvSpPr>
+          <p:cNvPr id="43" name="ZoneTexte 42">
+            <a:extLst>
+              <a:ext uri="{FF2B5EF4-FFF2-40B4-BE49-F238E27FC236}">
+                <a16:creationId xmlns:a16="http://schemas.microsoft.com/office/drawing/2014/main" id="{AF825B83-F65D-4EA7-997D-E2D230F73D2C}"/>
+              </a:ext>
+            </a:extLst>
+          </p:cNvPr>
+          <p:cNvSpPr txBox="1"/>
+          <p:nvPr/>
+        </p:nvSpPr>
+        <p:spPr>
+          <a:xfrm>
+            <a:off x="2178021" y="3001343"/>
+            <a:ext cx="792000" cy="1615827"/>
+          </a:xfrm>
+          <a:prstGeom prst="rect">
+            <a:avLst/>
+          </a:prstGeom>
+          <a:noFill/>
+        </p:spPr>
+        <p:txBody>
+          <a:bodyPr wrap="square" rtlCol="0">
+            <a:spAutoFit/>
+          </a:bodyPr>
+          <a:lstStyle/>
+          <a:p>
+            <a:pPr algn="ctr"/>
+            <a:r>
+              <a:rPr lang="fr-FR" sz="1100" dirty="0"/>
+              <a:t>Connexion</a:t>
+            </a:r>
+          </a:p>
+          <a:p>
+            <a:pPr algn="ctr"/>
+            <a:endParaRPr lang="fr-FR" sz="1100" dirty="0"/>
+          </a:p>
+          <a:p>
+            <a:pPr algn="ctr"/>
+            <a:br>
+              <a:rPr lang="fr-FR" sz="1100" dirty="0"/>
+            </a:br>
+            <a:r>
+              <a:rPr lang="fr-FR" sz="1100" dirty="0"/>
+              <a:t>Inscription</a:t>
+            </a:r>
+          </a:p>
+          <a:p>
+            <a:pPr algn="ctr"/>
+            <a:endParaRPr lang="fr-FR" sz="1100" dirty="0"/>
+          </a:p>
+          <a:p>
+            <a:pPr algn="ctr"/>
+            <a:br>
+              <a:rPr lang="fr-FR" sz="1100" dirty="0"/>
+            </a:br>
+            <a:r>
+              <a:rPr lang="fr-FR" sz="1100" dirty="0"/>
+              <a:t>Mot de passe oublié</a:t>
+            </a:r>
+          </a:p>
+        </p:txBody>
+      </p:sp>
+      <p:sp>
+        <p:nvSpPr>
+          <p:cNvPr id="44" name="ZoneTexte 43">
+            <a:extLst>
+              <a:ext uri="{FF2B5EF4-FFF2-40B4-BE49-F238E27FC236}">
+                <a16:creationId xmlns:a16="http://schemas.microsoft.com/office/drawing/2014/main" id="{7177E302-A720-4059-A696-99E384F238A6}"/>
+              </a:ext>
+            </a:extLst>
+          </p:cNvPr>
+          <p:cNvSpPr txBox="1"/>
+          <p:nvPr/>
+        </p:nvSpPr>
+        <p:spPr>
+          <a:xfrm>
+            <a:off x="3256951" y="3424157"/>
+            <a:ext cx="666551" cy="600164"/>
+          </a:xfrm>
+          <a:prstGeom prst="rect">
+            <a:avLst/>
+          </a:prstGeom>
+          <a:solidFill>
+            <a:schemeClr val="bg1"/>
+          </a:solidFill>
+        </p:spPr>
+        <p:txBody>
+          <a:bodyPr wrap="square" rtlCol="0">
+            <a:spAutoFit/>
+          </a:bodyPr>
+          <a:lstStyle/>
+          <a:p>
+            <a:pPr algn="ctr"/>
+            <a:r>
+              <a:rPr lang="fr-FR" sz="1100" dirty="0"/>
+              <a:t>13/02, arrivée à VISEO</a:t>
+            </a:r>
+          </a:p>
+        </p:txBody>
+      </p:sp>
+      <p:sp>
+        <p:nvSpPr>
+          <p:cNvPr id="45" name="ZoneTexte 44">
+            <a:extLst>
+              <a:ext uri="{FF2B5EF4-FFF2-40B4-BE49-F238E27FC236}">
+                <a16:creationId xmlns:a16="http://schemas.microsoft.com/office/drawing/2014/main" id="{C638F9C3-1D37-4B71-9B3C-166CD12A6187}"/>
+              </a:ext>
+            </a:extLst>
+          </p:cNvPr>
+          <p:cNvSpPr txBox="1"/>
+          <p:nvPr/>
+        </p:nvSpPr>
+        <p:spPr>
+          <a:xfrm>
+            <a:off x="4250387" y="3339898"/>
+            <a:ext cx="666551" cy="600164"/>
+          </a:xfrm>
+          <a:prstGeom prst="rect">
+            <a:avLst/>
+          </a:prstGeom>
+          <a:solidFill>
+            <a:schemeClr val="bg1"/>
+          </a:solidFill>
+        </p:spPr>
+        <p:txBody>
+          <a:bodyPr wrap="square" rtlCol="0">
+            <a:spAutoFit/>
+          </a:bodyPr>
+          <a:lstStyle/>
+          <a:p>
+            <a:pPr algn="ctr"/>
+            <a:r>
+              <a:rPr lang="fr-FR" sz="1100" dirty="0"/>
+              <a:t>13/02, arrivée à VISEO</a:t>
+            </a:r>
+          </a:p>
+        </p:txBody>
+      </p:sp>
+      <p:sp>
+        <p:nvSpPr>
+          <p:cNvPr id="46" name="ZoneTexte 45">
+            <a:extLst>
+              <a:ext uri="{FF2B5EF4-FFF2-40B4-BE49-F238E27FC236}">
+                <a16:creationId xmlns:a16="http://schemas.microsoft.com/office/drawing/2014/main" id="{715967E7-BCEA-4CE1-86F1-3AFA2D51F874}"/>
+              </a:ext>
+            </a:extLst>
+          </p:cNvPr>
+          <p:cNvSpPr txBox="1"/>
+          <p:nvPr/>
+        </p:nvSpPr>
+        <p:spPr>
+          <a:xfrm>
+            <a:off x="5183277" y="3171555"/>
+            <a:ext cx="666551" cy="600164"/>
+          </a:xfrm>
+          <a:prstGeom prst="rect">
+            <a:avLst/>
+          </a:prstGeom>
+          <a:solidFill>
+            <a:schemeClr val="bg1"/>
+          </a:solidFill>
+        </p:spPr>
+        <p:txBody>
+          <a:bodyPr wrap="square" rtlCol="0">
+            <a:spAutoFit/>
+          </a:bodyPr>
+          <a:lstStyle/>
+          <a:p>
+            <a:pPr algn="ctr"/>
+            <a:r>
+              <a:rPr lang="fr-FR" sz="1100" dirty="0"/>
+              <a:t>13/02, arrivée à VISEO</a:t>
+            </a:r>
+          </a:p>
+        </p:txBody>
+      </p:sp>
+      <p:sp>
+        <p:nvSpPr>
+          <p:cNvPr id="47" name="ZoneTexte 46">
+            <a:extLst>
+              <a:ext uri="{FF2B5EF4-FFF2-40B4-BE49-F238E27FC236}">
+                <a16:creationId xmlns:a16="http://schemas.microsoft.com/office/drawing/2014/main" id="{FE1B4E5D-25C6-4BDB-87D1-5DB1A0052F27}"/>
+              </a:ext>
+            </a:extLst>
+          </p:cNvPr>
+          <p:cNvSpPr txBox="1"/>
+          <p:nvPr/>
+        </p:nvSpPr>
+        <p:spPr>
+          <a:xfrm>
+            <a:off x="6197376" y="3047298"/>
+            <a:ext cx="666551" cy="600164"/>
+          </a:xfrm>
+          <a:prstGeom prst="rect">
+            <a:avLst/>
+          </a:prstGeom>
+          <a:solidFill>
+            <a:schemeClr val="bg1"/>
+          </a:solidFill>
+        </p:spPr>
+        <p:txBody>
+          <a:bodyPr wrap="square" rtlCol="0">
+            <a:spAutoFit/>
+          </a:bodyPr>
+          <a:lstStyle/>
+          <a:p>
+            <a:pPr algn="ctr"/>
+            <a:r>
+              <a:rPr lang="fr-FR" sz="1100" dirty="0"/>
+              <a:t>13/02, arrivée à VISEO</a:t>
+            </a:r>
+          </a:p>
+        </p:txBody>
+      </p:sp>
+      <p:sp>
+        <p:nvSpPr>
+          <p:cNvPr id="48" name="ZoneTexte 47">
+            <a:extLst>
+              <a:ext uri="{FF2B5EF4-FFF2-40B4-BE49-F238E27FC236}">
+                <a16:creationId xmlns:a16="http://schemas.microsoft.com/office/drawing/2014/main" id="{CEF2E639-D869-4B8C-9BF4-3F464173B2E8}"/>
+              </a:ext>
+            </a:extLst>
+          </p:cNvPr>
+          <p:cNvSpPr txBox="1"/>
+          <p:nvPr/>
+        </p:nvSpPr>
+        <p:spPr>
+          <a:xfrm>
+            <a:off x="7237968" y="3376757"/>
+            <a:ext cx="666551" cy="600164"/>
+          </a:xfrm>
+          <a:prstGeom prst="rect">
+            <a:avLst/>
+          </a:prstGeom>
+          <a:solidFill>
+            <a:schemeClr val="bg1"/>
+          </a:solidFill>
+        </p:spPr>
+        <p:txBody>
+          <a:bodyPr wrap="square" rtlCol="0">
+            <a:spAutoFit/>
+          </a:bodyPr>
+          <a:lstStyle/>
+          <a:p>
+            <a:pPr algn="ctr"/>
+            <a:r>
+              <a:rPr lang="fr-FR" sz="1100" dirty="0"/>
+              <a:t>13/02, arrivée à VISEO</a:t>
+            </a:r>
+          </a:p>
+        </p:txBody>
+      </p:sp>
+      <p:sp>
+        <p:nvSpPr>
+          <p:cNvPr id="49" name="ZoneTexte 48">
+            <a:extLst>
+              <a:ext uri="{FF2B5EF4-FFF2-40B4-BE49-F238E27FC236}">
+                <a16:creationId xmlns:a16="http://schemas.microsoft.com/office/drawing/2014/main" id="{91F480C6-C559-423E-B99F-99B47AB26F1F}"/>
+              </a:ext>
+            </a:extLst>
+          </p:cNvPr>
+          <p:cNvSpPr txBox="1"/>
+          <p:nvPr/>
+        </p:nvSpPr>
+        <p:spPr>
+          <a:xfrm>
+            <a:off x="8239347" y="3808753"/>
+            <a:ext cx="666551" cy="600164"/>
+          </a:xfrm>
+          <a:prstGeom prst="rect">
+            <a:avLst/>
+          </a:prstGeom>
+          <a:solidFill>
+            <a:schemeClr val="bg1"/>
+          </a:solidFill>
+        </p:spPr>
+        <p:txBody>
+          <a:bodyPr wrap="square" rtlCol="0">
+            <a:spAutoFit/>
+          </a:bodyPr>
+          <a:lstStyle/>
+          <a:p>
+            <a:pPr algn="ctr"/>
+            <a:r>
+              <a:rPr lang="fr-FR" sz="1100" dirty="0"/>
+              <a:t>13/02, arrivée à VISEO</a:t>
+            </a:r>
+          </a:p>
+        </p:txBody>
+      </p:sp>
+      <p:sp>
+        <p:nvSpPr>
+          <p:cNvPr id="50" name="ZoneTexte 49">
+            <a:extLst>
+              <a:ext uri="{FF2B5EF4-FFF2-40B4-BE49-F238E27FC236}">
+                <a16:creationId xmlns:a16="http://schemas.microsoft.com/office/drawing/2014/main" id="{2DD9D0B8-B567-460B-AFA9-801E9C2A2648}"/>
+              </a:ext>
+            </a:extLst>
+          </p:cNvPr>
+          <p:cNvSpPr txBox="1"/>
+          <p:nvPr/>
+        </p:nvSpPr>
+        <p:spPr>
+          <a:xfrm>
+            <a:off x="9220963" y="3842158"/>
+            <a:ext cx="666551" cy="600164"/>
+          </a:xfrm>
+          <a:prstGeom prst="rect">
+            <a:avLst/>
+          </a:prstGeom>
+          <a:solidFill>
+            <a:schemeClr val="bg1"/>
+          </a:solidFill>
+        </p:spPr>
+        <p:txBody>
+          <a:bodyPr wrap="square" rtlCol="0">
+            <a:spAutoFit/>
+          </a:bodyPr>
+          <a:lstStyle/>
+          <a:p>
+            <a:pPr algn="ctr"/>
+            <a:r>
+              <a:rPr lang="fr-FR" sz="1100" dirty="0"/>
+              <a:t>13/02, arrivée à VISEO</a:t>
+            </a:r>
+          </a:p>
+        </p:txBody>
+      </p:sp>
+      <p:sp>
+        <p:nvSpPr>
+          <p:cNvPr id="51" name="ZoneTexte 50">
+            <a:extLst>
+              <a:ext uri="{FF2B5EF4-FFF2-40B4-BE49-F238E27FC236}">
+                <a16:creationId xmlns:a16="http://schemas.microsoft.com/office/drawing/2014/main" id="{43E14C9D-78A4-44E7-8E12-F924202D8BEA}"/>
+              </a:ext>
+            </a:extLst>
+          </p:cNvPr>
+          <p:cNvSpPr txBox="1"/>
+          <p:nvPr/>
+        </p:nvSpPr>
+        <p:spPr>
+          <a:xfrm>
+            <a:off x="10192055" y="3783435"/>
+            <a:ext cx="666551" cy="600164"/>
+          </a:xfrm>
+          <a:prstGeom prst="rect">
+            <a:avLst/>
+          </a:prstGeom>
+          <a:solidFill>
+            <a:schemeClr val="bg1"/>
+          </a:solidFill>
+        </p:spPr>
+        <p:txBody>
+          <a:bodyPr wrap="square" rtlCol="0">
+            <a:spAutoFit/>
+          </a:bodyPr>
+          <a:lstStyle/>
+          <a:p>
+            <a:pPr algn="ctr"/>
+            <a:r>
+              <a:rPr lang="fr-FR" sz="1100" dirty="0"/>
+              <a:t>13/02, arrivée à VISEO</a:t>
+            </a:r>
+          </a:p>
+        </p:txBody>
+      </p:sp>
+      <p:sp>
+        <p:nvSpPr>
+          <p:cNvPr id="52" name="ZoneTexte 51">
+            <a:extLst>
+              <a:ext uri="{FF2B5EF4-FFF2-40B4-BE49-F238E27FC236}">
+                <a16:creationId xmlns:a16="http://schemas.microsoft.com/office/drawing/2014/main" id="{7FEEFA9E-2C95-48FA-8C83-101943784E7C}"/>
+              </a:ext>
+            </a:extLst>
+          </p:cNvPr>
+          <p:cNvSpPr txBox="1"/>
+          <p:nvPr/>
+        </p:nvSpPr>
+        <p:spPr>
+          <a:xfrm>
+            <a:off x="11167379" y="3916752"/>
+            <a:ext cx="666551" cy="600164"/>
+          </a:xfrm>
+          <a:prstGeom prst="rect">
+            <a:avLst/>
+          </a:prstGeom>
+          <a:solidFill>
+            <a:schemeClr val="bg1"/>
+          </a:solidFill>
+        </p:spPr>
+        <p:txBody>
+          <a:bodyPr wrap="square" rtlCol="0">
+            <a:spAutoFit/>
+          </a:bodyPr>
+          <a:lstStyle/>
+          <a:p>
+            <a:pPr algn="ctr"/>
+            <a:r>
+              <a:rPr lang="fr-FR" sz="1100" dirty="0"/>
+              <a:t>13/02, arrivée à VISEO</a:t>
+            </a:r>
+          </a:p>
+        </p:txBody>
+      </p:sp>
+      <p:sp>
+        <p:nvSpPr>
+          <p:cNvPr id="61" name="ZoneTexte 60">
+            <a:extLst>
+              <a:ext uri="{FF2B5EF4-FFF2-40B4-BE49-F238E27FC236}">
+                <a16:creationId xmlns:a16="http://schemas.microsoft.com/office/drawing/2014/main" id="{8F57089F-35F9-4CF0-9AB2-5CAF00F16AE6}"/>
+              </a:ext>
+            </a:extLst>
+          </p:cNvPr>
+          <p:cNvSpPr txBox="1"/>
+          <p:nvPr/>
+        </p:nvSpPr>
+        <p:spPr>
+          <a:xfrm>
+            <a:off x="526854" y="1690731"/>
+            <a:ext cx="860786" cy="461665"/>
+          </a:xfrm>
+          <a:prstGeom prst="rect">
+            <a:avLst/>
+          </a:prstGeom>
+          <a:noFill/>
+        </p:spPr>
+        <p:txBody>
+          <a:bodyPr wrap="square" rtlCol="0">
+            <a:spAutoFit/>
+          </a:bodyPr>
+          <a:lstStyle/>
+          <a:p>
+            <a:r>
+              <a:rPr lang="fr-FR" sz="1200" i="1" dirty="0">
+                <a:solidFill>
+                  <a:schemeClr val="accent1">
+                    <a:lumMod val="40000"/>
+                    <a:lumOff val="60000"/>
+                  </a:schemeClr>
+                </a:solidFill>
+              </a:rPr>
+              <a:t>Vélocité du sprint</a:t>
+            </a:r>
+          </a:p>
+        </p:txBody>
+      </p:sp>
+      <p:sp>
+        <p:nvSpPr>
+          <p:cNvPr id="63" name="ZoneTexte 62">
+            <a:extLst>
+              <a:ext uri="{FF2B5EF4-FFF2-40B4-BE49-F238E27FC236}">
+                <a16:creationId xmlns:a16="http://schemas.microsoft.com/office/drawing/2014/main" id="{03370B36-714C-4285-8584-1A7C37E94780}"/>
+              </a:ext>
+            </a:extLst>
+          </p:cNvPr>
+          <p:cNvSpPr txBox="1"/>
+          <p:nvPr/>
+        </p:nvSpPr>
+        <p:spPr>
+          <a:xfrm>
+            <a:off x="1676393" y="1870532"/>
+            <a:ext cx="383975" cy="276999"/>
+          </a:xfrm>
+          <a:prstGeom prst="rect">
+            <a:avLst/>
+          </a:prstGeom>
+          <a:noFill/>
+        </p:spPr>
+        <p:txBody>
+          <a:bodyPr wrap="square" rtlCol="0">
+            <a:spAutoFit/>
+          </a:bodyPr>
+          <a:lstStyle/>
+          <a:p>
+            <a:r>
+              <a:rPr lang="fr-FR" sz="1200" i="1" dirty="0">
+                <a:solidFill>
+                  <a:schemeClr val="accent1">
+                    <a:lumMod val="40000"/>
+                    <a:lumOff val="60000"/>
+                  </a:schemeClr>
+                </a:solidFill>
+              </a:rPr>
+              <a:t>17</a:t>
+            </a:r>
+          </a:p>
+        </p:txBody>
+      </p:sp>
+      <p:sp>
+        <p:nvSpPr>
+          <p:cNvPr id="65" name="ZoneTexte 64">
+            <a:extLst>
+              <a:ext uri="{FF2B5EF4-FFF2-40B4-BE49-F238E27FC236}">
+                <a16:creationId xmlns:a16="http://schemas.microsoft.com/office/drawing/2014/main" id="{F6380ED2-5919-4819-9D0C-8FA736078BE0}"/>
+              </a:ext>
+            </a:extLst>
+          </p:cNvPr>
+          <p:cNvSpPr txBox="1"/>
+          <p:nvPr/>
+        </p:nvSpPr>
+        <p:spPr>
+          <a:xfrm>
+            <a:off x="6645532" y="2770299"/>
+            <a:ext cx="383975" cy="276999"/>
+          </a:xfrm>
+          <a:prstGeom prst="rect">
+            <a:avLst/>
+          </a:prstGeom>
+          <a:noFill/>
+        </p:spPr>
+        <p:txBody>
+          <a:bodyPr wrap="square" rtlCol="0">
+            <a:spAutoFit/>
+          </a:bodyPr>
+          <a:lstStyle/>
+          <a:p>
+            <a:r>
+              <a:rPr lang="fr-FR" sz="1200" i="1" dirty="0">
+                <a:solidFill>
+                  <a:schemeClr val="accent1">
+                    <a:lumMod val="40000"/>
+                    <a:lumOff val="60000"/>
+                  </a:schemeClr>
+                </a:solidFill>
+              </a:rPr>
+              <a:t>40</a:t>
+            </a:r>
+          </a:p>
+        </p:txBody>
+      </p:sp>
+      <p:sp>
+        <p:nvSpPr>
+          <p:cNvPr id="66" name="ZoneTexte 65">
+            <a:extLst>
+              <a:ext uri="{FF2B5EF4-FFF2-40B4-BE49-F238E27FC236}">
+                <a16:creationId xmlns:a16="http://schemas.microsoft.com/office/drawing/2014/main" id="{81B08F40-BD2B-4BE7-A313-74A3BE2F9140}"/>
+              </a:ext>
+            </a:extLst>
+          </p:cNvPr>
+          <p:cNvSpPr txBox="1"/>
+          <p:nvPr/>
+        </p:nvSpPr>
+        <p:spPr>
+          <a:xfrm>
+            <a:off x="11595409" y="3668564"/>
+            <a:ext cx="383975" cy="276999"/>
+          </a:xfrm>
+          <a:prstGeom prst="rect">
+            <a:avLst/>
+          </a:prstGeom>
+          <a:noFill/>
+        </p:spPr>
+        <p:txBody>
+          <a:bodyPr wrap="square" rtlCol="0">
+            <a:spAutoFit/>
+          </a:bodyPr>
+          <a:lstStyle/>
+          <a:p>
+            <a:r>
+              <a:rPr lang="fr-FR" sz="1200" i="1" dirty="0">
+                <a:solidFill>
+                  <a:schemeClr val="accent1">
+                    <a:lumMod val="40000"/>
+                    <a:lumOff val="60000"/>
+                  </a:schemeClr>
+                </a:solidFill>
+              </a:rPr>
+              <a:t>61</a:t>
+            </a:r>
+          </a:p>
+        </p:txBody>
+      </p:sp>
     </p:spTree>
     <p:extLst>
       <p:ext uri="{BB962C8B-B14F-4D97-AF65-F5344CB8AC3E}">

</xml_diff>

<commit_message>
Planning prévisionnel - 4 sprints left
</commit_message>
<xml_diff>
--- a/Planning prévisionnel.pptx
+++ b/Planning prévisionnel.pptx
@@ -3913,7 +3913,7 @@
           <a:p>
             <a:fld id="{8BA915E5-5DBD-445D-A40C-D4BFAC4EBC40}" type="datetimeFigureOut">
               <a:rPr lang="fr-FR" smtClean="0"/>
-              <a:t>31/07/2017</a:t>
+              <a:t>01/08/2017</a:t>
             </a:fld>
             <a:endParaRPr lang="fr-FR"/>
           </a:p>
@@ -4111,7 +4111,7 @@
           <a:p>
             <a:fld id="{8BA915E5-5DBD-445D-A40C-D4BFAC4EBC40}" type="datetimeFigureOut">
               <a:rPr lang="fr-FR" smtClean="0"/>
-              <a:t>31/07/2017</a:t>
+              <a:t>01/08/2017</a:t>
             </a:fld>
             <a:endParaRPr lang="fr-FR"/>
           </a:p>
@@ -4319,7 +4319,7 @@
           <a:p>
             <a:fld id="{8BA915E5-5DBD-445D-A40C-D4BFAC4EBC40}" type="datetimeFigureOut">
               <a:rPr lang="fr-FR" smtClean="0"/>
-              <a:t>31/07/2017</a:t>
+              <a:t>01/08/2017</a:t>
             </a:fld>
             <a:endParaRPr lang="fr-FR"/>
           </a:p>
@@ -4517,7 +4517,7 @@
           <a:p>
             <a:fld id="{8BA915E5-5DBD-445D-A40C-D4BFAC4EBC40}" type="datetimeFigureOut">
               <a:rPr lang="fr-FR" smtClean="0"/>
-              <a:t>31/07/2017</a:t>
+              <a:t>01/08/2017</a:t>
             </a:fld>
             <a:endParaRPr lang="fr-FR"/>
           </a:p>
@@ -4792,7 +4792,7 @@
           <a:p>
             <a:fld id="{8BA915E5-5DBD-445D-A40C-D4BFAC4EBC40}" type="datetimeFigureOut">
               <a:rPr lang="fr-FR" smtClean="0"/>
-              <a:t>31/07/2017</a:t>
+              <a:t>01/08/2017</a:t>
             </a:fld>
             <a:endParaRPr lang="fr-FR"/>
           </a:p>
@@ -5057,7 +5057,7 @@
           <a:p>
             <a:fld id="{8BA915E5-5DBD-445D-A40C-D4BFAC4EBC40}" type="datetimeFigureOut">
               <a:rPr lang="fr-FR" smtClean="0"/>
-              <a:t>31/07/2017</a:t>
+              <a:t>01/08/2017</a:t>
             </a:fld>
             <a:endParaRPr lang="fr-FR"/>
           </a:p>
@@ -5469,7 +5469,7 @@
           <a:p>
             <a:fld id="{8BA915E5-5DBD-445D-A40C-D4BFAC4EBC40}" type="datetimeFigureOut">
               <a:rPr lang="fr-FR" smtClean="0"/>
-              <a:t>31/07/2017</a:t>
+              <a:t>01/08/2017</a:t>
             </a:fld>
             <a:endParaRPr lang="fr-FR"/>
           </a:p>
@@ -5610,7 +5610,7 @@
           <a:p>
             <a:fld id="{8BA915E5-5DBD-445D-A40C-D4BFAC4EBC40}" type="datetimeFigureOut">
               <a:rPr lang="fr-FR" smtClean="0"/>
-              <a:t>31/07/2017</a:t>
+              <a:t>01/08/2017</a:t>
             </a:fld>
             <a:endParaRPr lang="fr-FR"/>
           </a:p>
@@ -5723,7 +5723,7 @@
           <a:p>
             <a:fld id="{8BA915E5-5DBD-445D-A40C-D4BFAC4EBC40}" type="datetimeFigureOut">
               <a:rPr lang="fr-FR" smtClean="0"/>
-              <a:t>31/07/2017</a:t>
+              <a:t>01/08/2017</a:t>
             </a:fld>
             <a:endParaRPr lang="fr-FR"/>
           </a:p>
@@ -6034,7 +6034,7 @@
           <a:p>
             <a:fld id="{8BA915E5-5DBD-445D-A40C-D4BFAC4EBC40}" type="datetimeFigureOut">
               <a:rPr lang="fr-FR" smtClean="0"/>
-              <a:t>31/07/2017</a:t>
+              <a:t>01/08/2017</a:t>
             </a:fld>
             <a:endParaRPr lang="fr-FR"/>
           </a:p>
@@ -6322,7 +6322,7 @@
           <a:p>
             <a:fld id="{8BA915E5-5DBD-445D-A40C-D4BFAC4EBC40}" type="datetimeFigureOut">
               <a:rPr lang="fr-FR" smtClean="0"/>
-              <a:t>31/07/2017</a:t>
+              <a:t>01/08/2017</a:t>
             </a:fld>
             <a:endParaRPr lang="fr-FR"/>
           </a:p>
@@ -6563,7 +6563,7 @@
           <a:p>
             <a:fld id="{8BA915E5-5DBD-445D-A40C-D4BFAC4EBC40}" type="datetimeFigureOut">
               <a:rPr lang="fr-FR" smtClean="0"/>
-              <a:t>31/07/2017</a:t>
+              <a:t>01/08/2017</a:t>
             </a:fld>
             <a:endParaRPr lang="fr-FR"/>
           </a:p>
@@ -6980,6 +6980,85 @@
           <a:chExt cx="0" cy="0"/>
         </a:xfrm>
       </p:grpSpPr>
+      <p:sp>
+        <p:nvSpPr>
+          <p:cNvPr id="44" name="ZoneTexte 43">
+            <a:extLst>
+              <a:ext uri="{FF2B5EF4-FFF2-40B4-BE49-F238E27FC236}">
+                <a16:creationId xmlns:a16="http://schemas.microsoft.com/office/drawing/2014/main" id="{7177E302-A720-4059-A696-99E384F238A6}"/>
+              </a:ext>
+            </a:extLst>
+          </p:cNvPr>
+          <p:cNvSpPr txBox="1"/>
+          <p:nvPr/>
+        </p:nvSpPr>
+        <p:spPr>
+          <a:xfrm>
+            <a:off x="3104227" y="3372211"/>
+            <a:ext cx="972000" cy="1107996"/>
+          </a:xfrm>
+          <a:prstGeom prst="rect">
+            <a:avLst/>
+          </a:prstGeom>
+          <a:solidFill>
+            <a:schemeClr val="bg1"/>
+          </a:solidFill>
+        </p:spPr>
+        <p:txBody>
+          <a:bodyPr wrap="square" rtlCol="0">
+            <a:spAutoFit/>
+          </a:bodyPr>
+          <a:lstStyle/>
+          <a:p>
+            <a:pPr algn="ctr"/>
+            <a:r>
+              <a:rPr lang="fr-FR" sz="1100" dirty="0"/>
+              <a:t>Affichage</a:t>
+            </a:r>
+            <a:br>
+              <a:rPr lang="fr-FR" sz="1100" dirty="0"/>
+            </a:br>
+            <a:r>
+              <a:rPr lang="fr-FR" sz="1100" dirty="0"/>
+              <a:t>Progression</a:t>
+            </a:r>
+            <a:br>
+              <a:rPr lang="fr-FR" sz="1100" dirty="0"/>
+            </a:br>
+            <a:r>
+              <a:rPr lang="fr-FR" sz="1100" dirty="0">
+                <a:solidFill>
+                  <a:schemeClr val="bg2">
+                    <a:lumMod val="50000"/>
+                  </a:schemeClr>
+                </a:solidFill>
+              </a:rPr>
+              <a:t>Collaborateur</a:t>
+            </a:r>
+          </a:p>
+          <a:p>
+            <a:pPr algn="ctr"/>
+            <a:endParaRPr lang="fr-FR" sz="1100" dirty="0"/>
+          </a:p>
+          <a:p>
+            <a:pPr algn="ctr"/>
+            <a:r>
+              <a:rPr lang="fr-FR" sz="1100" dirty="0"/>
+              <a:t>Dépendance jeux </a:t>
+            </a:r>
+            <a:r>
+              <a:rPr lang="fr-FR" sz="1100" dirty="0">
+                <a:solidFill>
+                  <a:schemeClr val="bg2">
+                    <a:lumMod val="50000"/>
+                  </a:schemeClr>
+                </a:solidFill>
+              </a:rPr>
+              <a:t>Admin</a:t>
+            </a:r>
+          </a:p>
+        </p:txBody>
+      </p:sp>
       <p:cxnSp>
         <p:nvCxnSpPr>
           <p:cNvPr id="54" name="Connecteur droit avec flèche 53">
@@ -9133,10 +9212,10 @@
       </p:sp>
       <p:sp>
         <p:nvSpPr>
-          <p:cNvPr id="44" name="ZoneTexte 43">
-            <a:extLst>
-              <a:ext uri="{FF2B5EF4-FFF2-40B4-BE49-F238E27FC236}">
-                <a16:creationId xmlns:a16="http://schemas.microsoft.com/office/drawing/2014/main" id="{7177E302-A720-4059-A696-99E384F238A6}"/>
+          <p:cNvPr id="45" name="ZoneTexte 44">
+            <a:extLst>
+              <a:ext uri="{FF2B5EF4-FFF2-40B4-BE49-F238E27FC236}">
+                <a16:creationId xmlns:a16="http://schemas.microsoft.com/office/drawing/2014/main" id="{C638F9C3-1D37-4B71-9B3C-166CD12A6187}"/>
               </a:ext>
             </a:extLst>
           </p:cNvPr>
@@ -9145,15 +9224,13 @@
         </p:nvSpPr>
         <p:spPr>
           <a:xfrm>
-            <a:off x="3256951" y="3424157"/>
-            <a:ext cx="666551" cy="600164"/>
+            <a:off x="4067238" y="3339898"/>
+            <a:ext cx="1044000" cy="2631490"/>
           </a:xfrm>
           <a:prstGeom prst="rect">
             <a:avLst/>
           </a:prstGeom>
-          <a:solidFill>
-            <a:schemeClr val="bg1"/>
-          </a:solidFill>
+          <a:noFill/>
         </p:spPr>
         <p:txBody>
           <a:bodyPr wrap="square" rtlCol="0">
@@ -9164,17 +9241,79 @@
             <a:pPr algn="ctr"/>
             <a:r>
               <a:rPr lang="fr-FR" sz="1100" dirty="0"/>
-              <a:t>13/02, arrivée à VISEO</a:t>
+              <a:t>Questions Quiz </a:t>
+            </a:r>
+            <a:r>
+              <a:rPr lang="fr-FR" sz="1100" dirty="0">
+                <a:solidFill>
+                  <a:schemeClr val="bg2">
+                    <a:lumMod val="50000"/>
+                  </a:schemeClr>
+                </a:solidFill>
+              </a:rPr>
+              <a:t>Admin</a:t>
+            </a:r>
+            <a:r>
+              <a:rPr lang="fr-FR" sz="1100" dirty="0"/>
+              <a:t> avec vidéo à l’appui</a:t>
+            </a:r>
+          </a:p>
+          <a:p>
+            <a:pPr algn="ctr"/>
+            <a:endParaRPr lang="fr-FR" sz="1100" dirty="0"/>
+          </a:p>
+          <a:p>
+            <a:pPr algn="ctr"/>
+            <a:r>
+              <a:rPr lang="fr-FR" sz="1100" dirty="0">
+                <a:solidFill>
+                  <a:schemeClr val="bg2">
+                    <a:lumMod val="50000"/>
+                  </a:schemeClr>
+                </a:solidFill>
+              </a:rPr>
+              <a:t>Collaborateur</a:t>
+            </a:r>
+            <a:br>
+              <a:rPr lang="fr-FR" sz="1100" dirty="0"/>
+            </a:br>
+            <a:r>
+              <a:rPr lang="fr-FR" sz="1100" dirty="0"/>
+              <a:t>Affichage réponses et explications</a:t>
+            </a:r>
+          </a:p>
+          <a:p>
+            <a:pPr algn="ctr"/>
+            <a:r>
+              <a:rPr lang="fr-FR" sz="1100" dirty="0"/>
+              <a:t> </a:t>
+            </a:r>
+            <a:br>
+              <a:rPr lang="fr-FR" sz="1100" dirty="0"/>
+            </a:br>
+            <a:r>
+              <a:rPr lang="fr-FR" sz="1100" dirty="0"/>
+              <a:t>Ecoute possible des explications</a:t>
+            </a:r>
+          </a:p>
+          <a:p>
+            <a:pPr algn="ctr"/>
+            <a:br>
+              <a:rPr lang="fr-FR" sz="1100" dirty="0"/>
+            </a:br>
+            <a:r>
+              <a:rPr lang="fr-FR" sz="1100" dirty="0"/>
+              <a:t>Evaluer la formation</a:t>
             </a:r>
           </a:p>
         </p:txBody>
       </p:sp>
       <p:sp>
         <p:nvSpPr>
-          <p:cNvPr id="45" name="ZoneTexte 44">
-            <a:extLst>
-              <a:ext uri="{FF2B5EF4-FFF2-40B4-BE49-F238E27FC236}">
-                <a16:creationId xmlns:a16="http://schemas.microsoft.com/office/drawing/2014/main" id="{C638F9C3-1D37-4B71-9B3C-166CD12A6187}"/>
+          <p:cNvPr id="46" name="ZoneTexte 45">
+            <a:extLst>
+              <a:ext uri="{FF2B5EF4-FFF2-40B4-BE49-F238E27FC236}">
+                <a16:creationId xmlns:a16="http://schemas.microsoft.com/office/drawing/2014/main" id="{715967E7-BCEA-4CE1-86F1-3AFA2D51F874}"/>
               </a:ext>
             </a:extLst>
           </p:cNvPr>
@@ -9183,15 +9322,13 @@
         </p:nvSpPr>
         <p:spPr>
           <a:xfrm>
-            <a:off x="4250387" y="3339898"/>
-            <a:ext cx="666551" cy="600164"/>
+            <a:off x="5055733" y="3171555"/>
+            <a:ext cx="936000" cy="1277273"/>
           </a:xfrm>
           <a:prstGeom prst="rect">
             <a:avLst/>
           </a:prstGeom>
-          <a:solidFill>
-            <a:schemeClr val="bg1"/>
-          </a:solidFill>
+          <a:noFill/>
         </p:spPr>
         <p:txBody>
           <a:bodyPr wrap="square" rtlCol="0">
@@ -9202,17 +9339,28 @@
             <a:pPr algn="ctr"/>
             <a:r>
               <a:rPr lang="fr-FR" sz="1100" dirty="0"/>
-              <a:t>13/02, arrivée à VISEO</a:t>
+              <a:t>Refonte du projet achevé à 80%</a:t>
+            </a:r>
+          </a:p>
+          <a:p>
+            <a:pPr algn="ctr"/>
+            <a:endParaRPr lang="fr-FR" sz="1100" dirty="0"/>
+          </a:p>
+          <a:p>
+            <a:pPr algn="ctr"/>
+            <a:r>
+              <a:rPr lang="fr-FR" sz="1100" dirty="0"/>
+              <a:t>Version 2.0</a:t>
             </a:r>
           </a:p>
         </p:txBody>
       </p:sp>
       <p:sp>
         <p:nvSpPr>
-          <p:cNvPr id="46" name="ZoneTexte 45">
-            <a:extLst>
-              <a:ext uri="{FF2B5EF4-FFF2-40B4-BE49-F238E27FC236}">
-                <a16:creationId xmlns:a16="http://schemas.microsoft.com/office/drawing/2014/main" id="{715967E7-BCEA-4CE1-86F1-3AFA2D51F874}"/>
+          <p:cNvPr id="47" name="ZoneTexte 46">
+            <a:extLst>
+              <a:ext uri="{FF2B5EF4-FFF2-40B4-BE49-F238E27FC236}">
+                <a16:creationId xmlns:a16="http://schemas.microsoft.com/office/drawing/2014/main" id="{FE1B4E5D-25C6-4BDB-87D1-5DB1A0052F27}"/>
               </a:ext>
             </a:extLst>
           </p:cNvPr>
@@ -9221,15 +9369,13 @@
         </p:nvSpPr>
         <p:spPr>
           <a:xfrm>
-            <a:off x="5183277" y="3171555"/>
-            <a:ext cx="666551" cy="600164"/>
+            <a:off x="6004674" y="3057188"/>
+            <a:ext cx="1044000" cy="1954381"/>
           </a:xfrm>
           <a:prstGeom prst="rect">
             <a:avLst/>
           </a:prstGeom>
-          <a:solidFill>
-            <a:schemeClr val="bg1"/>
-          </a:solidFill>
+          <a:noFill/>
         </p:spPr>
         <p:txBody>
           <a:bodyPr wrap="square" rtlCol="0">
@@ -9240,17 +9386,71 @@
             <a:pPr algn="ctr"/>
             <a:r>
               <a:rPr lang="fr-FR" sz="1100" dirty="0"/>
-              <a:t>13/02, arrivée à VISEO</a:t>
+              <a:t>Affichage notes des Collaborateurs côté </a:t>
+            </a:r>
+            <a:r>
+              <a:rPr lang="fr-FR" sz="1100" dirty="0">
+                <a:solidFill>
+                  <a:schemeClr val="bg2">
+                    <a:lumMod val="50000"/>
+                  </a:schemeClr>
+                </a:solidFill>
+              </a:rPr>
+              <a:t>Admin</a:t>
+            </a:r>
+          </a:p>
+          <a:p>
+            <a:pPr algn="ctr"/>
+            <a:endParaRPr lang="fr-FR" sz="1100" dirty="0">
+              <a:solidFill>
+                <a:schemeClr val="bg2">
+                  <a:lumMod val="50000"/>
+                </a:schemeClr>
+              </a:solidFill>
+            </a:endParaRPr>
+          </a:p>
+          <a:p>
+            <a:pPr algn="ctr"/>
+            <a:endParaRPr lang="fr-FR" sz="1100" dirty="0">
+              <a:solidFill>
+                <a:schemeClr val="bg2">
+                  <a:lumMod val="50000"/>
+                </a:schemeClr>
+              </a:solidFill>
+            </a:endParaRPr>
+          </a:p>
+          <a:p>
+            <a:pPr algn="ctr"/>
+            <a:r>
+              <a:rPr lang="fr-FR" sz="1100" dirty="0"/>
+              <a:t>Début jeu Poupée</a:t>
+            </a:r>
+          </a:p>
+          <a:p>
+            <a:pPr algn="ctr"/>
+            <a:endParaRPr lang="fr-FR" sz="1100" dirty="0">
+              <a:solidFill>
+                <a:schemeClr val="bg2">
+                  <a:lumMod val="50000"/>
+                </a:schemeClr>
+              </a:solidFill>
+            </a:endParaRPr>
+          </a:p>
+          <a:p>
+            <a:pPr algn="ctr"/>
+            <a:r>
+              <a:rPr lang="fr-FR" sz="1100" dirty="0"/>
+              <a:t>Projet testé à 51%</a:t>
             </a:r>
           </a:p>
         </p:txBody>
       </p:sp>
       <p:sp>
         <p:nvSpPr>
-          <p:cNvPr id="47" name="ZoneTexte 46">
-            <a:extLst>
-              <a:ext uri="{FF2B5EF4-FFF2-40B4-BE49-F238E27FC236}">
-                <a16:creationId xmlns:a16="http://schemas.microsoft.com/office/drawing/2014/main" id="{FE1B4E5D-25C6-4BDB-87D1-5DB1A0052F27}"/>
+          <p:cNvPr id="48" name="ZoneTexte 47">
+            <a:extLst>
+              <a:ext uri="{FF2B5EF4-FFF2-40B4-BE49-F238E27FC236}">
+                <a16:creationId xmlns:a16="http://schemas.microsoft.com/office/drawing/2014/main" id="{CEF2E639-D869-4B8C-9BF4-3F464173B2E8}"/>
               </a:ext>
             </a:extLst>
           </p:cNvPr>
@@ -9259,15 +9459,13 @@
         </p:nvSpPr>
         <p:spPr>
           <a:xfrm>
-            <a:off x="6197376" y="3047298"/>
-            <a:ext cx="666551" cy="600164"/>
+            <a:off x="7016922" y="3368619"/>
+            <a:ext cx="1116000" cy="1954381"/>
           </a:xfrm>
           <a:prstGeom prst="rect">
             <a:avLst/>
           </a:prstGeom>
-          <a:solidFill>
-            <a:schemeClr val="bg1"/>
-          </a:solidFill>
+          <a:noFill/>
         </p:spPr>
         <p:txBody>
           <a:bodyPr wrap="square" rtlCol="0">
@@ -9278,45 +9476,51 @@
             <a:pPr algn="ctr"/>
             <a:r>
               <a:rPr lang="fr-FR" sz="1100" dirty="0"/>
-              <a:t>13/02, arrivée à VISEO</a:t>
-            </a:r>
-          </a:p>
-        </p:txBody>
-      </p:sp>
-      <p:sp>
-        <p:nvSpPr>
-          <p:cNvPr id="48" name="ZoneTexte 47">
-            <a:extLst>
-              <a:ext uri="{FF2B5EF4-FFF2-40B4-BE49-F238E27FC236}">
-                <a16:creationId xmlns:a16="http://schemas.microsoft.com/office/drawing/2014/main" id="{CEF2E639-D869-4B8C-9BF4-3F464173B2E8}"/>
-              </a:ext>
-            </a:extLst>
-          </p:cNvPr>
-          <p:cNvSpPr txBox="1"/>
-          <p:nvPr/>
-        </p:nvSpPr>
-        <p:spPr>
-          <a:xfrm>
-            <a:off x="7237968" y="3376757"/>
-            <a:ext cx="666551" cy="600164"/>
-          </a:xfrm>
-          <a:prstGeom prst="rect">
-            <a:avLst/>
-          </a:prstGeom>
-          <a:solidFill>
-            <a:schemeClr val="bg1"/>
-          </a:solidFill>
-        </p:spPr>
-        <p:txBody>
-          <a:bodyPr wrap="square" rtlCol="0">
-            <a:spAutoFit/>
-          </a:bodyPr>
-          <a:lstStyle/>
+              <a:t>Développement jeu Poupée en cours</a:t>
+            </a:r>
+          </a:p>
           <a:p>
             <a:pPr algn="ctr"/>
+            <a:endParaRPr lang="fr-FR" sz="1100" dirty="0"/>
+          </a:p>
+          <a:p>
+            <a:pPr algn="ctr"/>
             <a:r>
               <a:rPr lang="fr-FR" sz="1100" dirty="0"/>
-              <a:t>13/02, arrivée à VISEO</a:t>
+              <a:t>Interface graphique jeu Poupée </a:t>
+            </a:r>
+            <a:r>
+              <a:rPr lang="fr-FR" sz="1100" dirty="0">
+                <a:solidFill>
+                  <a:schemeClr val="bg2">
+                    <a:lumMod val="50000"/>
+                  </a:schemeClr>
+                </a:solidFill>
+              </a:rPr>
+              <a:t>Collaborateur</a:t>
+            </a:r>
+          </a:p>
+          <a:p>
+            <a:pPr algn="ctr"/>
+            <a:endParaRPr lang="fr-FR" sz="1100" dirty="0">
+              <a:solidFill>
+                <a:schemeClr val="bg2">
+                  <a:lumMod val="50000"/>
+                </a:schemeClr>
+              </a:solidFill>
+            </a:endParaRPr>
+          </a:p>
+          <a:p>
+            <a:pPr algn="ctr"/>
+            <a:r>
+              <a:rPr lang="fr-FR" sz="1100" dirty="0">
+                <a:solidFill>
+                  <a:schemeClr val="bg2">
+                    <a:lumMod val="50000"/>
+                  </a:schemeClr>
+                </a:solidFill>
+              </a:rPr>
+              <a:t>Projet testé à 80 %</a:t>
             </a:r>
           </a:p>
         </p:txBody>
@@ -9641,6 +9845,114 @@
           </a:p>
         </p:txBody>
       </p:sp>
+      <p:pic>
+        <p:nvPicPr>
+          <p:cNvPr id="5" name="Image 4">
+            <a:extLst>
+              <a:ext uri="{FF2B5EF4-FFF2-40B4-BE49-F238E27FC236}">
+                <a16:creationId xmlns:a16="http://schemas.microsoft.com/office/drawing/2014/main" id="{67EE89DE-BD5D-4CC7-83BE-34454AB06F26}"/>
+              </a:ext>
+            </a:extLst>
+          </p:cNvPr>
+          <p:cNvPicPr>
+            <a:picLocks noChangeAspect="1"/>
+          </p:cNvPicPr>
+          <p:nvPr/>
+        </p:nvPicPr>
+        <p:blipFill>
+          <a:blip r:embed="rId7">
+            <a:extLst>
+              <a:ext uri="{28A0092B-C50C-407E-A947-70E740481C1C}">
+                <a14:useLocalDpi xmlns:a14="http://schemas.microsoft.com/office/drawing/2010/main" val="0"/>
+              </a:ext>
+            </a:extLst>
+          </a:blip>
+          <a:stretch>
+            <a:fillRect/>
+          </a:stretch>
+        </p:blipFill>
+        <p:spPr>
+          <a:xfrm>
+            <a:off x="139430" y="5070679"/>
+            <a:ext cx="2888271" cy="1624652"/>
+          </a:xfrm>
+          <a:prstGeom prst="rect">
+            <a:avLst/>
+          </a:prstGeom>
+        </p:spPr>
+      </p:pic>
+      <p:pic>
+        <p:nvPicPr>
+          <p:cNvPr id="8" name="Image 7">
+            <a:extLst>
+              <a:ext uri="{FF2B5EF4-FFF2-40B4-BE49-F238E27FC236}">
+                <a16:creationId xmlns:a16="http://schemas.microsoft.com/office/drawing/2014/main" id="{3FA9F288-5C2C-48BA-84E8-7A25A471E061}"/>
+              </a:ext>
+            </a:extLst>
+          </p:cNvPr>
+          <p:cNvPicPr>
+            <a:picLocks noChangeAspect="1"/>
+          </p:cNvPicPr>
+          <p:nvPr/>
+        </p:nvPicPr>
+        <p:blipFill>
+          <a:blip r:embed="rId8">
+            <a:extLst>
+              <a:ext uri="{28A0092B-C50C-407E-A947-70E740481C1C}">
+                <a14:useLocalDpi xmlns:a14="http://schemas.microsoft.com/office/drawing/2010/main" val="0"/>
+              </a:ext>
+            </a:extLst>
+          </a:blip>
+          <a:stretch>
+            <a:fillRect/>
+          </a:stretch>
+        </p:blipFill>
+        <p:spPr>
+          <a:xfrm>
+            <a:off x="5071171" y="5246788"/>
+            <a:ext cx="2560000" cy="1440000"/>
+          </a:xfrm>
+          <a:prstGeom prst="rect">
+            <a:avLst/>
+          </a:prstGeom>
+        </p:spPr>
+      </p:pic>
+      <p:pic>
+        <p:nvPicPr>
+          <p:cNvPr id="42" name="Image 41">
+            <a:extLst>
+              <a:ext uri="{FF2B5EF4-FFF2-40B4-BE49-F238E27FC236}">
+                <a16:creationId xmlns:a16="http://schemas.microsoft.com/office/drawing/2014/main" id="{A771C1ED-CB1A-4797-AA3E-359C6370C40F}"/>
+              </a:ext>
+            </a:extLst>
+          </p:cNvPr>
+          <p:cNvPicPr>
+            <a:picLocks noChangeAspect="1"/>
+          </p:cNvPicPr>
+          <p:nvPr/>
+        </p:nvPicPr>
+        <p:blipFill>
+          <a:blip r:embed="rId9">
+            <a:extLst>
+              <a:ext uri="{28A0092B-C50C-407E-A947-70E740481C1C}">
+                <a14:useLocalDpi xmlns:a14="http://schemas.microsoft.com/office/drawing/2010/main" val="0"/>
+              </a:ext>
+            </a:extLst>
+          </a:blip>
+          <a:stretch>
+            <a:fillRect/>
+          </a:stretch>
+        </p:blipFill>
+        <p:spPr>
+          <a:xfrm>
+            <a:off x="9472457" y="5246788"/>
+            <a:ext cx="2560000" cy="1440000"/>
+          </a:xfrm>
+          <a:prstGeom prst="rect">
+            <a:avLst/>
+          </a:prstGeom>
+        </p:spPr>
+      </p:pic>
     </p:spTree>
     <p:extLst>
       <p:ext uri="{BB962C8B-B14F-4D97-AF65-F5344CB8AC3E}">

</xml_diff>

<commit_message>
Fin contexte projet - planning prévisionnel
</commit_message>
<xml_diff>
--- a/Planning prévisionnel.pptx
+++ b/Planning prévisionnel.pptx
@@ -869,6 +869,13 @@
     <dgm:pt modelId="{22C0A65A-AC02-43DF-943F-9DBB4A918698}" type="doc">
       <dgm:prSet loTypeId="urn:microsoft.com/office/officeart/2005/8/layout/hChevron3" loCatId="process" qsTypeId="urn:microsoft.com/office/officeart/2005/8/quickstyle/simple2" qsCatId="simple" csTypeId="urn:microsoft.com/office/officeart/2005/8/colors/accent1_2" csCatId="accent1" phldr="1"/>
       <dgm:spPr/>
+      <dgm:t>
+        <a:bodyPr/>
+        <a:lstStyle/>
+        <a:p>
+          <a:endParaRPr lang="fr-FR"/>
+        </a:p>
+      </dgm:t>
     </dgm:pt>
     <dgm:pt modelId="{0863FD42-86FB-4C9B-9811-27EA5010166D}">
       <dgm:prSet phldrT="[Texte]"/>
@@ -1506,7 +1513,7 @@
   <dgm:whole/>
   <dgm:extLst>
     <a:ext uri="http://schemas.microsoft.com/office/drawing/2008/diagram">
-      <dsp:dataModelExt xmlns:dsp="http://schemas.microsoft.com/office/drawing/2008/diagram" relId="rId6" minVer="http://schemas.openxmlformats.org/drawingml/2006/diagram"/>
+      <dsp:dataModelExt xmlns:dsp="http://schemas.microsoft.com/office/drawing/2008/diagram" relId="rId7" minVer="http://schemas.openxmlformats.org/drawingml/2006/diagram"/>
     </a:ext>
   </dgm:extLst>
 </dgm:dataModel>
@@ -3913,7 +3920,7 @@
           <a:p>
             <a:fld id="{8BA915E5-5DBD-445D-A40C-D4BFAC4EBC40}" type="datetimeFigureOut">
               <a:rPr lang="fr-FR" smtClean="0"/>
-              <a:t>01/08/2017</a:t>
+              <a:t>02/08/2017</a:t>
             </a:fld>
             <a:endParaRPr lang="fr-FR"/>
           </a:p>
@@ -4111,7 +4118,7 @@
           <a:p>
             <a:fld id="{8BA915E5-5DBD-445D-A40C-D4BFAC4EBC40}" type="datetimeFigureOut">
               <a:rPr lang="fr-FR" smtClean="0"/>
-              <a:t>01/08/2017</a:t>
+              <a:t>02/08/2017</a:t>
             </a:fld>
             <a:endParaRPr lang="fr-FR"/>
           </a:p>
@@ -4319,7 +4326,7 @@
           <a:p>
             <a:fld id="{8BA915E5-5DBD-445D-A40C-D4BFAC4EBC40}" type="datetimeFigureOut">
               <a:rPr lang="fr-FR" smtClean="0"/>
-              <a:t>01/08/2017</a:t>
+              <a:t>02/08/2017</a:t>
             </a:fld>
             <a:endParaRPr lang="fr-FR"/>
           </a:p>
@@ -4517,7 +4524,7 @@
           <a:p>
             <a:fld id="{8BA915E5-5DBD-445D-A40C-D4BFAC4EBC40}" type="datetimeFigureOut">
               <a:rPr lang="fr-FR" smtClean="0"/>
-              <a:t>01/08/2017</a:t>
+              <a:t>02/08/2017</a:t>
             </a:fld>
             <a:endParaRPr lang="fr-FR"/>
           </a:p>
@@ -4792,7 +4799,7 @@
           <a:p>
             <a:fld id="{8BA915E5-5DBD-445D-A40C-D4BFAC4EBC40}" type="datetimeFigureOut">
               <a:rPr lang="fr-FR" smtClean="0"/>
-              <a:t>01/08/2017</a:t>
+              <a:t>02/08/2017</a:t>
             </a:fld>
             <a:endParaRPr lang="fr-FR"/>
           </a:p>
@@ -5057,7 +5064,7 @@
           <a:p>
             <a:fld id="{8BA915E5-5DBD-445D-A40C-D4BFAC4EBC40}" type="datetimeFigureOut">
               <a:rPr lang="fr-FR" smtClean="0"/>
-              <a:t>01/08/2017</a:t>
+              <a:t>02/08/2017</a:t>
             </a:fld>
             <a:endParaRPr lang="fr-FR"/>
           </a:p>
@@ -5469,7 +5476,7 @@
           <a:p>
             <a:fld id="{8BA915E5-5DBD-445D-A40C-D4BFAC4EBC40}" type="datetimeFigureOut">
               <a:rPr lang="fr-FR" smtClean="0"/>
-              <a:t>01/08/2017</a:t>
+              <a:t>02/08/2017</a:t>
             </a:fld>
             <a:endParaRPr lang="fr-FR"/>
           </a:p>
@@ -5610,7 +5617,7 @@
           <a:p>
             <a:fld id="{8BA915E5-5DBD-445D-A40C-D4BFAC4EBC40}" type="datetimeFigureOut">
               <a:rPr lang="fr-FR" smtClean="0"/>
-              <a:t>01/08/2017</a:t>
+              <a:t>02/08/2017</a:t>
             </a:fld>
             <a:endParaRPr lang="fr-FR"/>
           </a:p>
@@ -5723,7 +5730,7 @@
           <a:p>
             <a:fld id="{8BA915E5-5DBD-445D-A40C-D4BFAC4EBC40}" type="datetimeFigureOut">
               <a:rPr lang="fr-FR" smtClean="0"/>
-              <a:t>01/08/2017</a:t>
+              <a:t>02/08/2017</a:t>
             </a:fld>
             <a:endParaRPr lang="fr-FR"/>
           </a:p>
@@ -6034,7 +6041,7 @@
           <a:p>
             <a:fld id="{8BA915E5-5DBD-445D-A40C-D4BFAC4EBC40}" type="datetimeFigureOut">
               <a:rPr lang="fr-FR" smtClean="0"/>
-              <a:t>01/08/2017</a:t>
+              <a:t>02/08/2017</a:t>
             </a:fld>
             <a:endParaRPr lang="fr-FR"/>
           </a:p>
@@ -6322,7 +6329,7 @@
           <a:p>
             <a:fld id="{8BA915E5-5DBD-445D-A40C-D4BFAC4EBC40}" type="datetimeFigureOut">
               <a:rPr lang="fr-FR" smtClean="0"/>
-              <a:t>01/08/2017</a:t>
+              <a:t>02/08/2017</a:t>
             </a:fld>
             <a:endParaRPr lang="fr-FR"/>
           </a:p>
@@ -6563,7 +6570,7 @@
           <a:p>
             <a:fld id="{8BA915E5-5DBD-445D-A40C-D4BFAC4EBC40}" type="datetimeFigureOut">
               <a:rPr lang="fr-FR" smtClean="0"/>
-              <a:t>01/08/2017</a:t>
+              <a:t>02/08/2017</a:t>
             </a:fld>
             <a:endParaRPr lang="fr-FR"/>
           </a:p>
@@ -6980,6 +6987,42 @@
           <a:chExt cx="0" cy="0"/>
         </a:xfrm>
       </p:grpSpPr>
+      <p:pic>
+        <p:nvPicPr>
+          <p:cNvPr id="42" name="Image 41">
+            <a:extLst>
+              <a:ext uri="{FF2B5EF4-FFF2-40B4-BE49-F238E27FC236}">
+                <a16:creationId xmlns:a16="http://schemas.microsoft.com/office/drawing/2014/main" id="{A771C1ED-CB1A-4797-AA3E-359C6370C40F}"/>
+              </a:ext>
+            </a:extLst>
+          </p:cNvPr>
+          <p:cNvPicPr>
+            <a:picLocks noChangeAspect="1"/>
+          </p:cNvPicPr>
+          <p:nvPr/>
+        </p:nvPicPr>
+        <p:blipFill>
+          <a:blip r:embed="rId2">
+            <a:extLst>
+              <a:ext uri="{28A0092B-C50C-407E-A947-70E740481C1C}">
+                <a14:useLocalDpi xmlns:a14="http://schemas.microsoft.com/office/drawing/2010/main" val="0"/>
+              </a:ext>
+            </a:extLst>
+          </a:blip>
+          <a:stretch>
+            <a:fillRect/>
+          </a:stretch>
+        </p:blipFill>
+        <p:spPr>
+          <a:xfrm>
+            <a:off x="8997931" y="5094040"/>
+            <a:ext cx="2880000" cy="1620000"/>
+          </a:xfrm>
+          <a:prstGeom prst="rect">
+            <a:avLst/>
+          </a:prstGeom>
+        </p:spPr>
+      </p:pic>
       <p:sp>
         <p:nvSpPr>
           <p:cNvPr id="44" name="ZoneTexte 43">
@@ -7228,7 +7271,7 @@
         </p:xfrm>
         <a:graphic>
           <a:graphicData uri="http://schemas.openxmlformats.org/drawingml/2006/diagram">
-            <dgm:relIds xmlns:dgm="http://schemas.openxmlformats.org/drawingml/2006/diagram" xmlns:r="http://schemas.openxmlformats.org/officeDocument/2006/relationships" r:dm="rId2" r:lo="rId3" r:qs="rId4" r:cs="rId5"/>
+            <dgm:relIds xmlns:dgm="http://schemas.openxmlformats.org/drawingml/2006/diagram" xmlns:r="http://schemas.openxmlformats.org/officeDocument/2006/relationships" r:dm="rId3" r:lo="rId4" r:qs="rId5" r:cs="rId6"/>
           </a:graphicData>
         </a:graphic>
       </p:graphicFrame>
@@ -9323,7 +9366,7 @@
         <p:spPr>
           <a:xfrm>
             <a:off x="5055733" y="3171555"/>
-            <a:ext cx="936000" cy="1277273"/>
+            <a:ext cx="936000" cy="769441"/>
           </a:xfrm>
           <a:prstGeom prst="rect">
             <a:avLst/>
@@ -9342,17 +9385,6 @@
               <a:t>Refonte du projet achevé à 80%</a:t>
             </a:r>
           </a:p>
-          <a:p>
-            <a:pPr algn="ctr"/>
-            <a:endParaRPr lang="fr-FR" sz="1100" dirty="0"/>
-          </a:p>
-          <a:p>
-            <a:pPr algn="ctr"/>
-            <a:r>
-              <a:rPr lang="fr-FR" sz="1100" dirty="0"/>
-              <a:t>Version 2.0</a:t>
-            </a:r>
-          </a:p>
         </p:txBody>
       </p:sp>
       <p:sp>
@@ -9370,7 +9402,7 @@
         <p:spPr>
           <a:xfrm>
             <a:off x="6004674" y="3057188"/>
-            <a:ext cx="1044000" cy="1954381"/>
+            <a:ext cx="1044000" cy="1446550"/>
           </a:xfrm>
           <a:prstGeom prst="rect">
             <a:avLst/>
@@ -9426,23 +9458,6 @@
               <a:t>Début jeu Poupée</a:t>
             </a:r>
           </a:p>
-          <a:p>
-            <a:pPr algn="ctr"/>
-            <a:endParaRPr lang="fr-FR" sz="1100" dirty="0">
-              <a:solidFill>
-                <a:schemeClr val="bg2">
-                  <a:lumMod val="50000"/>
-                </a:schemeClr>
-              </a:solidFill>
-            </a:endParaRPr>
-          </a:p>
-          <a:p>
-            <a:pPr algn="ctr"/>
-            <a:r>
-              <a:rPr lang="fr-FR" sz="1100" dirty="0"/>
-              <a:t>Projet testé à 51%</a:t>
-            </a:r>
-          </a:p>
         </p:txBody>
       </p:sp>
       <p:sp>
@@ -9460,7 +9475,7 @@
         <p:spPr>
           <a:xfrm>
             <a:off x="7016922" y="3368619"/>
-            <a:ext cx="1116000" cy="1954381"/>
+            <a:ext cx="1116000" cy="1446550"/>
           </a:xfrm>
           <a:prstGeom prst="rect">
             <a:avLst/>
@@ -9500,6 +9515,169 @@
               <a:t>Collaborateur</a:t>
             </a:r>
           </a:p>
+        </p:txBody>
+      </p:sp>
+      <p:sp>
+        <p:nvSpPr>
+          <p:cNvPr id="49" name="ZoneTexte 48">
+            <a:extLst>
+              <a:ext uri="{FF2B5EF4-FFF2-40B4-BE49-F238E27FC236}">
+                <a16:creationId xmlns:a16="http://schemas.microsoft.com/office/drawing/2014/main" id="{91F480C6-C559-423E-B99F-99B47AB26F1F}"/>
+              </a:ext>
+            </a:extLst>
+          </p:cNvPr>
+          <p:cNvSpPr txBox="1"/>
+          <p:nvPr/>
+        </p:nvSpPr>
+        <p:spPr>
+          <a:xfrm>
+            <a:off x="7879031" y="3940129"/>
+            <a:ext cx="1404000" cy="1446550"/>
+          </a:xfrm>
+          <a:prstGeom prst="rect">
+            <a:avLst/>
+          </a:prstGeom>
+          <a:noFill/>
+        </p:spPr>
+        <p:txBody>
+          <a:bodyPr wrap="square" rtlCol="0">
+            <a:spAutoFit/>
+          </a:bodyPr>
+          <a:lstStyle/>
+          <a:p>
+            <a:pPr algn="ctr"/>
+            <a:r>
+              <a:rPr lang="fr-FR" sz="1100" dirty="0"/>
+              <a:t>Amélioration jeu Poupée</a:t>
+            </a:r>
+            <a:br>
+              <a:rPr lang="fr-FR" sz="1100" dirty="0"/>
+            </a:br>
+            <a:r>
+              <a:rPr lang="fr-FR" sz="1100" dirty="0"/>
+              <a:t>Redimensionnement Mise en forme des éléments graphiques</a:t>
+            </a:r>
+          </a:p>
+          <a:p>
+            <a:pPr algn="ctr"/>
+            <a:r>
+              <a:rPr lang="fr-FR" sz="1100" dirty="0">
+                <a:solidFill>
+                  <a:schemeClr val="bg2">
+                    <a:lumMod val="50000"/>
+                  </a:schemeClr>
+                </a:solidFill>
+              </a:rPr>
+              <a:t>Admin</a:t>
+            </a:r>
+          </a:p>
+          <a:p>
+            <a:pPr algn="ctr"/>
+            <a:endParaRPr lang="fr-FR" sz="1100" dirty="0"/>
+          </a:p>
+          <a:p>
+            <a:pPr algn="ctr"/>
+            <a:endParaRPr lang="fr-FR" sz="1100" dirty="0"/>
+          </a:p>
+        </p:txBody>
+      </p:sp>
+      <p:sp>
+        <p:nvSpPr>
+          <p:cNvPr id="50" name="ZoneTexte 49">
+            <a:extLst>
+              <a:ext uri="{FF2B5EF4-FFF2-40B4-BE49-F238E27FC236}">
+                <a16:creationId xmlns:a16="http://schemas.microsoft.com/office/drawing/2014/main" id="{2DD9D0B8-B567-460B-AFA9-801E9C2A2648}"/>
+              </a:ext>
+            </a:extLst>
+          </p:cNvPr>
+          <p:cNvSpPr txBox="1"/>
+          <p:nvPr/>
+        </p:nvSpPr>
+        <p:spPr>
+          <a:xfrm>
+            <a:off x="9074103" y="3914101"/>
+            <a:ext cx="1224000" cy="1107996"/>
+          </a:xfrm>
+          <a:prstGeom prst="rect">
+            <a:avLst/>
+          </a:prstGeom>
+          <a:noFill/>
+        </p:spPr>
+        <p:txBody>
+          <a:bodyPr wrap="square" rtlCol="0">
+            <a:spAutoFit/>
+          </a:bodyPr>
+          <a:lstStyle/>
+          <a:p>
+            <a:pPr algn="ctr"/>
+            <a:r>
+              <a:rPr lang="fr-FR" sz="1100" dirty="0"/>
+              <a:t>Persistance données jeu Poupée</a:t>
+            </a:r>
+            <a:br>
+              <a:rPr lang="fr-FR" sz="1100" dirty="0"/>
+            </a:br>
+            <a:r>
+              <a:rPr lang="fr-FR" sz="1100" dirty="0"/>
+              <a:t>Implémentation des règles de la Poupée</a:t>
+            </a:r>
+          </a:p>
+        </p:txBody>
+      </p:sp>
+      <p:sp>
+        <p:nvSpPr>
+          <p:cNvPr id="51" name="ZoneTexte 50">
+            <a:extLst>
+              <a:ext uri="{FF2B5EF4-FFF2-40B4-BE49-F238E27FC236}">
+                <a16:creationId xmlns:a16="http://schemas.microsoft.com/office/drawing/2014/main" id="{43E14C9D-78A4-44E7-8E12-F924202D8BEA}"/>
+              </a:ext>
+            </a:extLst>
+          </p:cNvPr>
+          <p:cNvSpPr txBox="1"/>
+          <p:nvPr/>
+        </p:nvSpPr>
+        <p:spPr>
+          <a:xfrm>
+            <a:off x="10038606" y="3930905"/>
+            <a:ext cx="972000" cy="1277273"/>
+          </a:xfrm>
+          <a:prstGeom prst="rect">
+            <a:avLst/>
+          </a:prstGeom>
+          <a:noFill/>
+        </p:spPr>
+        <p:txBody>
+          <a:bodyPr wrap="square" rtlCol="0">
+            <a:spAutoFit/>
+          </a:bodyPr>
+          <a:lstStyle/>
+          <a:p>
+            <a:pPr algn="ctr"/>
+            <a:r>
+              <a:rPr lang="fr-FR" sz="1100" dirty="0"/>
+              <a:t>Jeu de la Poupée fonctionnel</a:t>
+            </a:r>
+            <a:br>
+              <a:rPr lang="fr-FR" sz="1100" dirty="0"/>
+            </a:br>
+            <a:r>
+              <a:rPr lang="fr-FR" sz="1100" dirty="0"/>
+              <a:t>Pop-up de validation</a:t>
+            </a:r>
+            <a:br>
+              <a:rPr lang="fr-FR" sz="1100" dirty="0"/>
+            </a:br>
+            <a:r>
+              <a:rPr lang="fr-FR" sz="1100" dirty="0">
+                <a:solidFill>
+                  <a:schemeClr val="bg2">
+                    <a:lumMod val="50000"/>
+                  </a:schemeClr>
+                </a:solidFill>
+              </a:rPr>
+              <a:t>Collaborateur</a:t>
+            </a:r>
+          </a:p>
           <a:p>
             <a:pPr algn="ctr"/>
             <a:endParaRPr lang="fr-FR" sz="1100" dirty="0">
@@ -9510,27 +9688,14 @@
               </a:solidFill>
             </a:endParaRPr>
           </a:p>
-          <a:p>
-            <a:pPr algn="ctr"/>
-            <a:r>
-              <a:rPr lang="fr-FR" sz="1100" dirty="0">
-                <a:solidFill>
-                  <a:schemeClr val="bg2">
-                    <a:lumMod val="50000"/>
-                  </a:schemeClr>
-                </a:solidFill>
-              </a:rPr>
-              <a:t>Projet testé à 80 %</a:t>
-            </a:r>
-          </a:p>
         </p:txBody>
       </p:sp>
       <p:sp>
         <p:nvSpPr>
-          <p:cNvPr id="49" name="ZoneTexte 48">
-            <a:extLst>
-              <a:ext uri="{FF2B5EF4-FFF2-40B4-BE49-F238E27FC236}">
-                <a16:creationId xmlns:a16="http://schemas.microsoft.com/office/drawing/2014/main" id="{91F480C6-C559-423E-B99F-99B47AB26F1F}"/>
+          <p:cNvPr id="52" name="ZoneTexte 51">
+            <a:extLst>
+              <a:ext uri="{FF2B5EF4-FFF2-40B4-BE49-F238E27FC236}">
+                <a16:creationId xmlns:a16="http://schemas.microsoft.com/office/drawing/2014/main" id="{7FEEFA9E-2C95-48FA-8C83-101943784E7C}"/>
               </a:ext>
             </a:extLst>
           </p:cNvPr>
@@ -9539,15 +9704,13 @@
         </p:nvSpPr>
         <p:spPr>
           <a:xfrm>
-            <a:off x="8239347" y="3808753"/>
-            <a:ext cx="666551" cy="600164"/>
+            <a:off x="11032655" y="3945731"/>
+            <a:ext cx="936000" cy="938719"/>
           </a:xfrm>
           <a:prstGeom prst="rect">
             <a:avLst/>
           </a:prstGeom>
-          <a:solidFill>
-            <a:schemeClr val="bg1"/>
-          </a:solidFill>
+          <a:noFill/>
         </p:spPr>
         <p:txBody>
           <a:bodyPr wrap="square" rtlCol="0">
@@ -9558,121 +9721,18 @@
             <a:pPr algn="ctr"/>
             <a:r>
               <a:rPr lang="fr-FR" sz="1100" dirty="0"/>
-              <a:t>13/02, arrivée à VISEO</a:t>
-            </a:r>
-          </a:p>
-        </p:txBody>
-      </p:sp>
-      <p:sp>
-        <p:nvSpPr>
-          <p:cNvPr id="50" name="ZoneTexte 49">
-            <a:extLst>
-              <a:ext uri="{FF2B5EF4-FFF2-40B4-BE49-F238E27FC236}">
-                <a16:creationId xmlns:a16="http://schemas.microsoft.com/office/drawing/2014/main" id="{2DD9D0B8-B567-460B-AFA9-801E9C2A2648}"/>
-              </a:ext>
-            </a:extLst>
-          </p:cNvPr>
-          <p:cNvSpPr txBox="1"/>
-          <p:nvPr/>
-        </p:nvSpPr>
-        <p:spPr>
-          <a:xfrm>
-            <a:off x="9220963" y="3842158"/>
-            <a:ext cx="666551" cy="600164"/>
-          </a:xfrm>
-          <a:prstGeom prst="rect">
-            <a:avLst/>
-          </a:prstGeom>
-          <a:solidFill>
-            <a:schemeClr val="bg1"/>
-          </a:solidFill>
-        </p:spPr>
-        <p:txBody>
-          <a:bodyPr wrap="square" rtlCol="0">
-            <a:spAutoFit/>
-          </a:bodyPr>
-          <a:lstStyle/>
+              <a:t>Amélioration jeu Poupée</a:t>
+            </a:r>
+          </a:p>
           <a:p>
             <a:pPr algn="ctr"/>
+            <a:endParaRPr lang="fr-FR" sz="1100" dirty="0"/>
+          </a:p>
+          <a:p>
+            <a:pPr algn="ctr"/>
             <a:r>
               <a:rPr lang="fr-FR" sz="1100" dirty="0"/>
-              <a:t>13/02, arrivée à VISEO</a:t>
-            </a:r>
-          </a:p>
-        </p:txBody>
-      </p:sp>
-      <p:sp>
-        <p:nvSpPr>
-          <p:cNvPr id="51" name="ZoneTexte 50">
-            <a:extLst>
-              <a:ext uri="{FF2B5EF4-FFF2-40B4-BE49-F238E27FC236}">
-                <a16:creationId xmlns:a16="http://schemas.microsoft.com/office/drawing/2014/main" id="{43E14C9D-78A4-44E7-8E12-F924202D8BEA}"/>
-              </a:ext>
-            </a:extLst>
-          </p:cNvPr>
-          <p:cNvSpPr txBox="1"/>
-          <p:nvPr/>
-        </p:nvSpPr>
-        <p:spPr>
-          <a:xfrm>
-            <a:off x="10192055" y="3783435"/>
-            <a:ext cx="666551" cy="600164"/>
-          </a:xfrm>
-          <a:prstGeom prst="rect">
-            <a:avLst/>
-          </a:prstGeom>
-          <a:solidFill>
-            <a:schemeClr val="bg1"/>
-          </a:solidFill>
-        </p:spPr>
-        <p:txBody>
-          <a:bodyPr wrap="square" rtlCol="0">
-            <a:spAutoFit/>
-          </a:bodyPr>
-          <a:lstStyle/>
-          <a:p>
-            <a:pPr algn="ctr"/>
-            <a:r>
-              <a:rPr lang="fr-FR" sz="1100" dirty="0"/>
-              <a:t>13/02, arrivée à VISEO</a:t>
-            </a:r>
-          </a:p>
-        </p:txBody>
-      </p:sp>
-      <p:sp>
-        <p:nvSpPr>
-          <p:cNvPr id="52" name="ZoneTexte 51">
-            <a:extLst>
-              <a:ext uri="{FF2B5EF4-FFF2-40B4-BE49-F238E27FC236}">
-                <a16:creationId xmlns:a16="http://schemas.microsoft.com/office/drawing/2014/main" id="{7FEEFA9E-2C95-48FA-8C83-101943784E7C}"/>
-              </a:ext>
-            </a:extLst>
-          </p:cNvPr>
-          <p:cNvSpPr txBox="1"/>
-          <p:nvPr/>
-        </p:nvSpPr>
-        <p:spPr>
-          <a:xfrm>
-            <a:off x="11167379" y="3916752"/>
-            <a:ext cx="666551" cy="600164"/>
-          </a:xfrm>
-          <a:prstGeom prst="rect">
-            <a:avLst/>
-          </a:prstGeom>
-          <a:solidFill>
-            <a:schemeClr val="bg1"/>
-          </a:solidFill>
-        </p:spPr>
-        <p:txBody>
-          <a:bodyPr wrap="square" rtlCol="0">
-            <a:spAutoFit/>
-          </a:bodyPr>
-          <a:lstStyle/>
-          <a:p>
-            <a:pPr algn="ctr"/>
-            <a:r>
-              <a:rPr lang="fr-FR" sz="1100" dirty="0"/>
-              <a:t>13/02, arrivée à VISEO</a:t>
+              <a:t>Nouvelle interface </a:t>
             </a:r>
           </a:p>
         </p:txBody>
@@ -9706,7 +9766,7 @@
           <a:lstStyle/>
           <a:p>
             <a:r>
-              <a:rPr lang="fr-FR" sz="1200" i="1" dirty="0">
+              <a:rPr lang="fr-FR" sz="1200" b="1" i="1" dirty="0">
                 <a:solidFill>
                   <a:schemeClr val="accent1">
                     <a:lumMod val="40000"/>
@@ -9748,7 +9808,7 @@
           <a:lstStyle/>
           <a:p>
             <a:r>
-              <a:rPr lang="fr-FR" sz="1200" i="1" dirty="0">
+              <a:rPr lang="fr-FR" sz="1200" b="1" i="1" dirty="0">
                 <a:solidFill>
                   <a:schemeClr val="accent1">
                     <a:lumMod val="40000"/>
@@ -9790,7 +9850,7 @@
           <a:lstStyle/>
           <a:p>
             <a:r>
-              <a:rPr lang="fr-FR" sz="1200" i="1" dirty="0">
+              <a:rPr lang="fr-FR" sz="1200" b="1" i="1" dirty="0">
                 <a:solidFill>
                   <a:schemeClr val="accent1">
                     <a:lumMod val="40000"/>
@@ -9832,7 +9892,7 @@
           <a:lstStyle/>
           <a:p>
             <a:r>
-              <a:rPr lang="fr-FR" sz="1200" i="1" dirty="0">
+              <a:rPr lang="fr-FR" sz="1200" b="1" i="1" dirty="0">
                 <a:solidFill>
                   <a:schemeClr val="accent1">
                     <a:lumMod val="40000"/>
@@ -9860,7 +9920,7 @@
           <p:nvPr/>
         </p:nvPicPr>
         <p:blipFill>
-          <a:blip r:embed="rId7">
+          <a:blip r:embed="rId8">
             <a:extLst>
               <a:ext uri="{28A0092B-C50C-407E-A947-70E740481C1C}">
                 <a14:useLocalDpi xmlns:a14="http://schemas.microsoft.com/office/drawing/2010/main" val="0"/>
@@ -9895,64 +9955,636 @@
           </p:cNvPicPr>
           <p:nvPr/>
         </p:nvPicPr>
-        <p:blipFill>
-          <a:blip r:embed="rId8">
+        <p:blipFill rotWithShape="1">
+          <a:blip r:embed="rId9">
             <a:extLst>
               <a:ext uri="{28A0092B-C50C-407E-A947-70E740481C1C}">
                 <a14:useLocalDpi xmlns:a14="http://schemas.microsoft.com/office/drawing/2010/main" val="0"/>
               </a:ext>
             </a:extLst>
           </a:blip>
-          <a:stretch>
-            <a:fillRect/>
-          </a:stretch>
+          <a:srcRect b="33749"/>
+          <a:stretch/>
         </p:blipFill>
         <p:spPr>
           <a:xfrm>
-            <a:off x="5071171" y="5246788"/>
-            <a:ext cx="2560000" cy="1440000"/>
+            <a:off x="5205532" y="5181935"/>
+            <a:ext cx="2880000" cy="1214421"/>
           </a:xfrm>
           <a:prstGeom prst="rect">
             <a:avLst/>
           </a:prstGeom>
         </p:spPr>
       </p:pic>
-      <p:pic>
-        <p:nvPicPr>
-          <p:cNvPr id="42" name="Image 41">
-            <a:extLst>
-              <a:ext uri="{FF2B5EF4-FFF2-40B4-BE49-F238E27FC236}">
-                <a16:creationId xmlns:a16="http://schemas.microsoft.com/office/drawing/2014/main" id="{A771C1ED-CB1A-4797-AA3E-359C6370C40F}"/>
-              </a:ext>
-            </a:extLst>
-          </p:cNvPr>
-          <p:cNvPicPr>
-            <a:picLocks noChangeAspect="1"/>
-          </p:cNvPicPr>
+      <p:sp>
+        <p:nvSpPr>
+          <p:cNvPr id="7" name="Rectangle 6">
+            <a:extLst>
+              <a:ext uri="{FF2B5EF4-FFF2-40B4-BE49-F238E27FC236}">
+                <a16:creationId xmlns:a16="http://schemas.microsoft.com/office/drawing/2014/main" id="{23AC6261-A88F-4472-BECC-C5C89FC2CEF2}"/>
+              </a:ext>
+            </a:extLst>
+          </p:cNvPr>
+          <p:cNvSpPr/>
           <p:nvPr/>
-        </p:nvPicPr>
-        <p:blipFill>
-          <a:blip r:embed="rId9">
-            <a:extLst>
-              <a:ext uri="{28A0092B-C50C-407E-A947-70E740481C1C}">
-                <a14:useLocalDpi xmlns:a14="http://schemas.microsoft.com/office/drawing/2010/main" val="0"/>
-              </a:ext>
-            </a:extLst>
-          </a:blip>
-          <a:stretch>
-            <a:fillRect/>
-          </a:stretch>
-        </p:blipFill>
+        </p:nvSpPr>
         <p:spPr>
           <a:xfrm>
-            <a:off x="9472457" y="5246788"/>
-            <a:ext cx="2560000" cy="1440000"/>
+            <a:off x="4869186" y="3113"/>
+            <a:ext cx="1298496" cy="615553"/>
           </a:xfrm>
           <a:prstGeom prst="rect">
             <a:avLst/>
           </a:prstGeom>
         </p:spPr>
-      </p:pic>
+        <p:txBody>
+          <a:bodyPr wrap="none">
+            <a:spAutoFit/>
+          </a:bodyPr>
+          <a:lstStyle/>
+          <a:p>
+            <a:pPr algn="ctr"/>
+            <a:r>
+              <a:rPr lang="fr-FR" b="1" dirty="0">
+                <a:solidFill>
+                  <a:schemeClr val="accent6"/>
+                </a:solidFill>
+              </a:rPr>
+              <a:t>Version 2.0 </a:t>
+            </a:r>
+          </a:p>
+          <a:p>
+            <a:pPr algn="ctr"/>
+            <a:r>
+              <a:rPr lang="fr-FR" sz="1600" b="1" dirty="0">
+                <a:solidFill>
+                  <a:srgbClr val="FFC000"/>
+                </a:solidFill>
+              </a:rPr>
+              <a:t>Tests 73%</a:t>
+            </a:r>
+          </a:p>
+        </p:txBody>
+      </p:sp>
+      <p:sp>
+        <p:nvSpPr>
+          <p:cNvPr id="22" name="Rectangle 21">
+            <a:extLst>
+              <a:ext uri="{FF2B5EF4-FFF2-40B4-BE49-F238E27FC236}">
+                <a16:creationId xmlns:a16="http://schemas.microsoft.com/office/drawing/2014/main" id="{95B5D9B3-EF8D-4461-8747-1AE440FE369E}"/>
+              </a:ext>
+            </a:extLst>
+          </p:cNvPr>
+          <p:cNvSpPr/>
+          <p:nvPr/>
+        </p:nvSpPr>
+        <p:spPr>
+          <a:xfrm>
+            <a:off x="9901807" y="-519"/>
+            <a:ext cx="1245597" cy="615553"/>
+          </a:xfrm>
+          <a:prstGeom prst="rect">
+            <a:avLst/>
+          </a:prstGeom>
+        </p:spPr>
+        <p:txBody>
+          <a:bodyPr wrap="none">
+            <a:spAutoFit/>
+          </a:bodyPr>
+          <a:lstStyle/>
+          <a:p>
+            <a:pPr algn="ctr"/>
+            <a:r>
+              <a:rPr lang="fr-FR" b="1" dirty="0">
+                <a:solidFill>
+                  <a:schemeClr val="accent6"/>
+                </a:solidFill>
+              </a:rPr>
+              <a:t>Version 2.1</a:t>
+            </a:r>
+            <a:br>
+              <a:rPr lang="fr-FR" b="1" dirty="0">
+                <a:solidFill>
+                  <a:schemeClr val="accent6"/>
+                </a:solidFill>
+              </a:rPr>
+            </a:br>
+            <a:r>
+              <a:rPr lang="fr-FR" sz="1600" b="1" dirty="0">
+                <a:solidFill>
+                  <a:schemeClr val="accent6"/>
+                </a:solidFill>
+              </a:rPr>
+              <a:t>Tests 86%</a:t>
+            </a:r>
+            <a:endParaRPr lang="fr-FR" b="1" dirty="0">
+              <a:solidFill>
+                <a:schemeClr val="accent6"/>
+              </a:solidFill>
+            </a:endParaRPr>
+          </a:p>
+        </p:txBody>
+      </p:sp>
+      <p:sp>
+        <p:nvSpPr>
+          <p:cNvPr id="53" name="Rectangle 52">
+            <a:extLst>
+              <a:ext uri="{FF2B5EF4-FFF2-40B4-BE49-F238E27FC236}">
+                <a16:creationId xmlns:a16="http://schemas.microsoft.com/office/drawing/2014/main" id="{D82F3446-7728-4AAD-BDCE-71B9CBC79D26}"/>
+              </a:ext>
+            </a:extLst>
+          </p:cNvPr>
+          <p:cNvSpPr/>
+          <p:nvPr/>
+        </p:nvSpPr>
+        <p:spPr>
+          <a:xfrm>
+            <a:off x="-87490" y="16838"/>
+            <a:ext cx="1245597" cy="615553"/>
+          </a:xfrm>
+          <a:prstGeom prst="rect">
+            <a:avLst/>
+          </a:prstGeom>
+        </p:spPr>
+        <p:txBody>
+          <a:bodyPr wrap="none">
+            <a:spAutoFit/>
+          </a:bodyPr>
+          <a:lstStyle/>
+          <a:p>
+            <a:pPr algn="ctr"/>
+            <a:r>
+              <a:rPr lang="fr-FR" b="1" dirty="0">
+                <a:solidFill>
+                  <a:schemeClr val="accent6"/>
+                </a:solidFill>
+              </a:rPr>
+              <a:t>Version 1.0</a:t>
+            </a:r>
+          </a:p>
+          <a:p>
+            <a:pPr algn="ctr"/>
+            <a:r>
+              <a:rPr lang="fr-FR" sz="1600" b="1" dirty="0">
+                <a:solidFill>
+                  <a:schemeClr val="accent6"/>
+                </a:solidFill>
+              </a:rPr>
+              <a:t>Tests 90%</a:t>
+            </a:r>
+          </a:p>
+        </p:txBody>
+      </p:sp>
+      <p:sp>
+        <p:nvSpPr>
+          <p:cNvPr id="62" name="Rectangle 61">
+            <a:extLst>
+              <a:ext uri="{FF2B5EF4-FFF2-40B4-BE49-F238E27FC236}">
+                <a16:creationId xmlns:a16="http://schemas.microsoft.com/office/drawing/2014/main" id="{7DAB3559-21C6-4FDA-A0AD-61D9A3B2F2FC}"/>
+              </a:ext>
+            </a:extLst>
+          </p:cNvPr>
+          <p:cNvSpPr/>
+          <p:nvPr/>
+        </p:nvSpPr>
+        <p:spPr>
+          <a:xfrm>
+            <a:off x="1076958" y="33570"/>
+            <a:ext cx="1006173" cy="584775"/>
+          </a:xfrm>
+          <a:prstGeom prst="rect">
+            <a:avLst/>
+          </a:prstGeom>
+        </p:spPr>
+        <p:txBody>
+          <a:bodyPr wrap="none">
+            <a:spAutoFit/>
+          </a:bodyPr>
+          <a:lstStyle/>
+          <a:p>
+            <a:pPr algn="ctr"/>
+            <a:r>
+              <a:rPr lang="fr-FR" sz="1600" b="1" dirty="0">
+                <a:solidFill>
+                  <a:schemeClr val="accent6"/>
+                </a:solidFill>
+              </a:rPr>
+              <a:t> </a:t>
+            </a:r>
+          </a:p>
+          <a:p>
+            <a:pPr algn="ctr"/>
+            <a:r>
+              <a:rPr lang="fr-FR" sz="1600" b="1" dirty="0">
+                <a:solidFill>
+                  <a:srgbClr val="FFC000"/>
+                </a:solidFill>
+              </a:rPr>
+              <a:t>Tests 53%</a:t>
+            </a:r>
+          </a:p>
+        </p:txBody>
+      </p:sp>
+      <p:sp>
+        <p:nvSpPr>
+          <p:cNvPr id="64" name="Rectangle 63">
+            <a:extLst>
+              <a:ext uri="{FF2B5EF4-FFF2-40B4-BE49-F238E27FC236}">
+                <a16:creationId xmlns:a16="http://schemas.microsoft.com/office/drawing/2014/main" id="{082AEB42-5C15-4B57-A9D6-E9CA6AB246C2}"/>
+              </a:ext>
+            </a:extLst>
+          </p:cNvPr>
+          <p:cNvSpPr/>
+          <p:nvPr/>
+        </p:nvSpPr>
+        <p:spPr>
+          <a:xfrm>
+            <a:off x="2074322" y="33570"/>
+            <a:ext cx="1006173" cy="584775"/>
+          </a:xfrm>
+          <a:prstGeom prst="rect">
+            <a:avLst/>
+          </a:prstGeom>
+        </p:spPr>
+        <p:txBody>
+          <a:bodyPr wrap="none">
+            <a:spAutoFit/>
+          </a:bodyPr>
+          <a:lstStyle/>
+          <a:p>
+            <a:pPr algn="ctr"/>
+            <a:r>
+              <a:rPr lang="fr-FR" sz="1600" b="1" dirty="0">
+                <a:solidFill>
+                  <a:schemeClr val="accent6"/>
+                </a:solidFill>
+              </a:rPr>
+              <a:t> </a:t>
+            </a:r>
+          </a:p>
+          <a:p>
+            <a:pPr algn="ctr"/>
+            <a:r>
+              <a:rPr lang="fr-FR" sz="1600" b="1" dirty="0">
+                <a:solidFill>
+                  <a:srgbClr val="FFC000"/>
+                </a:solidFill>
+              </a:rPr>
+              <a:t>Tests 50%</a:t>
+            </a:r>
+          </a:p>
+        </p:txBody>
+      </p:sp>
+      <p:sp>
+        <p:nvSpPr>
+          <p:cNvPr id="67" name="Rectangle 66">
+            <a:extLst>
+              <a:ext uri="{FF2B5EF4-FFF2-40B4-BE49-F238E27FC236}">
+                <a16:creationId xmlns:a16="http://schemas.microsoft.com/office/drawing/2014/main" id="{7CD1F48F-20B5-4FCC-A46D-020CA4689898}"/>
+              </a:ext>
+            </a:extLst>
+          </p:cNvPr>
+          <p:cNvSpPr/>
+          <p:nvPr/>
+        </p:nvSpPr>
+        <p:spPr>
+          <a:xfrm>
+            <a:off x="3087140" y="33570"/>
+            <a:ext cx="1006173" cy="584775"/>
+          </a:xfrm>
+          <a:prstGeom prst="rect">
+            <a:avLst/>
+          </a:prstGeom>
+        </p:spPr>
+        <p:txBody>
+          <a:bodyPr wrap="none">
+            <a:spAutoFit/>
+          </a:bodyPr>
+          <a:lstStyle/>
+          <a:p>
+            <a:pPr algn="ctr"/>
+            <a:r>
+              <a:rPr lang="fr-FR" sz="1600" b="1" dirty="0">
+                <a:solidFill>
+                  <a:schemeClr val="accent6"/>
+                </a:solidFill>
+              </a:rPr>
+              <a:t> </a:t>
+            </a:r>
+          </a:p>
+          <a:p>
+            <a:pPr algn="ctr"/>
+            <a:r>
+              <a:rPr lang="fr-FR" sz="1600" b="1" dirty="0">
+                <a:solidFill>
+                  <a:srgbClr val="FFC000"/>
+                </a:solidFill>
+              </a:rPr>
+              <a:t>Tests 55%</a:t>
+            </a:r>
+          </a:p>
+        </p:txBody>
+      </p:sp>
+      <p:sp>
+        <p:nvSpPr>
+          <p:cNvPr id="71" name="Rectangle 70">
+            <a:extLst>
+              <a:ext uri="{FF2B5EF4-FFF2-40B4-BE49-F238E27FC236}">
+                <a16:creationId xmlns:a16="http://schemas.microsoft.com/office/drawing/2014/main" id="{B2A0F210-9105-4AAA-9A76-9B8DFA0259B5}"/>
+              </a:ext>
+            </a:extLst>
+          </p:cNvPr>
+          <p:cNvSpPr/>
+          <p:nvPr/>
+        </p:nvSpPr>
+        <p:spPr>
+          <a:xfrm>
+            <a:off x="4086297" y="33570"/>
+            <a:ext cx="1006173" cy="584775"/>
+          </a:xfrm>
+          <a:prstGeom prst="rect">
+            <a:avLst/>
+          </a:prstGeom>
+        </p:spPr>
+        <p:txBody>
+          <a:bodyPr wrap="none">
+            <a:spAutoFit/>
+          </a:bodyPr>
+          <a:lstStyle/>
+          <a:p>
+            <a:pPr algn="ctr"/>
+            <a:r>
+              <a:rPr lang="fr-FR" sz="1600" b="1" dirty="0">
+                <a:solidFill>
+                  <a:schemeClr val="accent6"/>
+                </a:solidFill>
+              </a:rPr>
+              <a:t> </a:t>
+            </a:r>
+          </a:p>
+          <a:p>
+            <a:pPr algn="ctr"/>
+            <a:r>
+              <a:rPr lang="fr-FR" sz="1600" b="1" dirty="0">
+                <a:solidFill>
+                  <a:srgbClr val="FFC000"/>
+                </a:solidFill>
+              </a:rPr>
+              <a:t>Tests 70%</a:t>
+            </a:r>
+          </a:p>
+        </p:txBody>
+      </p:sp>
+      <p:sp>
+        <p:nvSpPr>
+          <p:cNvPr id="72" name="Rectangle 71">
+            <a:extLst>
+              <a:ext uri="{FF2B5EF4-FFF2-40B4-BE49-F238E27FC236}">
+                <a16:creationId xmlns:a16="http://schemas.microsoft.com/office/drawing/2014/main" id="{7DE26DB5-1E8E-4179-B0AA-130B3DB6141F}"/>
+              </a:ext>
+            </a:extLst>
+          </p:cNvPr>
+          <p:cNvSpPr/>
+          <p:nvPr/>
+        </p:nvSpPr>
+        <p:spPr>
+          <a:xfrm>
+            <a:off x="5993802" y="33570"/>
+            <a:ext cx="1059072" cy="584775"/>
+          </a:xfrm>
+          <a:prstGeom prst="rect">
+            <a:avLst/>
+          </a:prstGeom>
+        </p:spPr>
+        <p:txBody>
+          <a:bodyPr wrap="none">
+            <a:spAutoFit/>
+          </a:bodyPr>
+          <a:lstStyle/>
+          <a:p>
+            <a:pPr algn="ctr"/>
+            <a:r>
+              <a:rPr lang="fr-FR" sz="1600" b="1" dirty="0">
+                <a:solidFill>
+                  <a:schemeClr val="accent6"/>
+                </a:solidFill>
+              </a:rPr>
+              <a:t> </a:t>
+            </a:r>
+          </a:p>
+          <a:p>
+            <a:pPr algn="ctr"/>
+            <a:r>
+              <a:rPr lang="fr-FR" sz="1600" b="1" dirty="0">
+                <a:solidFill>
+                  <a:srgbClr val="FF0000"/>
+                </a:solidFill>
+              </a:rPr>
+              <a:t>Tests 0,3%</a:t>
+            </a:r>
+          </a:p>
+        </p:txBody>
+      </p:sp>
+      <p:sp>
+        <p:nvSpPr>
+          <p:cNvPr id="73" name="Rectangle 72">
+            <a:extLst>
+              <a:ext uri="{FF2B5EF4-FFF2-40B4-BE49-F238E27FC236}">
+                <a16:creationId xmlns:a16="http://schemas.microsoft.com/office/drawing/2014/main" id="{498B7171-06A9-45F5-8310-40A77FE90899}"/>
+              </a:ext>
+            </a:extLst>
+          </p:cNvPr>
+          <p:cNvSpPr/>
+          <p:nvPr/>
+        </p:nvSpPr>
+        <p:spPr>
+          <a:xfrm>
+            <a:off x="8075827" y="33570"/>
+            <a:ext cx="1006173" cy="584775"/>
+          </a:xfrm>
+          <a:prstGeom prst="rect">
+            <a:avLst/>
+          </a:prstGeom>
+        </p:spPr>
+        <p:txBody>
+          <a:bodyPr wrap="none">
+            <a:spAutoFit/>
+          </a:bodyPr>
+          <a:lstStyle/>
+          <a:p>
+            <a:pPr algn="ctr"/>
+            <a:r>
+              <a:rPr lang="fr-FR" sz="1600" b="1" dirty="0">
+                <a:solidFill>
+                  <a:schemeClr val="accent6"/>
+                </a:solidFill>
+              </a:rPr>
+              <a:t> </a:t>
+            </a:r>
+          </a:p>
+          <a:p>
+            <a:pPr algn="ctr"/>
+            <a:r>
+              <a:rPr lang="fr-FR" sz="1600" b="1" dirty="0">
+                <a:solidFill>
+                  <a:schemeClr val="accent6"/>
+                </a:solidFill>
+              </a:rPr>
+              <a:t>Tests 80%</a:t>
+            </a:r>
+          </a:p>
+        </p:txBody>
+      </p:sp>
+      <p:sp>
+        <p:nvSpPr>
+          <p:cNvPr id="74" name="Rectangle 73">
+            <a:extLst>
+              <a:ext uri="{FF2B5EF4-FFF2-40B4-BE49-F238E27FC236}">
+                <a16:creationId xmlns:a16="http://schemas.microsoft.com/office/drawing/2014/main" id="{AA51D964-F9DE-41EE-8820-D85425FD5A06}"/>
+              </a:ext>
+            </a:extLst>
+          </p:cNvPr>
+          <p:cNvSpPr/>
+          <p:nvPr/>
+        </p:nvSpPr>
+        <p:spPr>
+          <a:xfrm>
+            <a:off x="7028274" y="33570"/>
+            <a:ext cx="1006173" cy="584775"/>
+          </a:xfrm>
+          <a:prstGeom prst="rect">
+            <a:avLst/>
+          </a:prstGeom>
+        </p:spPr>
+        <p:txBody>
+          <a:bodyPr wrap="none">
+            <a:spAutoFit/>
+          </a:bodyPr>
+          <a:lstStyle/>
+          <a:p>
+            <a:pPr algn="ctr"/>
+            <a:r>
+              <a:rPr lang="fr-FR" sz="1600" b="1" dirty="0">
+                <a:solidFill>
+                  <a:schemeClr val="accent6"/>
+                </a:solidFill>
+              </a:rPr>
+              <a:t> </a:t>
+            </a:r>
+          </a:p>
+          <a:p>
+            <a:pPr algn="ctr"/>
+            <a:r>
+              <a:rPr lang="fr-FR" sz="1600" b="1" dirty="0">
+                <a:solidFill>
+                  <a:srgbClr val="FFC000"/>
+                </a:solidFill>
+              </a:rPr>
+              <a:t>Tests 51%</a:t>
+            </a:r>
+          </a:p>
+        </p:txBody>
+      </p:sp>
+      <p:sp>
+        <p:nvSpPr>
+          <p:cNvPr id="75" name="Rectangle 74">
+            <a:extLst>
+              <a:ext uri="{FF2B5EF4-FFF2-40B4-BE49-F238E27FC236}">
+                <a16:creationId xmlns:a16="http://schemas.microsoft.com/office/drawing/2014/main" id="{A966B13A-BBB7-4786-AF8C-E3B4B220AF24}"/>
+              </a:ext>
+            </a:extLst>
+          </p:cNvPr>
+          <p:cNvSpPr/>
+          <p:nvPr/>
+        </p:nvSpPr>
+        <p:spPr>
+          <a:xfrm>
+            <a:off x="9049612" y="34873"/>
+            <a:ext cx="1006173" cy="584775"/>
+          </a:xfrm>
+          <a:prstGeom prst="rect">
+            <a:avLst/>
+          </a:prstGeom>
+        </p:spPr>
+        <p:txBody>
+          <a:bodyPr wrap="none">
+            <a:spAutoFit/>
+          </a:bodyPr>
+          <a:lstStyle/>
+          <a:p>
+            <a:pPr algn="ctr"/>
+            <a:r>
+              <a:rPr lang="fr-FR" sz="1600" b="1" dirty="0">
+                <a:solidFill>
+                  <a:schemeClr val="accent6"/>
+                </a:solidFill>
+              </a:rPr>
+              <a:t> </a:t>
+            </a:r>
+          </a:p>
+          <a:p>
+            <a:pPr algn="ctr"/>
+            <a:r>
+              <a:rPr lang="fr-FR" sz="1600" b="1" dirty="0">
+                <a:solidFill>
+                  <a:schemeClr val="accent6"/>
+                </a:solidFill>
+              </a:rPr>
+              <a:t>Tests 89%</a:t>
+            </a:r>
+          </a:p>
+        </p:txBody>
+      </p:sp>
+      <p:sp>
+        <p:nvSpPr>
+          <p:cNvPr id="76" name="Rectangle 75">
+            <a:extLst>
+              <a:ext uri="{FF2B5EF4-FFF2-40B4-BE49-F238E27FC236}">
+                <a16:creationId xmlns:a16="http://schemas.microsoft.com/office/drawing/2014/main" id="{3B59E89B-7822-4ED7-A1E4-2365678B3711}"/>
+              </a:ext>
+            </a:extLst>
+          </p:cNvPr>
+          <p:cNvSpPr/>
+          <p:nvPr/>
+        </p:nvSpPr>
+        <p:spPr>
+          <a:xfrm>
+            <a:off x="10999771" y="33569"/>
+            <a:ext cx="1006173" cy="584775"/>
+          </a:xfrm>
+          <a:prstGeom prst="rect">
+            <a:avLst/>
+          </a:prstGeom>
+        </p:spPr>
+        <p:txBody>
+          <a:bodyPr wrap="none">
+            <a:spAutoFit/>
+          </a:bodyPr>
+          <a:lstStyle/>
+          <a:p>
+            <a:pPr algn="ctr"/>
+            <a:r>
+              <a:rPr lang="fr-FR" sz="1600" b="1" dirty="0">
+                <a:solidFill>
+                  <a:schemeClr val="accent6"/>
+                </a:solidFill>
+              </a:rPr>
+              <a:t> </a:t>
+            </a:r>
+          </a:p>
+          <a:p>
+            <a:pPr algn="ctr"/>
+            <a:r>
+              <a:rPr lang="fr-FR" sz="1600" b="1" dirty="0">
+                <a:solidFill>
+                  <a:schemeClr val="accent6"/>
+                </a:solidFill>
+              </a:rPr>
+              <a:t>Tests 86%</a:t>
+            </a:r>
+          </a:p>
+        </p:txBody>
+      </p:sp>
     </p:spTree>
     <p:extLst>
       <p:ext uri="{BB962C8B-B14F-4D97-AF65-F5344CB8AC3E}">

</xml_diff>

<commit_message>
Mémoire : début résumé anglais
</commit_message>
<xml_diff>
--- a/Planning prévisionnel.pptx
+++ b/Planning prévisionnel.pptx
@@ -8399,8 +8399,8 @@
         </p:nvSpPr>
         <p:spPr>
           <a:xfrm>
-            <a:off x="1111885" y="2116600"/>
-            <a:ext cx="972000" cy="1446550"/>
+            <a:off x="881076" y="2124466"/>
+            <a:ext cx="1440000" cy="1769715"/>
           </a:xfrm>
           <a:prstGeom prst="rect">
             <a:avLst/>
@@ -8429,6 +8429,29 @@
               <a:rPr lang="fr-FR" sz="1100" dirty="0"/>
               <a:t>Modifications mineures</a:t>
             </a:r>
+          </a:p>
+          <a:p>
+            <a:pPr algn="ctr"/>
+            <a:endParaRPr lang="fr-FR" sz="1100" dirty="0"/>
+          </a:p>
+          <a:p>
+            <a:pPr algn="ctr"/>
+            <a:endParaRPr lang="fr-FR" sz="1100" dirty="0"/>
+          </a:p>
+          <a:p>
+            <a:pPr algn="ctr"/>
+            <a:r>
+              <a:rPr lang="fr-FR" sz="1600" b="1" dirty="0">
+                <a:solidFill>
+                  <a:srgbClr val="FF0000"/>
+                </a:solidFill>
+              </a:rPr>
+              <a:t>Familiarisation avec le projet</a:t>
+            </a:r>
+          </a:p>
+          <a:p>
+            <a:pPr algn="ctr"/>
+            <a:endParaRPr lang="fr-FR" sz="1100" dirty="0"/>
           </a:p>
         </p:txBody>
       </p:sp>
@@ -9130,7 +9153,7 @@
         <p:spPr>
           <a:xfrm>
             <a:off x="-109178" y="3382212"/>
-            <a:ext cx="1176001" cy="430887"/>
+            <a:ext cx="1176001" cy="1508105"/>
           </a:xfrm>
           <a:prstGeom prst="rect">
             <a:avLst/>
@@ -9147,6 +9170,25 @@
             <a:r>
               <a:rPr lang="fr-FR" sz="1100" dirty="0"/>
               <a:t>Installation outils développement</a:t>
+            </a:r>
+          </a:p>
+          <a:p>
+            <a:pPr algn="ctr"/>
+            <a:endParaRPr lang="fr-FR" sz="1100" dirty="0"/>
+          </a:p>
+          <a:p>
+            <a:pPr algn="ctr"/>
+            <a:endParaRPr lang="fr-FR" sz="1100" dirty="0"/>
+          </a:p>
+          <a:p>
+            <a:pPr algn="ctr"/>
+            <a:r>
+              <a:rPr lang="fr-FR" sz="1600" b="1" u="sng" dirty="0">
+                <a:solidFill>
+                  <a:srgbClr val="FF0000"/>
+                </a:solidFill>
+              </a:rPr>
+              <a:t>Formation JavaScript Git</a:t>
             </a:r>
           </a:p>
         </p:txBody>
@@ -9365,8 +9407,8 @@
         </p:nvSpPr>
         <p:spPr>
           <a:xfrm>
-            <a:off x="5055733" y="3171555"/>
-            <a:ext cx="936000" cy="769441"/>
+            <a:off x="5045911" y="3122587"/>
+            <a:ext cx="936000" cy="1169551"/>
           </a:xfrm>
           <a:prstGeom prst="rect">
             <a:avLst/>
@@ -9381,8 +9423,23 @@
           <a:p>
             <a:pPr algn="ctr"/>
             <a:r>
+              <a:rPr lang="fr-FR" sz="1600" b="1" dirty="0">
+                <a:solidFill>
+                  <a:srgbClr val="FF0000"/>
+                </a:solidFill>
+              </a:rPr>
+              <a:t>Refonte du projet</a:t>
+            </a:r>
+            <a:br>
+              <a:rPr lang="fr-FR" sz="1600" b="1" dirty="0">
+                <a:solidFill>
+                  <a:srgbClr val="FF0000"/>
+                </a:solidFill>
+              </a:rPr>
+            </a:br>
+            <a:r>
               <a:rPr lang="fr-FR" sz="1100" dirty="0"/>
-              <a:t>Refonte du projet achevé à 80%</a:t>
+              <a:t>achevé à 80%</a:t>
             </a:r>
           </a:p>
         </p:txBody>
@@ -9402,7 +9459,7 @@
         <p:spPr>
           <a:xfrm>
             <a:off x="6004674" y="3057188"/>
-            <a:ext cx="1044000" cy="1446550"/>
+            <a:ext cx="1044000" cy="1600438"/>
           </a:xfrm>
           <a:prstGeom prst="rect">
             <a:avLst/>
@@ -9454,7 +9511,11 @@
           <a:p>
             <a:pPr algn="ctr"/>
             <a:r>
-              <a:rPr lang="fr-FR" sz="1100" dirty="0"/>
+              <a:rPr lang="fr-FR" sz="1600" b="1" dirty="0">
+                <a:solidFill>
+                  <a:srgbClr val="FF0000"/>
+                </a:solidFill>
+              </a:rPr>
               <a:t>Début jeu Poupée</a:t>
             </a:r>
           </a:p>
@@ -9705,7 +9766,7 @@
         <p:spPr>
           <a:xfrm>
             <a:off x="11032655" y="3945731"/>
-            <a:ext cx="936000" cy="938719"/>
+            <a:ext cx="936000" cy="1092607"/>
           </a:xfrm>
           <a:prstGeom prst="rect">
             <a:avLst/>
@@ -9731,7 +9792,11 @@
           <a:p>
             <a:pPr algn="ctr"/>
             <a:r>
-              <a:rPr lang="fr-FR" sz="1100" dirty="0"/>
+              <a:rPr lang="fr-FR" sz="1600" b="1" dirty="0">
+                <a:solidFill>
+                  <a:srgbClr val="FF0000"/>
+                </a:solidFill>
+              </a:rPr>
               <a:t>Nouvelle interface </a:t>
             </a:r>
           </a:p>
@@ -10040,8 +10105,8 @@
         </p:nvSpPr>
         <p:spPr>
           <a:xfrm>
-            <a:off x="9901807" y="-519"/>
-            <a:ext cx="1245597" cy="615553"/>
+            <a:off x="10015635" y="283597"/>
+            <a:ext cx="1006173" cy="338554"/>
           </a:xfrm>
           <a:prstGeom prst="rect">
             <a:avLst/>
@@ -10054,21 +10119,6 @@
           <a:lstStyle/>
           <a:p>
             <a:pPr algn="ctr"/>
-            <a:r>
-              <a:rPr lang="fr-FR" b="1" dirty="0">
-                <a:solidFill>
-                  <a:schemeClr val="accent6"/>
-                </a:solidFill>
-              </a:rPr>
-              <a:t>Version 2.1</a:t>
-            </a:r>
-            <a:br>
-              <a:rPr lang="fr-FR" b="1" dirty="0">
-                <a:solidFill>
-                  <a:schemeClr val="accent6"/>
-                </a:solidFill>
-              </a:rPr>
-            </a:br>
             <a:r>
               <a:rPr lang="fr-FR" sz="1600" b="1" dirty="0">
                 <a:solidFill>
@@ -10549,8 +10599,8 @@
         </p:nvSpPr>
         <p:spPr>
           <a:xfrm>
-            <a:off x="10999771" y="33569"/>
-            <a:ext cx="1006173" cy="584775"/>
+            <a:off x="10851406" y="16837"/>
+            <a:ext cx="1298497" cy="615553"/>
           </a:xfrm>
           <a:prstGeom prst="rect">
             <a:avLst/>
@@ -10564,12 +10614,12 @@
           <a:p>
             <a:pPr algn="ctr"/>
             <a:r>
-              <a:rPr lang="fr-FR" sz="1600" b="1" dirty="0">
+              <a:rPr lang="fr-FR" b="1" dirty="0">
                 <a:solidFill>
                   <a:schemeClr val="accent6"/>
                 </a:solidFill>
               </a:rPr>
-              <a:t> </a:t>
+              <a:t>Version 2.1 </a:t>
             </a:r>
           </a:p>
           <a:p>
@@ -10581,6 +10631,126 @@
                 </a:solidFill>
               </a:rPr>
               <a:t>Tests 86%</a:t>
+            </a:r>
+          </a:p>
+        </p:txBody>
+      </p:sp>
+      <p:sp>
+        <p:nvSpPr>
+          <p:cNvPr id="4" name="ZoneTexte 3">
+            <a:extLst>
+              <a:ext uri="{FF2B5EF4-FFF2-40B4-BE49-F238E27FC236}">
+                <a16:creationId xmlns:a16="http://schemas.microsoft.com/office/drawing/2014/main" id="{3510887C-828F-481D-97F1-220B3218D90F}"/>
+              </a:ext>
+            </a:extLst>
+          </p:cNvPr>
+          <p:cNvSpPr txBox="1"/>
+          <p:nvPr/>
+        </p:nvSpPr>
+        <p:spPr>
+          <a:xfrm>
+            <a:off x="1457887" y="6211690"/>
+            <a:ext cx="1440268" cy="369332"/>
+          </a:xfrm>
+          <a:prstGeom prst="rect">
+            <a:avLst/>
+          </a:prstGeom>
+          <a:noFill/>
+        </p:spPr>
+        <p:txBody>
+          <a:bodyPr wrap="square" rtlCol="0">
+            <a:spAutoFit/>
+          </a:bodyPr>
+          <a:lstStyle/>
+          <a:p>
+            <a:r>
+              <a:rPr lang="fr-FR" dirty="0">
+                <a:solidFill>
+                  <a:schemeClr val="accent6"/>
+                </a:solidFill>
+                <a:latin typeface="Arial Rounded MT Bold" panose="020F0704030504030204" pitchFamily="34" charset="0"/>
+              </a:rPr>
+              <a:t>Version 1.0</a:t>
+            </a:r>
+          </a:p>
+        </p:txBody>
+      </p:sp>
+      <p:sp>
+        <p:nvSpPr>
+          <p:cNvPr id="70" name="ZoneTexte 69">
+            <a:extLst>
+              <a:ext uri="{FF2B5EF4-FFF2-40B4-BE49-F238E27FC236}">
+                <a16:creationId xmlns:a16="http://schemas.microsoft.com/office/drawing/2014/main" id="{6C6ECC51-F2CE-4286-BB55-0125F5E724FE}"/>
+              </a:ext>
+            </a:extLst>
+          </p:cNvPr>
+          <p:cNvSpPr txBox="1"/>
+          <p:nvPr/>
+        </p:nvSpPr>
+        <p:spPr>
+          <a:xfrm>
+            <a:off x="6484656" y="6211690"/>
+            <a:ext cx="1440268" cy="369332"/>
+          </a:xfrm>
+          <a:prstGeom prst="rect">
+            <a:avLst/>
+          </a:prstGeom>
+          <a:noFill/>
+        </p:spPr>
+        <p:txBody>
+          <a:bodyPr wrap="square" rtlCol="0">
+            <a:spAutoFit/>
+          </a:bodyPr>
+          <a:lstStyle/>
+          <a:p>
+            <a:r>
+              <a:rPr lang="fr-FR" dirty="0">
+                <a:solidFill>
+                  <a:schemeClr val="accent6"/>
+                </a:solidFill>
+                <a:latin typeface="Arial Rounded MT Bold" panose="020F0704030504030204" pitchFamily="34" charset="0"/>
+              </a:rPr>
+              <a:t>Version 2.0</a:t>
+            </a:r>
+          </a:p>
+        </p:txBody>
+      </p:sp>
+      <p:sp>
+        <p:nvSpPr>
+          <p:cNvPr id="77" name="ZoneTexte 76">
+            <a:extLst>
+              <a:ext uri="{FF2B5EF4-FFF2-40B4-BE49-F238E27FC236}">
+                <a16:creationId xmlns:a16="http://schemas.microsoft.com/office/drawing/2014/main" id="{2AF96B85-98C9-4B67-9018-6086FD6FD237}"/>
+              </a:ext>
+            </a:extLst>
+          </p:cNvPr>
+          <p:cNvSpPr txBox="1"/>
+          <p:nvPr/>
+        </p:nvSpPr>
+        <p:spPr>
+          <a:xfrm>
+            <a:off x="10342788" y="6211690"/>
+            <a:ext cx="1440268" cy="369332"/>
+          </a:xfrm>
+          <a:prstGeom prst="rect">
+            <a:avLst/>
+          </a:prstGeom>
+          <a:noFill/>
+        </p:spPr>
+        <p:txBody>
+          <a:bodyPr wrap="square" rtlCol="0">
+            <a:spAutoFit/>
+          </a:bodyPr>
+          <a:lstStyle/>
+          <a:p>
+            <a:r>
+              <a:rPr lang="fr-FR" dirty="0">
+                <a:solidFill>
+                  <a:schemeClr val="accent6"/>
+                </a:solidFill>
+                <a:latin typeface="Arial Rounded MT Bold" panose="020F0704030504030204" pitchFamily="34" charset="0"/>
+              </a:rPr>
+              <a:t>Version 2.1</a:t>
             </a:r>
           </a:p>
         </p:txBody>

</xml_diff>